<commit_message>
finish Ãanalysis, start slide
</commit_message>
<xml_diff>
--- a/Analysis/Module 2/Module_2_Template_slide.pptx
+++ b/Analysis/Module 2/Module_2_Template_slide.pptx
@@ -2,22 +2,24 @@
 <file path=ppt/presentation.xml><?xml version="1.0" encoding="utf-8"?>
 <p:presentation xmlns:a="http://schemas.openxmlformats.org/drawingml/2006/main" xmlns:r="http://schemas.openxmlformats.org/officeDocument/2006/relationships" xmlns:p="http://schemas.openxmlformats.org/presentationml/2006/main">
   <p:sldMasterIdLst>
-    <p:sldMasterId id="2147483648" r:id="rId5"/>
+    <p:sldMasterId id="2147483648" r:id="rId1"/>
   </p:sldMasterIdLst>
   <p:notesMasterIdLst>
-    <p:notesMasterId r:id="rId7"/>
+    <p:notesMasterId r:id="rId12"/>
   </p:notesMasterIdLst>
   <p:sldIdLst>
-    <p:sldId id="256" r:id="rId8"/>
-    <p:sldId id="257" r:id="rId9"/>
-    <p:sldId id="258" r:id="rId10"/>
-    <p:sldId id="259" r:id="rId11"/>
-    <p:sldId id="260" r:id="rId12"/>
-    <p:sldId id="261" r:id="rId13"/>
-    <p:sldId id="262" r:id="rId14"/>
-    <p:sldId id="263" r:id="rId15"/>
+    <p:sldId id="256" r:id="rId2"/>
+    <p:sldId id="257" r:id="rId3"/>
+    <p:sldId id="258" r:id="rId4"/>
+    <p:sldId id="259" r:id="rId5"/>
+    <p:sldId id="264" r:id="rId6"/>
+    <p:sldId id="260" r:id="rId7"/>
+    <p:sldId id="265" r:id="rId8"/>
+    <p:sldId id="261" r:id="rId9"/>
+    <p:sldId id="262" r:id="rId10"/>
+    <p:sldId id="263" r:id="rId11"/>
   </p:sldIdLst>
-  <p:sldSz cx="9144000" cy="5143500"/>
+  <p:sldSz cx="9144000" cy="5143500" type="screen16x9"/>
   <p:notesSz cx="6858000" cy="9144000"/>
   <p:defaultTextStyle>
     <a:defPPr marL="0" marR="0" indent="0" algn="l" defTabSz="914400" rtl="0" fontAlgn="auto" latinLnBrk="1" hangingPunct="0">
@@ -35,7 +37,7 @@
       <a:buFontTx/>
       <a:buNone/>
       <a:tabLst/>
-      <a:defRPr b="0" baseline="0" cap="none" i="0" spc="0" strike="noStrike" sz="1800" u="none" kumimoji="0" normalizeH="0">
+      <a:defRPr kumimoji="0" sz="1800" b="0" i="0" u="none" strike="noStrike" cap="none" spc="0" normalizeH="0" baseline="0">
         <a:ln>
           <a:noFill/>
         </a:ln>
@@ -61,7 +63,7 @@
       <a:buFontTx/>
       <a:buNone/>
       <a:tabLst/>
-      <a:defRPr b="0" baseline="0" cap="none" i="0" spc="0" strike="noStrike" sz="1400" u="none" kumimoji="0" normalizeH="0">
+      <a:defRPr kumimoji="0" sz="1400" b="0" i="0" u="none" strike="noStrike" cap="none" spc="0" normalizeH="0" baseline="0">
         <a:ln>
           <a:noFill/>
         </a:ln>
@@ -91,7 +93,7 @@
       <a:buFontTx/>
       <a:buNone/>
       <a:tabLst/>
-      <a:defRPr b="0" baseline="0" cap="none" i="0" spc="0" strike="noStrike" sz="1400" u="none" kumimoji="0" normalizeH="0">
+      <a:defRPr kumimoji="0" sz="1400" b="0" i="0" u="none" strike="noStrike" cap="none" spc="0" normalizeH="0" baseline="0">
         <a:ln>
           <a:noFill/>
         </a:ln>
@@ -121,7 +123,7 @@
       <a:buFontTx/>
       <a:buNone/>
       <a:tabLst/>
-      <a:defRPr b="0" baseline="0" cap="none" i="0" spc="0" strike="noStrike" sz="1400" u="none" kumimoji="0" normalizeH="0">
+      <a:defRPr kumimoji="0" sz="1400" b="0" i="0" u="none" strike="noStrike" cap="none" spc="0" normalizeH="0" baseline="0">
         <a:ln>
           <a:noFill/>
         </a:ln>
@@ -151,7 +153,7 @@
       <a:buFontTx/>
       <a:buNone/>
       <a:tabLst/>
-      <a:defRPr b="0" baseline="0" cap="none" i="0" spc="0" strike="noStrike" sz="1400" u="none" kumimoji="0" normalizeH="0">
+      <a:defRPr kumimoji="0" sz="1400" b="0" i="0" u="none" strike="noStrike" cap="none" spc="0" normalizeH="0" baseline="0">
         <a:ln>
           <a:noFill/>
         </a:ln>
@@ -181,7 +183,7 @@
       <a:buFontTx/>
       <a:buNone/>
       <a:tabLst/>
-      <a:defRPr b="0" baseline="0" cap="none" i="0" spc="0" strike="noStrike" sz="1400" u="none" kumimoji="0" normalizeH="0">
+      <a:defRPr kumimoji="0" sz="1400" b="0" i="0" u="none" strike="noStrike" cap="none" spc="0" normalizeH="0" baseline="0">
         <a:ln>
           <a:noFill/>
         </a:ln>
@@ -211,7 +213,7 @@
       <a:buFontTx/>
       <a:buNone/>
       <a:tabLst/>
-      <a:defRPr b="0" baseline="0" cap="none" i="0" spc="0" strike="noStrike" sz="1400" u="none" kumimoji="0" normalizeH="0">
+      <a:defRPr kumimoji="0" sz="1400" b="0" i="0" u="none" strike="noStrike" cap="none" spc="0" normalizeH="0" baseline="0">
         <a:ln>
           <a:noFill/>
         </a:ln>
@@ -241,7 +243,7 @@
       <a:buFontTx/>
       <a:buNone/>
       <a:tabLst/>
-      <a:defRPr b="0" baseline="0" cap="none" i="0" spc="0" strike="noStrike" sz="1400" u="none" kumimoji="0" normalizeH="0">
+      <a:defRPr kumimoji="0" sz="1400" b="0" i="0" u="none" strike="noStrike" cap="none" spc="0" normalizeH="0" baseline="0">
         <a:ln>
           <a:noFill/>
         </a:ln>
@@ -271,7 +273,7 @@
       <a:buFontTx/>
       <a:buNone/>
       <a:tabLst/>
-      <a:defRPr b="0" baseline="0" cap="none" i="0" spc="0" strike="noStrike" sz="1400" u="none" kumimoji="0" normalizeH="0">
+      <a:defRPr kumimoji="0" sz="1400" b="0" i="0" u="none" strike="noStrike" cap="none" spc="0" normalizeH="0" baseline="0">
         <a:ln>
           <a:noFill/>
         </a:ln>
@@ -301,7 +303,7 @@
       <a:buFontTx/>
       <a:buNone/>
       <a:tabLst/>
-      <a:defRPr b="0" baseline="0" cap="none" i="0" spc="0" strike="noStrike" sz="1400" u="none" kumimoji="0" normalizeH="0">
+      <a:defRPr kumimoji="0" sz="1400" b="0" i="0" u="none" strike="noStrike" cap="none" spc="0" normalizeH="0" baseline="0">
         <a:ln>
           <a:noFill/>
         </a:ln>
@@ -320,13 +322,14 @@
 </p:presentation>
 </file>
 
-<file path=ppt/commentAuthors.xml><?xml version="1.0" encoding="utf-8"?>
-<p:cmAuthorLst xmlns:a="http://schemas.openxmlformats.org/drawingml/2006/main" xmlns:r="http://schemas.openxmlformats.org/officeDocument/2006/relationships" xmlns:p="http://schemas.openxmlformats.org/presentationml/2006/main"/>
-</file>
-
 <file path=ppt/notesMasters/notesMaster1.xml><?xml version="1.0" encoding="utf-8"?>
 <p:notesMaster xmlns:a="http://schemas.openxmlformats.org/drawingml/2006/main" xmlns:r="http://schemas.openxmlformats.org/officeDocument/2006/relationships" xmlns:p="http://schemas.openxmlformats.org/presentationml/2006/main">
   <p:cSld>
+    <p:bg>
+      <p:bgRef idx="1001">
+        <a:schemeClr val="bg1"/>
+      </p:bgRef>
+    </p:bg>
     <p:spTree>
       <p:nvGrpSpPr>
         <p:cNvPr id="1" name=""/>
@@ -344,7 +347,9 @@
       <p:sp>
         <p:nvSpPr>
           <p:cNvPr id="106" name="Shape 106"/>
-          <p:cNvSpPr/>
+          <p:cNvSpPr>
+            <a:spLocks noGrp="1" noRot="1" noChangeAspect="1"/>
+          </p:cNvSpPr>
           <p:nvPr>
             <p:ph type="sldImg"/>
           </p:nvPr>
@@ -362,14 +367,16 @@
           <a:bodyPr/>
           <a:lstStyle/>
           <a:p>
-            <a:pPr/>
+            <a:endParaRPr/>
           </a:p>
         </p:txBody>
       </p:sp>
       <p:sp>
         <p:nvSpPr>
           <p:cNvPr id="107" name="Shape 107"/>
-          <p:cNvSpPr/>
+          <p:cNvSpPr>
+            <a:spLocks noGrp="1"/>
+          </p:cNvSpPr>
           <p:nvPr>
             <p:ph type="body" sz="quarter" idx="1"/>
           </p:nvPr>
@@ -387,7 +394,7 @@
           <a:bodyPr/>
           <a:lstStyle/>
           <a:p>
-            <a:pPr/>
+            <a:endParaRPr/>
           </a:p>
         </p:txBody>
       </p:sp>
@@ -471,8 +478,140 @@
 </p:notesMaster>
 </file>
 
+<file path=ppt/notesSlides/notesSlide1.xml><?xml version="1.0" encoding="utf-8"?>
+<p:notes xmlns:a="http://schemas.openxmlformats.org/drawingml/2006/main" xmlns:r="http://schemas.openxmlformats.org/officeDocument/2006/relationships" xmlns:p="http://schemas.openxmlformats.org/presentationml/2006/main">
+  <p:cSld>
+    <p:spTree>
+      <p:nvGrpSpPr>
+        <p:cNvPr id="1" name=""/>
+        <p:cNvGrpSpPr/>
+        <p:nvPr/>
+      </p:nvGrpSpPr>
+      <p:grpSpPr>
+        <a:xfrm>
+          <a:off x="0" y="0"/>
+          <a:ext cx="0" cy="0"/>
+          <a:chOff x="0" y="0"/>
+          <a:chExt cx="0" cy="0"/>
+        </a:xfrm>
+      </p:grpSpPr>
+      <p:sp>
+        <p:nvSpPr>
+          <p:cNvPr id="2" name="Slide Image Placeholder 1"/>
+          <p:cNvSpPr>
+            <a:spLocks noGrp="1" noRot="1" noChangeAspect="1"/>
+          </p:cNvSpPr>
+          <p:nvPr>
+            <p:ph type="sldImg"/>
+          </p:nvPr>
+        </p:nvSpPr>
+        <p:spPr>
+          <a:xfrm>
+            <a:off x="381000" y="685800"/>
+            <a:ext cx="6096000" cy="3429000"/>
+          </a:xfrm>
+        </p:spPr>
+      </p:sp>
+      <p:sp>
+        <p:nvSpPr>
+          <p:cNvPr id="3" name="Notes Placeholder 2"/>
+          <p:cNvSpPr>
+            <a:spLocks noGrp="1"/>
+          </p:cNvSpPr>
+          <p:nvPr>
+            <p:ph type="body" idx="1"/>
+          </p:nvPr>
+        </p:nvSpPr>
+        <p:spPr/>
+        <p:txBody>
+          <a:bodyPr/>
+          <a:lstStyle/>
+          <a:p>
+            <a:endParaRPr lang="en-AU" dirty="0"/>
+          </a:p>
+        </p:txBody>
+      </p:sp>
+    </p:spTree>
+    <p:extLst>
+      <p:ext uri="{BB962C8B-B14F-4D97-AF65-F5344CB8AC3E}">
+        <p14:creationId xmlns:p14="http://schemas.microsoft.com/office/powerpoint/2010/main" val="3938699569"/>
+      </p:ext>
+    </p:extLst>
+  </p:cSld>
+  <p:clrMapOvr>
+    <a:masterClrMapping/>
+  </p:clrMapOvr>
+</p:notes>
+</file>
+
+<file path=ppt/notesSlides/notesSlide2.xml><?xml version="1.0" encoding="utf-8"?>
+<p:notes xmlns:a="http://schemas.openxmlformats.org/drawingml/2006/main" xmlns:r="http://schemas.openxmlformats.org/officeDocument/2006/relationships" xmlns:p="http://schemas.openxmlformats.org/presentationml/2006/main">
+  <p:cSld>
+    <p:spTree>
+      <p:nvGrpSpPr>
+        <p:cNvPr id="1" name=""/>
+        <p:cNvGrpSpPr/>
+        <p:nvPr/>
+      </p:nvGrpSpPr>
+      <p:grpSpPr>
+        <a:xfrm>
+          <a:off x="0" y="0"/>
+          <a:ext cx="0" cy="0"/>
+          <a:chOff x="0" y="0"/>
+          <a:chExt cx="0" cy="0"/>
+        </a:xfrm>
+      </p:grpSpPr>
+      <p:sp>
+        <p:nvSpPr>
+          <p:cNvPr id="2" name="Slide Image Placeholder 1"/>
+          <p:cNvSpPr>
+            <a:spLocks noGrp="1" noRot="1" noChangeAspect="1"/>
+          </p:cNvSpPr>
+          <p:nvPr>
+            <p:ph type="sldImg"/>
+          </p:nvPr>
+        </p:nvSpPr>
+        <p:spPr>
+          <a:xfrm>
+            <a:off x="381000" y="685800"/>
+            <a:ext cx="6096000" cy="3429000"/>
+          </a:xfrm>
+        </p:spPr>
+      </p:sp>
+      <p:sp>
+        <p:nvSpPr>
+          <p:cNvPr id="3" name="Notes Placeholder 2"/>
+          <p:cNvSpPr>
+            <a:spLocks noGrp="1"/>
+          </p:cNvSpPr>
+          <p:nvPr>
+            <p:ph type="body" idx="1"/>
+          </p:nvPr>
+        </p:nvSpPr>
+        <p:spPr/>
+        <p:txBody>
+          <a:bodyPr/>
+          <a:lstStyle/>
+          <a:p>
+            <a:endParaRPr lang="en-AU" dirty="0"/>
+          </a:p>
+        </p:txBody>
+      </p:sp>
+    </p:spTree>
+    <p:extLst>
+      <p:ext uri="{BB962C8B-B14F-4D97-AF65-F5344CB8AC3E}">
+        <p14:creationId xmlns:p14="http://schemas.microsoft.com/office/powerpoint/2010/main" val="2151803683"/>
+      </p:ext>
+    </p:extLst>
+  </p:cSld>
+  <p:clrMapOvr>
+    <a:masterClrMapping/>
+  </p:clrMapOvr>
+</p:notes>
+</file>
+
 <file path=ppt/slideLayouts/slideLayout1.xml><?xml version="1.0" encoding="utf-8"?>
-<p:sldLayout xmlns:a="http://schemas.openxmlformats.org/drawingml/2006/main" xmlns:r="http://schemas.openxmlformats.org/officeDocument/2006/relationships" xmlns:p="http://schemas.openxmlformats.org/presentationml/2006/main" type="title" showMasterSp="1" showMasterPhAnim="1">
+<p:sldLayout xmlns:a="http://schemas.openxmlformats.org/drawingml/2006/main" xmlns:r="http://schemas.openxmlformats.org/officeDocument/2006/relationships" xmlns:p="http://schemas.openxmlformats.org/presentationml/2006/main" type="title">
   <p:cSld name="TITLE">
     <p:spTree>
       <p:nvGrpSpPr>
@@ -491,7 +630,9 @@
       <p:sp>
         <p:nvSpPr>
           <p:cNvPr id="11" name="Title Text"/>
-          <p:cNvSpPr/>
+          <p:cNvSpPr>
+            <a:spLocks noGrp="1"/>
+          </p:cNvSpPr>
           <p:nvPr>
             <p:ph type="title"/>
           </p:nvPr>
@@ -513,7 +654,6 @@
             </a:lvl1pPr>
           </a:lstStyle>
           <a:p>
-            <a:pPr/>
             <a:r>
               <a:t>Title Text</a:t>
             </a:r>
@@ -523,7 +663,9 @@
       <p:sp>
         <p:nvSpPr>
           <p:cNvPr id="12" name="Body Level One…"/>
-          <p:cNvSpPr/>
+          <p:cNvSpPr>
+            <a:spLocks noGrp="1"/>
+          </p:cNvSpPr>
           <p:nvPr>
             <p:ph type="body" sz="quarter" idx="1"/>
           </p:nvPr>
@@ -592,7 +734,6 @@
             </a:lvl5pPr>
           </a:lstStyle>
           <a:p>
-            <a:pPr/>
             <a:r>
               <a:t>Body Level One</a:t>
             </a:r>
@@ -626,7 +767,9 @@
       <p:sp>
         <p:nvSpPr>
           <p:cNvPr id="13" name="Slide Number"/>
-          <p:cNvSpPr/>
+          <p:cNvSpPr>
+            <a:spLocks noGrp="1"/>
+          </p:cNvSpPr>
           <p:nvPr>
             <p:ph type="sldNum" sz="quarter" idx="2"/>
           </p:nvPr>
@@ -640,8 +783,10 @@
           <a:bodyPr/>
           <a:lstStyle/>
           <a:p>
-            <a:pPr/>
-            <a:fld id="{86CB4B4D-7CA3-9044-876B-883B54F8677D}" type="slidenum"/>
+            <a:fld id="{86CB4B4D-7CA3-9044-876B-883B54F8677D}" type="slidenum">
+              <a:t>‹#›</a:t>
+            </a:fld>
+            <a:endParaRPr/>
           </a:p>
         </p:txBody>
       </p:sp>
@@ -650,12 +795,12 @@
   <p:clrMapOvr>
     <a:masterClrMapping/>
   </p:clrMapOvr>
-  <p:transition xmlns:p14="http://schemas.microsoft.com/office/powerpoint/2010/main" spd="med" advClick="1"/>
+  <p:transition spd="med"/>
 </p:sldLayout>
 </file>
 
 <file path=ppt/slideLayouts/slideLayout10.xml><?xml version="1.0" encoding="utf-8"?>
-<p:sldLayout xmlns:a="http://schemas.openxmlformats.org/drawingml/2006/main" xmlns:r="http://schemas.openxmlformats.org/officeDocument/2006/relationships" xmlns:p="http://schemas.openxmlformats.org/presentationml/2006/main" type="tx" showMasterSp="1" showMasterPhAnim="1">
+<p:sldLayout xmlns:a="http://schemas.openxmlformats.org/drawingml/2006/main" xmlns:r="http://schemas.openxmlformats.org/officeDocument/2006/relationships" xmlns:p="http://schemas.openxmlformats.org/presentationml/2006/main" type="tx">
   <p:cSld name="BIG_NUMBER">
     <p:spTree>
       <p:nvGrpSpPr>
@@ -674,7 +819,9 @@
       <p:sp>
         <p:nvSpPr>
           <p:cNvPr id="91" name="Title Text"/>
-          <p:cNvSpPr/>
+          <p:cNvSpPr>
+            <a:spLocks noGrp="1"/>
+          </p:cNvSpPr>
           <p:nvPr>
             <p:ph type="title"/>
           </p:nvPr>
@@ -696,7 +843,6 @@
             </a:lvl1pPr>
           </a:lstStyle>
           <a:p>
-            <a:pPr/>
             <a:r>
               <a:t>Title Text</a:t>
             </a:r>
@@ -706,7 +852,9 @@
       <p:sp>
         <p:nvSpPr>
           <p:cNvPr id="92" name="Body Level One…"/>
-          <p:cNvSpPr/>
+          <p:cNvSpPr>
+            <a:spLocks noGrp="1"/>
+          </p:cNvSpPr>
           <p:nvPr>
             <p:ph type="body" sz="half" idx="1"/>
           </p:nvPr>
@@ -730,7 +878,6 @@
             <a:lvl5pPr algn="ctr"/>
           </a:lstStyle>
           <a:p>
-            <a:pPr/>
             <a:r>
               <a:t>Body Level One</a:t>
             </a:r>
@@ -764,7 +911,9 @@
       <p:sp>
         <p:nvSpPr>
           <p:cNvPr id="93" name="Slide Number"/>
-          <p:cNvSpPr/>
+          <p:cNvSpPr>
+            <a:spLocks noGrp="1"/>
+          </p:cNvSpPr>
           <p:nvPr>
             <p:ph type="sldNum" sz="quarter" idx="2"/>
           </p:nvPr>
@@ -778,8 +927,10 @@
           <a:bodyPr/>
           <a:lstStyle/>
           <a:p>
-            <a:pPr/>
-            <a:fld id="{86CB4B4D-7CA3-9044-876B-883B54F8677D}" type="slidenum"/>
+            <a:fld id="{86CB4B4D-7CA3-9044-876B-883B54F8677D}" type="slidenum">
+              <a:t>‹#›</a:t>
+            </a:fld>
+            <a:endParaRPr/>
           </a:p>
         </p:txBody>
       </p:sp>
@@ -788,12 +939,12 @@
   <p:clrMapOvr>
     <a:masterClrMapping/>
   </p:clrMapOvr>
-  <p:transition xmlns:p14="http://schemas.microsoft.com/office/powerpoint/2010/main" spd="med" advClick="1"/>
+  <p:transition spd="med"/>
 </p:sldLayout>
 </file>
 
 <file path=ppt/slideLayouts/slideLayout11.xml><?xml version="1.0" encoding="utf-8"?>
-<p:sldLayout xmlns:a="http://schemas.openxmlformats.org/drawingml/2006/main" xmlns:r="http://schemas.openxmlformats.org/officeDocument/2006/relationships" xmlns:p="http://schemas.openxmlformats.org/presentationml/2006/main" type="tx" showMasterSp="1" showMasterPhAnim="1">
+<p:sldLayout xmlns:a="http://schemas.openxmlformats.org/drawingml/2006/main" xmlns:r="http://schemas.openxmlformats.org/officeDocument/2006/relationships" xmlns:p="http://schemas.openxmlformats.org/presentationml/2006/main" type="tx">
   <p:cSld name="BLANK">
     <p:spTree>
       <p:nvGrpSpPr>
@@ -812,7 +963,9 @@
       <p:sp>
         <p:nvSpPr>
           <p:cNvPr id="100" name="Slide Number"/>
-          <p:cNvSpPr/>
+          <p:cNvSpPr>
+            <a:spLocks noGrp="1"/>
+          </p:cNvSpPr>
           <p:nvPr>
             <p:ph type="sldNum" sz="quarter" idx="2"/>
           </p:nvPr>
@@ -826,8 +979,10 @@
           <a:bodyPr/>
           <a:lstStyle/>
           <a:p>
-            <a:pPr/>
-            <a:fld id="{86CB4B4D-7CA3-9044-876B-883B54F8677D}" type="slidenum"/>
+            <a:fld id="{86CB4B4D-7CA3-9044-876B-883B54F8677D}" type="slidenum">
+              <a:t>‹#›</a:t>
+            </a:fld>
+            <a:endParaRPr/>
           </a:p>
         </p:txBody>
       </p:sp>
@@ -836,12 +991,12 @@
   <p:clrMapOvr>
     <a:masterClrMapping/>
   </p:clrMapOvr>
-  <p:transition xmlns:p14="http://schemas.microsoft.com/office/powerpoint/2010/main" spd="med" advClick="1"/>
+  <p:transition spd="med"/>
 </p:sldLayout>
 </file>
 
 <file path=ppt/slideLayouts/slideLayout2.xml><?xml version="1.0" encoding="utf-8"?>
-<p:sldLayout xmlns:a="http://schemas.openxmlformats.org/drawingml/2006/main" xmlns:r="http://schemas.openxmlformats.org/officeDocument/2006/relationships" xmlns:p="http://schemas.openxmlformats.org/presentationml/2006/main" type="tx" showMasterSp="1" showMasterPhAnim="1">
+<p:sldLayout xmlns:a="http://schemas.openxmlformats.org/drawingml/2006/main" xmlns:r="http://schemas.openxmlformats.org/officeDocument/2006/relationships" xmlns:p="http://schemas.openxmlformats.org/presentationml/2006/main" type="tx">
   <p:cSld name="SECTION_HEADER">
     <p:spTree>
       <p:nvGrpSpPr>
@@ -860,7 +1015,9 @@
       <p:sp>
         <p:nvSpPr>
           <p:cNvPr id="20" name="Title Text"/>
-          <p:cNvSpPr/>
+          <p:cNvSpPr>
+            <a:spLocks noGrp="1"/>
+          </p:cNvSpPr>
           <p:nvPr>
             <p:ph type="title"/>
           </p:nvPr>
@@ -882,7 +1039,6 @@
             </a:lvl1pPr>
           </a:lstStyle>
           <a:p>
-            <a:pPr/>
             <a:r>
               <a:t>Title Text</a:t>
             </a:r>
@@ -892,7 +1048,9 @@
       <p:sp>
         <p:nvSpPr>
           <p:cNvPr id="21" name="Slide Number"/>
-          <p:cNvSpPr/>
+          <p:cNvSpPr>
+            <a:spLocks noGrp="1"/>
+          </p:cNvSpPr>
           <p:nvPr>
             <p:ph type="sldNum" sz="quarter" idx="2"/>
           </p:nvPr>
@@ -906,8 +1064,10 @@
           <a:bodyPr/>
           <a:lstStyle/>
           <a:p>
-            <a:pPr/>
-            <a:fld id="{86CB4B4D-7CA3-9044-876B-883B54F8677D}" type="slidenum"/>
+            <a:fld id="{86CB4B4D-7CA3-9044-876B-883B54F8677D}" type="slidenum">
+              <a:t>‹#›</a:t>
+            </a:fld>
+            <a:endParaRPr/>
           </a:p>
         </p:txBody>
       </p:sp>
@@ -916,12 +1076,12 @@
   <p:clrMapOvr>
     <a:masterClrMapping/>
   </p:clrMapOvr>
-  <p:transition xmlns:p14="http://schemas.microsoft.com/office/powerpoint/2010/main" spd="med" advClick="1"/>
+  <p:transition spd="med"/>
 </p:sldLayout>
 </file>
 
 <file path=ppt/slideLayouts/slideLayout3.xml><?xml version="1.0" encoding="utf-8"?>
-<p:sldLayout xmlns:a="http://schemas.openxmlformats.org/drawingml/2006/main" xmlns:r="http://schemas.openxmlformats.org/officeDocument/2006/relationships" xmlns:p="http://schemas.openxmlformats.org/presentationml/2006/main" type="tx" showMasterSp="1" showMasterPhAnim="1">
+<p:sldLayout xmlns:a="http://schemas.openxmlformats.org/drawingml/2006/main" xmlns:r="http://schemas.openxmlformats.org/officeDocument/2006/relationships" xmlns:p="http://schemas.openxmlformats.org/presentationml/2006/main" type="tx">
   <p:cSld name="TITLE_AND_BODY">
     <p:spTree>
       <p:nvGrpSpPr>
@@ -940,7 +1100,9 @@
       <p:sp>
         <p:nvSpPr>
           <p:cNvPr id="28" name="Title Text"/>
-          <p:cNvSpPr/>
+          <p:cNvSpPr>
+            <a:spLocks noGrp="1"/>
+          </p:cNvSpPr>
           <p:nvPr>
             <p:ph type="title"/>
           </p:nvPr>
@@ -954,7 +1116,6 @@
           <a:bodyPr/>
           <a:lstStyle/>
           <a:p>
-            <a:pPr/>
             <a:r>
               <a:t>Title Text</a:t>
             </a:r>
@@ -964,7 +1125,9 @@
       <p:sp>
         <p:nvSpPr>
           <p:cNvPr id="29" name="Body Level One…"/>
-          <p:cNvSpPr/>
+          <p:cNvSpPr>
+            <a:spLocks noGrp="1"/>
+          </p:cNvSpPr>
           <p:nvPr>
             <p:ph type="body" idx="1"/>
           </p:nvPr>
@@ -978,7 +1141,6 @@
           <a:bodyPr/>
           <a:lstStyle/>
           <a:p>
-            <a:pPr/>
             <a:r>
               <a:t>Body Level One</a:t>
             </a:r>
@@ -1012,7 +1174,9 @@
       <p:sp>
         <p:nvSpPr>
           <p:cNvPr id="30" name="Slide Number"/>
-          <p:cNvSpPr/>
+          <p:cNvSpPr>
+            <a:spLocks noGrp="1"/>
+          </p:cNvSpPr>
           <p:nvPr>
             <p:ph type="sldNum" sz="quarter" idx="2"/>
           </p:nvPr>
@@ -1026,8 +1190,10 @@
           <a:bodyPr/>
           <a:lstStyle/>
           <a:p>
-            <a:pPr/>
-            <a:fld id="{86CB4B4D-7CA3-9044-876B-883B54F8677D}" type="slidenum"/>
+            <a:fld id="{86CB4B4D-7CA3-9044-876B-883B54F8677D}" type="slidenum">
+              <a:t>‹#›</a:t>
+            </a:fld>
+            <a:endParaRPr/>
           </a:p>
         </p:txBody>
       </p:sp>
@@ -1036,12 +1202,12 @@
   <p:clrMapOvr>
     <a:masterClrMapping/>
   </p:clrMapOvr>
-  <p:transition xmlns:p14="http://schemas.microsoft.com/office/powerpoint/2010/main" spd="med" advClick="1"/>
+  <p:transition spd="med"/>
 </p:sldLayout>
 </file>
 
 <file path=ppt/slideLayouts/slideLayout4.xml><?xml version="1.0" encoding="utf-8"?>
-<p:sldLayout xmlns:a="http://schemas.openxmlformats.org/drawingml/2006/main" xmlns:r="http://schemas.openxmlformats.org/officeDocument/2006/relationships" xmlns:p="http://schemas.openxmlformats.org/presentationml/2006/main" type="tx" showMasterSp="1" showMasterPhAnim="1">
+<p:sldLayout xmlns:a="http://schemas.openxmlformats.org/drawingml/2006/main" xmlns:r="http://schemas.openxmlformats.org/officeDocument/2006/relationships" xmlns:p="http://schemas.openxmlformats.org/presentationml/2006/main" type="tx">
   <p:cSld name="TITLE_AND_TWO_COLUMNS">
     <p:spTree>
       <p:nvGrpSpPr>
@@ -1060,7 +1226,9 @@
       <p:sp>
         <p:nvSpPr>
           <p:cNvPr id="37" name="Title Text"/>
-          <p:cNvSpPr/>
+          <p:cNvSpPr>
+            <a:spLocks noGrp="1"/>
+          </p:cNvSpPr>
           <p:nvPr>
             <p:ph type="title"/>
           </p:nvPr>
@@ -1074,7 +1242,6 @@
           <a:bodyPr/>
           <a:lstStyle/>
           <a:p>
-            <a:pPr/>
             <a:r>
               <a:t>Title Text</a:t>
             </a:r>
@@ -1084,7 +1251,9 @@
       <p:sp>
         <p:nvSpPr>
           <p:cNvPr id="38" name="Body Level One…"/>
-          <p:cNvSpPr/>
+          <p:cNvSpPr>
+            <a:spLocks noGrp="1"/>
+          </p:cNvSpPr>
           <p:nvPr>
             <p:ph type="body" sz="half" idx="1"/>
           </p:nvPr>
@@ -1123,7 +1292,6 @@
             </a:lvl5pPr>
           </a:lstStyle>
           <a:p>
-            <a:pPr/>
             <a:r>
               <a:t>Body Level One</a:t>
             </a:r>
@@ -1157,7 +1325,9 @@
       <p:sp>
         <p:nvSpPr>
           <p:cNvPr id="39" name="Shape 23"/>
-          <p:cNvSpPr/>
+          <p:cNvSpPr>
+            <a:spLocks noGrp="1"/>
+          </p:cNvSpPr>
           <p:nvPr>
             <p:ph type="body" sz="half" idx="13"/>
           </p:nvPr>
@@ -1179,13 +1349,16 @@
               <a:buSzPts val="1400"/>
               <a:defRPr sz="1400"/>
             </a:pPr>
+            <a:endParaRPr/>
           </a:p>
         </p:txBody>
       </p:sp>
       <p:sp>
         <p:nvSpPr>
           <p:cNvPr id="40" name="Slide Number"/>
-          <p:cNvSpPr/>
+          <p:cNvSpPr>
+            <a:spLocks noGrp="1"/>
+          </p:cNvSpPr>
           <p:nvPr>
             <p:ph type="sldNum" sz="quarter" idx="2"/>
           </p:nvPr>
@@ -1199,8 +1372,10 @@
           <a:bodyPr/>
           <a:lstStyle/>
           <a:p>
-            <a:pPr/>
-            <a:fld id="{86CB4B4D-7CA3-9044-876B-883B54F8677D}" type="slidenum"/>
+            <a:fld id="{86CB4B4D-7CA3-9044-876B-883B54F8677D}" type="slidenum">
+              <a:t>‹#›</a:t>
+            </a:fld>
+            <a:endParaRPr/>
           </a:p>
         </p:txBody>
       </p:sp>
@@ -1209,12 +1384,12 @@
   <p:clrMapOvr>
     <a:masterClrMapping/>
   </p:clrMapOvr>
-  <p:transition xmlns:p14="http://schemas.microsoft.com/office/powerpoint/2010/main" spd="med" advClick="1"/>
+  <p:transition spd="med"/>
 </p:sldLayout>
 </file>
 
 <file path=ppt/slideLayouts/slideLayout5.xml><?xml version="1.0" encoding="utf-8"?>
-<p:sldLayout xmlns:a="http://schemas.openxmlformats.org/drawingml/2006/main" xmlns:r="http://schemas.openxmlformats.org/officeDocument/2006/relationships" xmlns:p="http://schemas.openxmlformats.org/presentationml/2006/main" type="tx" showMasterSp="1" showMasterPhAnim="1">
+<p:sldLayout xmlns:a="http://schemas.openxmlformats.org/drawingml/2006/main" xmlns:r="http://schemas.openxmlformats.org/officeDocument/2006/relationships" xmlns:p="http://schemas.openxmlformats.org/presentationml/2006/main" type="tx">
   <p:cSld name="TITLE_ONLY">
     <p:spTree>
       <p:nvGrpSpPr>
@@ -1233,7 +1408,9 @@
       <p:sp>
         <p:nvSpPr>
           <p:cNvPr id="47" name="Title Text"/>
-          <p:cNvSpPr/>
+          <p:cNvSpPr>
+            <a:spLocks noGrp="1"/>
+          </p:cNvSpPr>
           <p:nvPr>
             <p:ph type="title"/>
           </p:nvPr>
@@ -1247,7 +1424,6 @@
           <a:bodyPr/>
           <a:lstStyle/>
           <a:p>
-            <a:pPr/>
             <a:r>
               <a:t>Title Text</a:t>
             </a:r>
@@ -1257,7 +1433,9 @@
       <p:sp>
         <p:nvSpPr>
           <p:cNvPr id="48" name="Slide Number"/>
-          <p:cNvSpPr/>
+          <p:cNvSpPr>
+            <a:spLocks noGrp="1"/>
+          </p:cNvSpPr>
           <p:nvPr>
             <p:ph type="sldNum" sz="quarter" idx="2"/>
           </p:nvPr>
@@ -1271,8 +1449,10 @@
           <a:bodyPr/>
           <a:lstStyle/>
           <a:p>
-            <a:pPr/>
-            <a:fld id="{86CB4B4D-7CA3-9044-876B-883B54F8677D}" type="slidenum"/>
+            <a:fld id="{86CB4B4D-7CA3-9044-876B-883B54F8677D}" type="slidenum">
+              <a:t>‹#›</a:t>
+            </a:fld>
+            <a:endParaRPr/>
           </a:p>
         </p:txBody>
       </p:sp>
@@ -1281,12 +1461,12 @@
   <p:clrMapOvr>
     <a:masterClrMapping/>
   </p:clrMapOvr>
-  <p:transition xmlns:p14="http://schemas.microsoft.com/office/powerpoint/2010/main" spd="med" advClick="1"/>
+  <p:transition spd="med"/>
 </p:sldLayout>
 </file>
 
 <file path=ppt/slideLayouts/slideLayout6.xml><?xml version="1.0" encoding="utf-8"?>
-<p:sldLayout xmlns:a="http://schemas.openxmlformats.org/drawingml/2006/main" xmlns:r="http://schemas.openxmlformats.org/officeDocument/2006/relationships" xmlns:p="http://schemas.openxmlformats.org/presentationml/2006/main" type="tx" showMasterSp="1" showMasterPhAnim="1">
+<p:sldLayout xmlns:a="http://schemas.openxmlformats.org/drawingml/2006/main" xmlns:r="http://schemas.openxmlformats.org/officeDocument/2006/relationships" xmlns:p="http://schemas.openxmlformats.org/presentationml/2006/main" type="tx">
   <p:cSld name="ONE_COLUMN_TEXT">
     <p:spTree>
       <p:nvGrpSpPr>
@@ -1305,7 +1485,9 @@
       <p:sp>
         <p:nvSpPr>
           <p:cNvPr id="55" name="Title Text"/>
-          <p:cNvSpPr/>
+          <p:cNvSpPr>
+            <a:spLocks noGrp="1"/>
+          </p:cNvSpPr>
           <p:nvPr>
             <p:ph type="title"/>
           </p:nvPr>
@@ -1327,7 +1509,6 @@
             </a:lvl1pPr>
           </a:lstStyle>
           <a:p>
-            <a:pPr/>
             <a:r>
               <a:t>Title Text</a:t>
             </a:r>
@@ -1337,7 +1518,9 @@
       <p:sp>
         <p:nvSpPr>
           <p:cNvPr id="56" name="Body Level One…"/>
-          <p:cNvSpPr/>
+          <p:cNvSpPr>
+            <a:spLocks noGrp="1"/>
+          </p:cNvSpPr>
           <p:nvPr>
             <p:ph type="body" sz="quarter" idx="1"/>
           </p:nvPr>
@@ -1376,7 +1559,6 @@
             </a:lvl5pPr>
           </a:lstStyle>
           <a:p>
-            <a:pPr/>
             <a:r>
               <a:t>Body Level One</a:t>
             </a:r>
@@ -1410,7 +1592,9 @@
       <p:sp>
         <p:nvSpPr>
           <p:cNvPr id="57" name="Slide Number"/>
-          <p:cNvSpPr/>
+          <p:cNvSpPr>
+            <a:spLocks noGrp="1"/>
+          </p:cNvSpPr>
           <p:nvPr>
             <p:ph type="sldNum" sz="quarter" idx="2"/>
           </p:nvPr>
@@ -1424,8 +1608,10 @@
           <a:bodyPr/>
           <a:lstStyle/>
           <a:p>
-            <a:pPr/>
-            <a:fld id="{86CB4B4D-7CA3-9044-876B-883B54F8677D}" type="slidenum"/>
+            <a:fld id="{86CB4B4D-7CA3-9044-876B-883B54F8677D}" type="slidenum">
+              <a:t>‹#›</a:t>
+            </a:fld>
+            <a:endParaRPr/>
           </a:p>
         </p:txBody>
       </p:sp>
@@ -1434,12 +1620,12 @@
   <p:clrMapOvr>
     <a:masterClrMapping/>
   </p:clrMapOvr>
-  <p:transition xmlns:p14="http://schemas.microsoft.com/office/powerpoint/2010/main" spd="med" advClick="1"/>
+  <p:transition spd="med"/>
 </p:sldLayout>
 </file>
 
 <file path=ppt/slideLayouts/slideLayout7.xml><?xml version="1.0" encoding="utf-8"?>
-<p:sldLayout xmlns:a="http://schemas.openxmlformats.org/drawingml/2006/main" xmlns:r="http://schemas.openxmlformats.org/officeDocument/2006/relationships" xmlns:p="http://schemas.openxmlformats.org/presentationml/2006/main" type="tx" showMasterSp="1" showMasterPhAnim="1">
+<p:sldLayout xmlns:a="http://schemas.openxmlformats.org/drawingml/2006/main" xmlns:r="http://schemas.openxmlformats.org/officeDocument/2006/relationships" xmlns:p="http://schemas.openxmlformats.org/presentationml/2006/main" type="tx">
   <p:cSld name="MAIN_POINT">
     <p:spTree>
       <p:nvGrpSpPr>
@@ -1458,7 +1644,9 @@
       <p:sp>
         <p:nvSpPr>
           <p:cNvPr id="64" name="Title Text"/>
-          <p:cNvSpPr/>
+          <p:cNvSpPr>
+            <a:spLocks noGrp="1"/>
+          </p:cNvSpPr>
           <p:nvPr>
             <p:ph type="title"/>
           </p:nvPr>
@@ -1480,7 +1668,6 @@
             </a:lvl1pPr>
           </a:lstStyle>
           <a:p>
-            <a:pPr/>
             <a:r>
               <a:t>Title Text</a:t>
             </a:r>
@@ -1490,7 +1677,9 @@
       <p:sp>
         <p:nvSpPr>
           <p:cNvPr id="65" name="Slide Number"/>
-          <p:cNvSpPr/>
+          <p:cNvSpPr>
+            <a:spLocks noGrp="1"/>
+          </p:cNvSpPr>
           <p:nvPr>
             <p:ph type="sldNum" sz="quarter" idx="2"/>
           </p:nvPr>
@@ -1504,8 +1693,10 @@
           <a:bodyPr/>
           <a:lstStyle/>
           <a:p>
-            <a:pPr/>
-            <a:fld id="{86CB4B4D-7CA3-9044-876B-883B54F8677D}" type="slidenum"/>
+            <a:fld id="{86CB4B4D-7CA3-9044-876B-883B54F8677D}" type="slidenum">
+              <a:t>‹#›</a:t>
+            </a:fld>
+            <a:endParaRPr/>
           </a:p>
         </p:txBody>
       </p:sp>
@@ -1514,12 +1705,12 @@
   <p:clrMapOvr>
     <a:masterClrMapping/>
   </p:clrMapOvr>
-  <p:transition xmlns:p14="http://schemas.microsoft.com/office/powerpoint/2010/main" spd="med" advClick="1"/>
+  <p:transition spd="med"/>
 </p:sldLayout>
 </file>
 
 <file path=ppt/slideLayouts/slideLayout8.xml><?xml version="1.0" encoding="utf-8"?>
-<p:sldLayout xmlns:a="http://schemas.openxmlformats.org/drawingml/2006/main" xmlns:r="http://schemas.openxmlformats.org/officeDocument/2006/relationships" xmlns:p="http://schemas.openxmlformats.org/presentationml/2006/main" type="tx" showMasterSp="1" showMasterPhAnim="1">
+<p:sldLayout xmlns:a="http://schemas.openxmlformats.org/drawingml/2006/main" xmlns:r="http://schemas.openxmlformats.org/officeDocument/2006/relationships" xmlns:p="http://schemas.openxmlformats.org/presentationml/2006/main" type="tx">
   <p:cSld name="SECTION_TITLE_AND_DESCRIPTION">
     <p:spTree>
       <p:nvGrpSpPr>
@@ -1560,14 +1751,16 @@
           <a:bodyPr lIns="45719" rIns="45719" anchor="ctr"/>
           <a:lstStyle/>
           <a:p>
-            <a:pPr/>
+            <a:endParaRPr/>
           </a:p>
         </p:txBody>
       </p:sp>
       <p:sp>
         <p:nvSpPr>
           <p:cNvPr id="73" name="Title Text"/>
-          <p:cNvSpPr/>
+          <p:cNvSpPr>
+            <a:spLocks noGrp="1"/>
+          </p:cNvSpPr>
           <p:nvPr>
             <p:ph type="title"/>
           </p:nvPr>
@@ -1589,7 +1782,6 @@
             </a:lvl1pPr>
           </a:lstStyle>
           <a:p>
-            <a:pPr/>
             <a:r>
               <a:t>Title Text</a:t>
             </a:r>
@@ -1599,7 +1791,9 @@
       <p:sp>
         <p:nvSpPr>
           <p:cNvPr id="74" name="Body Level One…"/>
-          <p:cNvSpPr/>
+          <p:cNvSpPr>
+            <a:spLocks noGrp="1"/>
+          </p:cNvSpPr>
           <p:nvPr>
             <p:ph type="body" sz="quarter" idx="1"/>
           </p:nvPr>
@@ -1668,7 +1862,6 @@
             </a:lvl5pPr>
           </a:lstStyle>
           <a:p>
-            <a:pPr/>
             <a:r>
               <a:t>Body Level One</a:t>
             </a:r>
@@ -1702,7 +1895,9 @@
       <p:sp>
         <p:nvSpPr>
           <p:cNvPr id="75" name="Shape 39"/>
-          <p:cNvSpPr/>
+          <p:cNvSpPr>
+            <a:spLocks noGrp="1"/>
+          </p:cNvSpPr>
           <p:nvPr>
             <p:ph type="body" sz="half" idx="13"/>
           </p:nvPr>
@@ -1720,14 +1915,16 @@
           <a:bodyPr anchor="ctr"/>
           <a:lstStyle/>
           <a:p>
-            <a:pPr/>
+            <a:endParaRPr/>
           </a:p>
         </p:txBody>
       </p:sp>
       <p:sp>
         <p:nvSpPr>
           <p:cNvPr id="76" name="Slide Number"/>
-          <p:cNvSpPr/>
+          <p:cNvSpPr>
+            <a:spLocks noGrp="1"/>
+          </p:cNvSpPr>
           <p:nvPr>
             <p:ph type="sldNum" sz="quarter" idx="2"/>
           </p:nvPr>
@@ -1741,8 +1938,10 @@
           <a:bodyPr/>
           <a:lstStyle/>
           <a:p>
-            <a:pPr/>
-            <a:fld id="{86CB4B4D-7CA3-9044-876B-883B54F8677D}" type="slidenum"/>
+            <a:fld id="{86CB4B4D-7CA3-9044-876B-883B54F8677D}" type="slidenum">
+              <a:t>‹#›</a:t>
+            </a:fld>
+            <a:endParaRPr/>
           </a:p>
         </p:txBody>
       </p:sp>
@@ -1751,12 +1950,12 @@
   <p:clrMapOvr>
     <a:masterClrMapping/>
   </p:clrMapOvr>
-  <p:transition xmlns:p14="http://schemas.microsoft.com/office/powerpoint/2010/main" spd="med" advClick="1"/>
+  <p:transition spd="med"/>
 </p:sldLayout>
 </file>
 
 <file path=ppt/slideLayouts/slideLayout9.xml><?xml version="1.0" encoding="utf-8"?>
-<p:sldLayout xmlns:a="http://schemas.openxmlformats.org/drawingml/2006/main" xmlns:r="http://schemas.openxmlformats.org/officeDocument/2006/relationships" xmlns:p="http://schemas.openxmlformats.org/presentationml/2006/main" type="tx" showMasterSp="1" showMasterPhAnim="1">
+<p:sldLayout xmlns:a="http://schemas.openxmlformats.org/drawingml/2006/main" xmlns:r="http://schemas.openxmlformats.org/officeDocument/2006/relationships" xmlns:p="http://schemas.openxmlformats.org/presentationml/2006/main" type="tx">
   <p:cSld name="CAPTION_ONLY">
     <p:spTree>
       <p:nvGrpSpPr>
@@ -1775,7 +1974,9 @@
       <p:sp>
         <p:nvSpPr>
           <p:cNvPr id="83" name="Body Level One…"/>
-          <p:cNvSpPr/>
+          <p:cNvSpPr>
+            <a:spLocks noGrp="1"/>
+          </p:cNvSpPr>
           <p:nvPr>
             <p:ph type="body" sz="quarter" idx="1"/>
           </p:nvPr>
@@ -1831,7 +2032,6 @@
             </a:lvl5pPr>
           </a:lstStyle>
           <a:p>
-            <a:pPr/>
             <a:r>
               <a:t>Body Level One</a:t>
             </a:r>
@@ -1865,7 +2065,9 @@
       <p:sp>
         <p:nvSpPr>
           <p:cNvPr id="84" name="Slide Number"/>
-          <p:cNvSpPr/>
+          <p:cNvSpPr>
+            <a:spLocks noGrp="1"/>
+          </p:cNvSpPr>
           <p:nvPr>
             <p:ph type="sldNum" sz="quarter" idx="2"/>
           </p:nvPr>
@@ -1879,8 +2081,10 @@
           <a:bodyPr/>
           <a:lstStyle/>
           <a:p>
-            <a:pPr/>
-            <a:fld id="{86CB4B4D-7CA3-9044-876B-883B54F8677D}" type="slidenum"/>
+            <a:fld id="{86CB4B4D-7CA3-9044-876B-883B54F8677D}" type="slidenum">
+              <a:t>‹#›</a:t>
+            </a:fld>
+            <a:endParaRPr/>
           </a:p>
         </p:txBody>
       </p:sp>
@@ -1889,7 +2093,7 @@
   <p:clrMapOvr>
     <a:masterClrMapping/>
   </p:clrMapOvr>
-  <p:transition xmlns:p14="http://schemas.microsoft.com/office/powerpoint/2010/main" spd="med" advClick="1"/>
+  <p:transition spd="med"/>
 </p:sldLayout>
 </file>
 
@@ -1901,6 +2105,7 @@
         <a:solidFill>
           <a:srgbClr val="FFFFFF"/>
         </a:solidFill>
+        <a:effectLst/>
       </p:bgPr>
     </p:bg>
     <p:spTree>
@@ -1920,7 +2125,9 @@
       <p:sp>
         <p:nvSpPr>
           <p:cNvPr id="2" name="Title Text"/>
-          <p:cNvSpPr/>
+          <p:cNvSpPr>
+            <a:spLocks noGrp="1"/>
+          </p:cNvSpPr>
           <p:nvPr>
             <p:ph type="title"/>
           </p:nvPr>
@@ -1938,17 +2145,16 @@
           </a:ln>
           <a:extLst>
             <a:ext uri="{C572A759-6A51-4108-AA02-DFA0A04FC94B}">
-              <ma14:wrappingTextBoxFlag xmlns:ma14="http://schemas.microsoft.com/office/mac/drawingml/2011/main" val="1"/>
+              <ma14:wrappingTextBoxFlag xmlns:ma14="http://schemas.microsoft.com/office/mac/drawingml/2011/main" xmlns="" val="1"/>
             </a:ext>
           </a:extLst>
         </p:spPr>
         <p:txBody>
           <a:bodyPr lIns="91424" tIns="91424" rIns="91424" bIns="91424">
-            <a:normAutofit fontScale="100000" lnSpcReduction="0"/>
+            <a:normAutofit/>
           </a:bodyPr>
           <a:lstStyle/>
           <a:p>
-            <a:pPr/>
             <a:r>
               <a:t>Title Text</a:t>
             </a:r>
@@ -1958,7 +2164,9 @@
       <p:sp>
         <p:nvSpPr>
           <p:cNvPr id="3" name="Body Level One…"/>
-          <p:cNvSpPr/>
+          <p:cNvSpPr>
+            <a:spLocks noGrp="1"/>
+          </p:cNvSpPr>
           <p:nvPr>
             <p:ph type="body" idx="1"/>
           </p:nvPr>
@@ -1976,17 +2184,16 @@
           </a:ln>
           <a:extLst>
             <a:ext uri="{C572A759-6A51-4108-AA02-DFA0A04FC94B}">
-              <ma14:wrappingTextBoxFlag xmlns:ma14="http://schemas.microsoft.com/office/mac/drawingml/2011/main" val="1"/>
+              <ma14:wrappingTextBoxFlag xmlns:ma14="http://schemas.microsoft.com/office/mac/drawingml/2011/main" xmlns="" val="1"/>
             </a:ext>
           </a:extLst>
         </p:spPr>
         <p:txBody>
           <a:bodyPr lIns="91424" tIns="91424" rIns="91424" bIns="91424">
-            <a:normAutofit fontScale="100000" lnSpcReduction="0"/>
+            <a:normAutofit/>
           </a:bodyPr>
           <a:lstStyle/>
           <a:p>
-            <a:pPr/>
             <a:r>
               <a:t>Body Level One</a:t>
             </a:r>
@@ -2020,7 +2227,9 @@
       <p:sp>
         <p:nvSpPr>
           <p:cNvPr id="4" name="Slide Number"/>
-          <p:cNvSpPr/>
+          <p:cNvSpPr>
+            <a:spLocks noGrp="1"/>
+          </p:cNvSpPr>
           <p:nvPr>
             <p:ph type="sldNum" sz="quarter" idx="2"/>
           </p:nvPr>
@@ -2053,8 +2262,10 @@
             </a:lvl1pPr>
           </a:lstStyle>
           <a:p>
-            <a:pPr/>
-            <a:fld id="{86CB4B4D-7CA3-9044-876B-883B54F8677D}" type="slidenum"/>
+            <a:fld id="{86CB4B4D-7CA3-9044-876B-883B54F8677D}" type="slidenum">
+              <a:t>‹#›</a:t>
+            </a:fld>
+            <a:endParaRPr/>
           </a:p>
         </p:txBody>
       </p:sp>
@@ -2062,19 +2273,19 @@
   </p:cSld>
   <p:clrMap bg1="lt1" tx1="dk1" bg2="lt2" tx2="dk2" accent1="accent1" accent2="accent2" accent3="accent3" accent4="accent4" accent5="accent5" accent6="accent6" hlink="hlink" folHlink="folHlink"/>
   <p:sldLayoutIdLst>
-    <p:sldLayoutId id="2147483649" r:id="rId2"/>
-    <p:sldLayoutId id="2147483650" r:id="rId3"/>
-    <p:sldLayoutId id="2147483651" r:id="rId4"/>
-    <p:sldLayoutId id="2147483652" r:id="rId5"/>
-    <p:sldLayoutId id="2147483653" r:id="rId6"/>
-    <p:sldLayoutId id="2147483654" r:id="rId7"/>
-    <p:sldLayoutId id="2147483655" r:id="rId8"/>
-    <p:sldLayoutId id="2147483656" r:id="rId9"/>
-    <p:sldLayoutId id="2147483657" r:id="rId10"/>
-    <p:sldLayoutId id="2147483658" r:id="rId11"/>
-    <p:sldLayoutId id="2147483659" r:id="rId12"/>
+    <p:sldLayoutId id="2147483649" r:id="rId1"/>
+    <p:sldLayoutId id="2147483650" r:id="rId2"/>
+    <p:sldLayoutId id="2147483651" r:id="rId3"/>
+    <p:sldLayoutId id="2147483652" r:id="rId4"/>
+    <p:sldLayoutId id="2147483653" r:id="rId5"/>
+    <p:sldLayoutId id="2147483654" r:id="rId6"/>
+    <p:sldLayoutId id="2147483655" r:id="rId7"/>
+    <p:sldLayoutId id="2147483656" r:id="rId8"/>
+    <p:sldLayoutId id="2147483657" r:id="rId9"/>
+    <p:sldLayoutId id="2147483658" r:id="rId10"/>
+    <p:sldLayoutId id="2147483659" r:id="rId11"/>
   </p:sldLayoutIdLst>
-  <p:transition xmlns:p14="http://schemas.microsoft.com/office/powerpoint/2010/main" spd="med" advClick="1"/>
+  <p:transition spd="med"/>
   <p:txStyles>
     <p:titleStyle>
       <a:lvl1pPr marL="0" marR="0" indent="0" algn="l" defTabSz="914400" rtl="0" latinLnBrk="0">
@@ -2092,7 +2303,7 @@
         <a:buFontTx/>
         <a:buNone/>
         <a:tabLst/>
-        <a:defRPr b="0" baseline="0" cap="none" i="0" spc="0" strike="noStrike" sz="2800" u="none">
+        <a:defRPr sz="2800" b="0" i="0" u="none" strike="noStrike" cap="none" spc="0" baseline="0">
           <a:ln>
             <a:noFill/>
           </a:ln>
@@ -2121,7 +2332,7 @@
         <a:buFontTx/>
         <a:buNone/>
         <a:tabLst/>
-        <a:defRPr b="0" baseline="0" cap="none" i="0" spc="0" strike="noStrike" sz="2800" u="none">
+        <a:defRPr sz="2800" b="0" i="0" u="none" strike="noStrike" cap="none" spc="0" baseline="0">
           <a:ln>
             <a:noFill/>
           </a:ln>
@@ -2150,7 +2361,7 @@
         <a:buFontTx/>
         <a:buNone/>
         <a:tabLst/>
-        <a:defRPr b="0" baseline="0" cap="none" i="0" spc="0" strike="noStrike" sz="2800" u="none">
+        <a:defRPr sz="2800" b="0" i="0" u="none" strike="noStrike" cap="none" spc="0" baseline="0">
           <a:ln>
             <a:noFill/>
           </a:ln>
@@ -2179,7 +2390,7 @@
         <a:buFontTx/>
         <a:buNone/>
         <a:tabLst/>
-        <a:defRPr b="0" baseline="0" cap="none" i="0" spc="0" strike="noStrike" sz="2800" u="none">
+        <a:defRPr sz="2800" b="0" i="0" u="none" strike="noStrike" cap="none" spc="0" baseline="0">
           <a:ln>
             <a:noFill/>
           </a:ln>
@@ -2208,7 +2419,7 @@
         <a:buFontTx/>
         <a:buNone/>
         <a:tabLst/>
-        <a:defRPr b="0" baseline="0" cap="none" i="0" spc="0" strike="noStrike" sz="2800" u="none">
+        <a:defRPr sz="2800" b="0" i="0" u="none" strike="noStrike" cap="none" spc="0" baseline="0">
           <a:ln>
             <a:noFill/>
           </a:ln>
@@ -2237,7 +2448,7 @@
         <a:buFontTx/>
         <a:buNone/>
         <a:tabLst/>
-        <a:defRPr b="0" baseline="0" cap="none" i="0" spc="0" strike="noStrike" sz="2800" u="none">
+        <a:defRPr sz="2800" b="0" i="0" u="none" strike="noStrike" cap="none" spc="0" baseline="0">
           <a:ln>
             <a:noFill/>
           </a:ln>
@@ -2266,7 +2477,7 @@
         <a:buFontTx/>
         <a:buNone/>
         <a:tabLst/>
-        <a:defRPr b="0" baseline="0" cap="none" i="0" spc="0" strike="noStrike" sz="2800" u="none">
+        <a:defRPr sz="2800" b="0" i="0" u="none" strike="noStrike" cap="none" spc="0" baseline="0">
           <a:ln>
             <a:noFill/>
           </a:ln>
@@ -2295,7 +2506,7 @@
         <a:buFontTx/>
         <a:buNone/>
         <a:tabLst/>
-        <a:defRPr b="0" baseline="0" cap="none" i="0" spc="0" strike="noStrike" sz="2800" u="none">
+        <a:defRPr sz="2800" b="0" i="0" u="none" strike="noStrike" cap="none" spc="0" baseline="0">
           <a:ln>
             <a:noFill/>
           </a:ln>
@@ -2324,7 +2535,7 @@
         <a:buFontTx/>
         <a:buNone/>
         <a:tabLst/>
-        <a:defRPr b="0" baseline="0" cap="none" i="0" spc="0" strike="noStrike" sz="2800" u="none">
+        <a:defRPr sz="2800" b="0" i="0" u="none" strike="noStrike" cap="none" spc="0" baseline="0">
           <a:ln>
             <a:noFill/>
           </a:ln>
@@ -2359,7 +2570,7 @@
         <a:buFont typeface="Arial"/>
         <a:buChar char="●"/>
         <a:tabLst/>
-        <a:defRPr b="0" baseline="0" cap="none" i="0" spc="0" strike="noStrike" sz="1800" u="none">
+        <a:defRPr sz="1800" b="0" i="0" u="none" strike="noStrike" cap="none" spc="0" baseline="0">
           <a:ln>
             <a:noFill/>
           </a:ln>
@@ -2394,7 +2605,7 @@
         <a:buFont typeface="Arial"/>
         <a:buChar char="○"/>
         <a:tabLst/>
-        <a:defRPr b="0" baseline="0" cap="none" i="0" spc="0" strike="noStrike" sz="1800" u="none">
+        <a:defRPr sz="1800" b="0" i="0" u="none" strike="noStrike" cap="none" spc="0" baseline="0">
           <a:ln>
             <a:noFill/>
           </a:ln>
@@ -2429,7 +2640,7 @@
         <a:buFont typeface="Arial"/>
         <a:buChar char="■"/>
         <a:tabLst/>
-        <a:defRPr b="0" baseline="0" cap="none" i="0" spc="0" strike="noStrike" sz="1800" u="none">
+        <a:defRPr sz="1800" b="0" i="0" u="none" strike="noStrike" cap="none" spc="0" baseline="0">
           <a:ln>
             <a:noFill/>
           </a:ln>
@@ -2464,7 +2675,7 @@
         <a:buFont typeface="Arial"/>
         <a:buChar char="●"/>
         <a:tabLst/>
-        <a:defRPr b="0" baseline="0" cap="none" i="0" spc="0" strike="noStrike" sz="1800" u="none">
+        <a:defRPr sz="1800" b="0" i="0" u="none" strike="noStrike" cap="none" spc="0" baseline="0">
           <a:ln>
             <a:noFill/>
           </a:ln>
@@ -2499,7 +2710,7 @@
         <a:buFont typeface="Arial"/>
         <a:buChar char="○"/>
         <a:tabLst/>
-        <a:defRPr b="0" baseline="0" cap="none" i="0" spc="0" strike="noStrike" sz="1800" u="none">
+        <a:defRPr sz="1800" b="0" i="0" u="none" strike="noStrike" cap="none" spc="0" baseline="0">
           <a:ln>
             <a:noFill/>
           </a:ln>
@@ -2534,7 +2745,7 @@
         <a:buFont typeface="Arial"/>
         <a:buChar char="■"/>
         <a:tabLst/>
-        <a:defRPr b="0" baseline="0" cap="none" i="0" spc="0" strike="noStrike" sz="1800" u="none">
+        <a:defRPr sz="1800" b="0" i="0" u="none" strike="noStrike" cap="none" spc="0" baseline="0">
           <a:ln>
             <a:noFill/>
           </a:ln>
@@ -2569,7 +2780,7 @@
         <a:buFont typeface="Arial"/>
         <a:buChar char="●"/>
         <a:tabLst/>
-        <a:defRPr b="0" baseline="0" cap="none" i="0" spc="0" strike="noStrike" sz="1800" u="none">
+        <a:defRPr sz="1800" b="0" i="0" u="none" strike="noStrike" cap="none" spc="0" baseline="0">
           <a:ln>
             <a:noFill/>
           </a:ln>
@@ -2604,7 +2815,7 @@
         <a:buFont typeface="Arial"/>
         <a:buChar char="○"/>
         <a:tabLst/>
-        <a:defRPr b="0" baseline="0" cap="none" i="0" spc="0" strike="noStrike" sz="1800" u="none">
+        <a:defRPr sz="1800" b="0" i="0" u="none" strike="noStrike" cap="none" spc="0" baseline="0">
           <a:ln>
             <a:noFill/>
           </a:ln>
@@ -2639,7 +2850,7 @@
         <a:buFont typeface="Arial"/>
         <a:buChar char="■"/>
         <a:tabLst/>
-        <a:defRPr b="0" baseline="0" cap="none" i="0" spc="0" strike="noStrike" sz="1800" u="none">
+        <a:defRPr sz="1800" b="0" i="0" u="none" strike="noStrike" cap="none" spc="0" baseline="0">
           <a:ln>
             <a:noFill/>
           </a:ln>
@@ -2672,7 +2883,7 @@
         <a:buFontTx/>
         <a:buNone/>
         <a:tabLst/>
-        <a:defRPr b="0" baseline="0" cap="none" i="0" spc="0" strike="noStrike" sz="1000" u="none">
+        <a:defRPr sz="1000" b="0" i="0" u="none" strike="noStrike" cap="none" spc="0" baseline="0">
           <a:ln>
             <a:noFill/>
           </a:ln>
@@ -2701,7 +2912,7 @@
         <a:buFontTx/>
         <a:buNone/>
         <a:tabLst/>
-        <a:defRPr b="0" baseline="0" cap="none" i="0" spc="0" strike="noStrike" sz="1000" u="none">
+        <a:defRPr sz="1000" b="0" i="0" u="none" strike="noStrike" cap="none" spc="0" baseline="0">
           <a:ln>
             <a:noFill/>
           </a:ln>
@@ -2730,7 +2941,7 @@
         <a:buFontTx/>
         <a:buNone/>
         <a:tabLst/>
-        <a:defRPr b="0" baseline="0" cap="none" i="0" spc="0" strike="noStrike" sz="1000" u="none">
+        <a:defRPr sz="1000" b="0" i="0" u="none" strike="noStrike" cap="none" spc="0" baseline="0">
           <a:ln>
             <a:noFill/>
           </a:ln>
@@ -2759,7 +2970,7 @@
         <a:buFontTx/>
         <a:buNone/>
         <a:tabLst/>
-        <a:defRPr b="0" baseline="0" cap="none" i="0" spc="0" strike="noStrike" sz="1000" u="none">
+        <a:defRPr sz="1000" b="0" i="0" u="none" strike="noStrike" cap="none" spc="0" baseline="0">
           <a:ln>
             <a:noFill/>
           </a:ln>
@@ -2788,7 +2999,7 @@
         <a:buFontTx/>
         <a:buNone/>
         <a:tabLst/>
-        <a:defRPr b="0" baseline="0" cap="none" i="0" spc="0" strike="noStrike" sz="1000" u="none">
+        <a:defRPr sz="1000" b="0" i="0" u="none" strike="noStrike" cap="none" spc="0" baseline="0">
           <a:ln>
             <a:noFill/>
           </a:ln>
@@ -2817,7 +3028,7 @@
         <a:buFontTx/>
         <a:buNone/>
         <a:tabLst/>
-        <a:defRPr b="0" baseline="0" cap="none" i="0" spc="0" strike="noStrike" sz="1000" u="none">
+        <a:defRPr sz="1000" b="0" i="0" u="none" strike="noStrike" cap="none" spc="0" baseline="0">
           <a:ln>
             <a:noFill/>
           </a:ln>
@@ -2846,7 +3057,7 @@
         <a:buFontTx/>
         <a:buNone/>
         <a:tabLst/>
-        <a:defRPr b="0" baseline="0" cap="none" i="0" spc="0" strike="noStrike" sz="1000" u="none">
+        <a:defRPr sz="1000" b="0" i="0" u="none" strike="noStrike" cap="none" spc="0" baseline="0">
           <a:ln>
             <a:noFill/>
           </a:ln>
@@ -2875,7 +3086,7 @@
         <a:buFontTx/>
         <a:buNone/>
         <a:tabLst/>
-        <a:defRPr b="0" baseline="0" cap="none" i="0" spc="0" strike="noStrike" sz="1000" u="none">
+        <a:defRPr sz="1000" b="0" i="0" u="none" strike="noStrike" cap="none" spc="0" baseline="0">
           <a:ln>
             <a:noFill/>
           </a:ln>
@@ -2904,7 +3115,7 @@
         <a:buFontTx/>
         <a:buNone/>
         <a:tabLst/>
-        <a:defRPr b="0" baseline="0" cap="none" i="0" spc="0" strike="noStrike" sz="1000" u="none">
+        <a:defRPr sz="1000" b="0" i="0" u="none" strike="noStrike" cap="none" spc="0" baseline="0">
           <a:ln>
             <a:noFill/>
           </a:ln>
@@ -2924,7 +3135,7 @@
 </file>
 
 <file path=ppt/slides/slide1.xml><?xml version="1.0" encoding="utf-8"?>
-<p:sld xmlns:a="http://schemas.openxmlformats.org/drawingml/2006/main" xmlns:r="http://schemas.openxmlformats.org/officeDocument/2006/relationships" xmlns:p="http://schemas.openxmlformats.org/presentationml/2006/main" showMasterSp="1" showMasterPhAnim="1">
+<p:sld xmlns:a="http://schemas.openxmlformats.org/drawingml/2006/main" xmlns:r="http://schemas.openxmlformats.org/officeDocument/2006/relationships" xmlns:p="http://schemas.openxmlformats.org/presentationml/2006/main">
   <p:cSld>
     <p:spTree>
       <p:nvGrpSpPr>
@@ -2947,7 +3158,7 @@
           <p:nvPr/>
         </p:nvSpPr>
         <p:spPr>
-          <a:xfrm flipH="1" rot="10800000">
+          <a:xfrm rot="10800000" flipH="1">
             <a:off x="-1" y="0"/>
             <a:ext cx="9163201" cy="5148001"/>
           </a:xfrm>
@@ -2971,7 +3182,7 @@
             </a:cxnLst>
             <a:rect l="0" t="0" r="r" b="b"/>
             <a:pathLst>
-              <a:path w="21600" h="21600" fill="norm" stroke="1" extrusionOk="0">
+              <a:path w="21600" h="21600" extrusionOk="0">
                 <a:moveTo>
                   <a:pt x="0" y="0"/>
                 </a:moveTo>
@@ -3010,7 +3221,7 @@
           <a:bodyPr lIns="45719" rIns="45719" anchor="ctr"/>
           <a:lstStyle/>
           <a:p>
-            <a:pPr/>
+            <a:endParaRPr/>
           </a:p>
         </p:txBody>
       </p:sp>
@@ -3033,7 +3244,7 @@
           </a:ln>
           <a:extLst>
             <a:ext uri="{C572A759-6A51-4108-AA02-DFA0A04FC94B}">
-              <ma14:wrappingTextBoxFlag xmlns:ma14="http://schemas.microsoft.com/office/mac/drawingml/2011/main" val="1"/>
+              <ma14:wrappingTextBoxFlag xmlns:ma14="http://schemas.microsoft.com/office/mac/drawingml/2011/main" xmlns="" val="1"/>
             </a:ext>
           </a:extLst>
         </p:spPr>
@@ -3055,7 +3266,6 @@
             </a:lvl1pPr>
           </a:lstStyle>
           <a:p>
-            <a:pPr/>
             <a:r>
               <a:t>Sprocket Central Pty Ltd</a:t>
             </a:r>
@@ -3070,7 +3280,7 @@
         </p:nvSpPr>
         <p:spPr>
           <a:xfrm>
-            <a:off x="537900" y="3315475"/>
+            <a:off x="498099" y="3196370"/>
             <a:ext cx="5550600" cy="525751"/>
           </a:xfrm>
           <a:prstGeom prst="rect">
@@ -3081,7 +3291,7 @@
           </a:ln>
           <a:extLst>
             <a:ext uri="{C572A759-6A51-4108-AA02-DFA0A04FC94B}">
-              <ma14:wrappingTextBoxFlag xmlns:ma14="http://schemas.microsoft.com/office/mac/drawingml/2011/main" val="1"/>
+              <ma14:wrappingTextBoxFlag xmlns:ma14="http://schemas.microsoft.com/office/mac/drawingml/2011/main" xmlns="" val="1"/>
             </a:ext>
           </a:extLst>
         </p:spPr>
@@ -3103,7 +3313,6 @@
             </a:lvl1pPr>
           </a:lstStyle>
           <a:p>
-            <a:pPr/>
             <a:r>
               <a:t>Data analytics approach</a:t>
             </a:r>
@@ -3119,9 +3328,7 @@
           <p:nvPr/>
         </p:nvPicPr>
         <p:blipFill>
-          <a:blip r:embed="rId2">
-            <a:extLst/>
-          </a:blip>
+          <a:blip r:embed="rId2"/>
           <a:stretch>
             <a:fillRect/>
           </a:stretch>
@@ -3148,7 +3355,7 @@
         <p:spPr>
           <a:xfrm>
             <a:off x="537900" y="3666599"/>
-            <a:ext cx="6249600" cy="398751"/>
+            <a:ext cx="6249600" cy="369300"/>
           </a:xfrm>
           <a:prstGeom prst="rect">
             <a:avLst/>
@@ -3158,7 +3365,7 @@
           </a:ln>
           <a:extLst>
             <a:ext uri="{C572A759-6A51-4108-AA02-DFA0A04FC94B}">
-              <ma14:wrappingTextBoxFlag xmlns:ma14="http://schemas.microsoft.com/office/mac/drawingml/2011/main" val="1"/>
+              <ma14:wrappingTextBoxFlag xmlns:ma14="http://schemas.microsoft.com/office/mac/drawingml/2011/main" xmlns="" val="1"/>
             </a:ext>
           </a:extLst>
         </p:spPr>
@@ -3180,10 +3387,19 @@
             </a:lvl1pPr>
           </a:lstStyle>
           <a:p>
-            <a:pPr/>
-            <a:r>
-              <a:t>[Division Name] - [Engagement Manager], [Senior Consultant], [Junior Consultant]</a:t>
-            </a:r>
+            <a:r>
+              <a:rPr lang="en-US" dirty="0"/>
+              <a:t>Thomas </a:t>
+            </a:r>
+            <a:r>
+              <a:rPr lang="en-US" dirty="0" err="1"/>
+              <a:t>Winson</a:t>
+            </a:r>
+            <a:r>
+              <a:rPr lang="en-US" dirty="0"/>
+              <a:t> - Intern</a:t>
+            </a:r>
+            <a:endParaRPr dirty="0"/>
           </a:p>
         </p:txBody>
       </p:sp>
@@ -3209,7 +3425,7 @@
           </a:ln>
           <a:extLst>
             <a:ext uri="{C572A759-6A51-4108-AA02-DFA0A04FC94B}">
-              <ma14:wrappingTextBoxFlag xmlns:ma14="http://schemas.microsoft.com/office/mac/drawingml/2011/main" val="1"/>
+              <ma14:wrappingTextBoxFlag xmlns:ma14="http://schemas.microsoft.com/office/mac/drawingml/2011/main" xmlns="" val="1"/>
             </a:ext>
           </a:extLst>
         </p:spPr>
@@ -3218,7 +3434,7 @@
           <a:lstStyle/>
           <a:p>
             <a:pPr defTabSz="457200">
-              <a:defRPr b="1" sz="500">
+              <a:defRPr sz="500" b="1">
                 <a:latin typeface="Calibri"/>
                 <a:ea typeface="Calibri"/>
                 <a:cs typeface="Calibri"/>
@@ -3240,12 +3456,213 @@
   <p:clrMapOvr>
     <a:masterClrMapping/>
   </p:clrMapOvr>
-  <p:transition xmlns:p14="http://schemas.microsoft.com/office/powerpoint/2010/main" spd="med" advClick="1"/>
+  <p:transition spd="med"/>
+</p:sld>
+</file>
+
+<file path=ppt/slides/slide10.xml><?xml version="1.0" encoding="utf-8"?>
+<p:sld xmlns:a="http://schemas.openxmlformats.org/drawingml/2006/main" xmlns:r="http://schemas.openxmlformats.org/officeDocument/2006/relationships" xmlns:p="http://schemas.openxmlformats.org/presentationml/2006/main">
+  <p:cSld>
+    <p:spTree>
+      <p:nvGrpSpPr>
+        <p:cNvPr id="1" name=""/>
+        <p:cNvGrpSpPr/>
+        <p:nvPr/>
+      </p:nvGrpSpPr>
+      <p:grpSpPr>
+        <a:xfrm>
+          <a:off x="0" y="0"/>
+          <a:ext cx="0" cy="0"/>
+          <a:chOff x="0" y="0"/>
+          <a:chExt cx="0" cy="0"/>
+        </a:xfrm>
+      </p:grpSpPr>
+      <p:sp>
+        <p:nvSpPr>
+          <p:cNvPr id="161" name="Shape 113"/>
+          <p:cNvSpPr/>
+          <p:nvPr/>
+        </p:nvSpPr>
+        <p:spPr>
+          <a:xfrm>
+            <a:off x="-15501" y="-19475"/>
+            <a:ext cx="9191402" cy="840000"/>
+          </a:xfrm>
+          <a:prstGeom prst="rect">
+            <a:avLst/>
+          </a:prstGeom>
+          <a:gradFill>
+            <a:gsLst>
+              <a:gs pos="0">
+                <a:srgbClr val="1077D2"/>
+              </a:gs>
+              <a:gs pos="100000">
+                <a:srgbClr val="093153"/>
+              </a:gs>
+            </a:gsLst>
+            <a:lin ang="12000143"/>
+          </a:gradFill>
+          <a:ln w="12700">
+            <a:miter lim="400000"/>
+          </a:ln>
+        </p:spPr>
+        <p:txBody>
+          <a:bodyPr lIns="45719" rIns="45719" anchor="ctr"/>
+          <a:lstStyle/>
+          <a:p>
+            <a:endParaRPr/>
+          </a:p>
+        </p:txBody>
+      </p:sp>
+      <p:sp>
+        <p:nvSpPr>
+          <p:cNvPr id="162" name="Shape 114"/>
+          <p:cNvSpPr/>
+          <p:nvPr/>
+        </p:nvSpPr>
+        <p:spPr>
+          <a:xfrm>
+            <a:off x="205025" y="263974"/>
+            <a:ext cx="8565600" cy="758742"/>
+          </a:xfrm>
+          <a:prstGeom prst="rect">
+            <a:avLst/>
+          </a:prstGeom>
+          <a:ln w="12700">
+            <a:miter lim="400000"/>
+          </a:ln>
+          <a:extLst>
+            <a:ext uri="{C572A759-6A51-4108-AA02-DFA0A04FC94B}">
+              <ma14:wrappingTextBoxFlag xmlns:ma14="http://schemas.microsoft.com/office/mac/drawingml/2011/main" xmlns="" val="1"/>
+            </a:ext>
+          </a:extLst>
+        </p:spPr>
+        <p:txBody>
+          <a:bodyPr lIns="91424" tIns="91424" rIns="91424" bIns="91424">
+            <a:spAutoFit/>
+          </a:bodyPr>
+          <a:lstStyle>
+            <a:lvl1pPr>
+              <a:defRPr sz="2000" b="1">
+                <a:solidFill>
+                  <a:srgbClr val="FFFFFF"/>
+                </a:solidFill>
+              </a:defRPr>
+            </a:lvl1pPr>
+          </a:lstStyle>
+          <a:p>
+            <a:r>
+              <a:t>Appendix</a:t>
+            </a:r>
+          </a:p>
+        </p:txBody>
+      </p:sp>
+      <p:sp>
+        <p:nvSpPr>
+          <p:cNvPr id="163" name="Shape 115"/>
+          <p:cNvSpPr/>
+          <p:nvPr/>
+        </p:nvSpPr>
+        <p:spPr>
+          <a:xfrm>
+            <a:off x="205025" y="1083299"/>
+            <a:ext cx="8565600" cy="920086"/>
+          </a:xfrm>
+          <a:prstGeom prst="rect">
+            <a:avLst/>
+          </a:prstGeom>
+          <a:ln w="12700">
+            <a:miter lim="400000"/>
+          </a:ln>
+          <a:extLst>
+            <a:ext uri="{C572A759-6A51-4108-AA02-DFA0A04FC94B}">
+              <ma14:wrappingTextBoxFlag xmlns:ma14="http://schemas.microsoft.com/office/mac/drawingml/2011/main" xmlns="" val="1"/>
+            </a:ext>
+          </a:extLst>
+        </p:spPr>
+        <p:txBody>
+          <a:bodyPr lIns="91424" tIns="91424" rIns="91424" bIns="91424">
+            <a:spAutoFit/>
+          </a:bodyPr>
+          <a:lstStyle>
+            <a:lvl1pPr>
+              <a:lnSpc>
+                <a:spcPct val="115000"/>
+              </a:lnSpc>
+              <a:defRPr sz="2000" b="1">
+                <a:latin typeface="Open Sans"/>
+                <a:ea typeface="Open Sans"/>
+                <a:cs typeface="Open Sans"/>
+                <a:sym typeface="Open Sans"/>
+              </a:defRPr>
+            </a:lvl1pPr>
+          </a:lstStyle>
+          <a:p>
+            <a:r>
+              <a:t>This is an optional slide where you may place any supporting items.</a:t>
+            </a:r>
+          </a:p>
+        </p:txBody>
+      </p:sp>
+      <p:sp>
+        <p:nvSpPr>
+          <p:cNvPr id="164" name="Note: The data and information in this document is reflective of a hypothetical situation and client. This document is to be used for KPMG Virtual Internship purposes only."/>
+          <p:cNvSpPr/>
+          <p:nvPr/>
+        </p:nvSpPr>
+        <p:spPr>
+          <a:xfrm>
+            <a:off x="-6201" y="-6350"/>
+            <a:ext cx="9175601" cy="238700"/>
+          </a:xfrm>
+          <a:prstGeom prst="rect">
+            <a:avLst/>
+          </a:prstGeom>
+          <a:solidFill>
+            <a:schemeClr val="accent3"/>
+          </a:solidFill>
+          <a:ln w="12700">
+            <a:miter lim="400000"/>
+          </a:ln>
+          <a:extLst>
+            <a:ext uri="{C572A759-6A51-4108-AA02-DFA0A04FC94B}">
+              <ma14:wrappingTextBoxFlag xmlns:ma14="http://schemas.microsoft.com/office/mac/drawingml/2011/main" xmlns="" val="1"/>
+            </a:ext>
+          </a:extLst>
+        </p:spPr>
+        <p:txBody>
+          <a:bodyPr lIns="45719" rIns="45719" anchor="ctr"/>
+          <a:lstStyle/>
+          <a:p>
+            <a:pPr defTabSz="457200">
+              <a:defRPr sz="500" b="1">
+                <a:latin typeface="Calibri"/>
+                <a:ea typeface="Calibri"/>
+                <a:cs typeface="Calibri"/>
+                <a:sym typeface="Calibri"/>
+              </a:defRPr>
+            </a:pPr>
+            <a:r>
+              <a:t>       Note: </a:t>
+            </a:r>
+            <a:r>
+              <a:rPr b="0"/>
+              <a:t>The data and information in this document is reflective of a hypothetical situation and client. This document is to be used for KPMG Virtual Internship purposes only. </a:t>
+            </a:r>
+          </a:p>
+        </p:txBody>
+      </p:sp>
+    </p:spTree>
+  </p:cSld>
+  <p:clrMapOvr>
+    <a:masterClrMapping/>
+  </p:clrMapOvr>
+  <p:transition spd="med"/>
 </p:sld>
 </file>
 
 <file path=ppt/slides/slide2.xml><?xml version="1.0" encoding="utf-8"?>
-<p:sld xmlns:a="http://schemas.openxmlformats.org/drawingml/2006/main" xmlns:r="http://schemas.openxmlformats.org/officeDocument/2006/relationships" xmlns:p="http://schemas.openxmlformats.org/presentationml/2006/main" showMasterSp="1" showMasterPhAnim="1">
+<p:sld xmlns:a="http://schemas.openxmlformats.org/drawingml/2006/main" xmlns:r="http://schemas.openxmlformats.org/officeDocument/2006/relationships" xmlns:p="http://schemas.openxmlformats.org/presentationml/2006/main">
   <p:cSld>
     <p:spTree>
       <p:nvGrpSpPr>
@@ -3294,7 +3711,7 @@
           <a:bodyPr lIns="45719" rIns="45719" anchor="ctr"/>
           <a:lstStyle/>
           <a:p>
-            <a:pPr/>
+            <a:endParaRPr/>
           </a:p>
         </p:txBody>
       </p:sp>
@@ -3317,7 +3734,7 @@
           </a:ln>
           <a:extLst>
             <a:ext uri="{C572A759-6A51-4108-AA02-DFA0A04FC94B}">
-              <ma14:wrappingTextBoxFlag xmlns:ma14="http://schemas.microsoft.com/office/mac/drawingml/2011/main" val="1"/>
+              <ma14:wrappingTextBoxFlag xmlns:ma14="http://schemas.microsoft.com/office/mac/drawingml/2011/main" xmlns="" val="1"/>
             </a:ext>
           </a:extLst>
         </p:spPr>
@@ -3327,7 +3744,7 @@
           </a:bodyPr>
           <a:lstStyle>
             <a:lvl1pPr>
-              <a:defRPr b="1" sz="2000">
+              <a:defRPr sz="2000" b="1">
                 <a:solidFill>
                   <a:srgbClr val="FFFFFF"/>
                 </a:solidFill>
@@ -3335,7 +3752,6 @@
             </a:lvl1pPr>
           </a:lstStyle>
           <a:p>
-            <a:pPr/>
             <a:r>
               <a:t>Agenda</a:t>
             </a:r>
@@ -3361,7 +3777,7 @@
           </a:ln>
           <a:extLst>
             <a:ext uri="{C572A759-6A51-4108-AA02-DFA0A04FC94B}">
-              <ma14:wrappingTextBoxFlag xmlns:ma14="http://schemas.microsoft.com/office/mac/drawingml/2011/main" val="1"/>
+              <ma14:wrappingTextBoxFlag xmlns:ma14="http://schemas.microsoft.com/office/mac/drawingml/2011/main" xmlns="" val="1"/>
             </a:ext>
           </a:extLst>
         </p:spPr>
@@ -3379,7 +3795,7 @@
                 <a:srgbClr val="000000"/>
               </a:buClr>
               <a:buSzPts val="2000"/>
-              <a:buAutoNum type="arabicPeriod" startAt="1"/>
+              <a:buAutoNum type="arabicPeriod"/>
               <a:defRPr sz="2000">
                 <a:latin typeface="Open Sans"/>
                 <a:ea typeface="Open Sans"/>
@@ -3400,7 +3816,7 @@
                 <a:srgbClr val="000000"/>
               </a:buClr>
               <a:buSzPts val="2000"/>
-              <a:buAutoNum type="arabicPeriod" startAt="1"/>
+              <a:buAutoNum type="arabicPeriod"/>
               <a:defRPr sz="2000">
                 <a:latin typeface="Open Sans"/>
                 <a:ea typeface="Open Sans"/>
@@ -3421,7 +3837,7 @@
                 <a:srgbClr val="000000"/>
               </a:buClr>
               <a:buSzPts val="2000"/>
-              <a:buAutoNum type="arabicPeriod" startAt="1"/>
+              <a:buAutoNum type="arabicPeriod"/>
               <a:defRPr sz="2000">
                 <a:latin typeface="Open Sans"/>
                 <a:ea typeface="Open Sans"/>
@@ -3442,7 +3858,7 @@
                 <a:srgbClr val="000000"/>
               </a:buClr>
               <a:buSzPts val="2000"/>
-              <a:buAutoNum type="arabicPeriod" startAt="1"/>
+              <a:buAutoNum type="arabicPeriod"/>
               <a:defRPr sz="2000">
                 <a:latin typeface="Open Sans"/>
                 <a:ea typeface="Open Sans"/>
@@ -3478,7 +3894,7 @@
           </a:ln>
           <a:extLst>
             <a:ext uri="{C572A759-6A51-4108-AA02-DFA0A04FC94B}">
-              <ma14:wrappingTextBoxFlag xmlns:ma14="http://schemas.microsoft.com/office/mac/drawingml/2011/main" val="1"/>
+              <ma14:wrappingTextBoxFlag xmlns:ma14="http://schemas.microsoft.com/office/mac/drawingml/2011/main" xmlns="" val="1"/>
             </a:ext>
           </a:extLst>
         </p:spPr>
@@ -3487,7 +3903,7 @@
           <a:lstStyle/>
           <a:p>
             <a:pPr defTabSz="457200">
-              <a:defRPr b="1" sz="500">
+              <a:defRPr sz="500" b="1">
                 <a:latin typeface="Calibri"/>
                 <a:ea typeface="Calibri"/>
                 <a:cs typeface="Calibri"/>
@@ -3509,12 +3925,12 @@
   <p:clrMapOvr>
     <a:masterClrMapping/>
   </p:clrMapOvr>
-  <p:transition xmlns:p14="http://schemas.microsoft.com/office/powerpoint/2010/main" spd="med" advClick="1"/>
+  <p:transition spd="med"/>
 </p:sld>
 </file>
 
 <file path=ppt/slides/slide3.xml><?xml version="1.0" encoding="utf-8"?>
-<p:sld xmlns:a="http://schemas.openxmlformats.org/drawingml/2006/main" xmlns:r="http://schemas.openxmlformats.org/officeDocument/2006/relationships" xmlns:p="http://schemas.openxmlformats.org/presentationml/2006/main" showMasterSp="1" showMasterPhAnim="1">
+<p:sld xmlns:a="http://schemas.openxmlformats.org/drawingml/2006/main" xmlns:r="http://schemas.openxmlformats.org/officeDocument/2006/relationships" xmlns:p="http://schemas.openxmlformats.org/presentationml/2006/main">
   <p:cSld>
     <p:spTree>
       <p:nvGrpSpPr>
@@ -3563,7 +3979,7 @@
           <a:bodyPr lIns="45719" rIns="45719" anchor="ctr"/>
           <a:lstStyle/>
           <a:p>
-            <a:pPr/>
+            <a:endParaRPr/>
           </a:p>
         </p:txBody>
       </p:sp>
@@ -3586,7 +4002,7 @@
           </a:ln>
           <a:extLst>
             <a:ext uri="{C572A759-6A51-4108-AA02-DFA0A04FC94B}">
-              <ma14:wrappingTextBoxFlag xmlns:ma14="http://schemas.microsoft.com/office/mac/drawingml/2011/main" val="1"/>
+              <ma14:wrappingTextBoxFlag xmlns:ma14="http://schemas.microsoft.com/office/mac/drawingml/2011/main" xmlns="" val="1"/>
             </a:ext>
           </a:extLst>
         </p:spPr>
@@ -3596,7 +4012,7 @@
           </a:bodyPr>
           <a:lstStyle>
             <a:lvl1pPr>
-              <a:defRPr b="1" sz="2000">
+              <a:defRPr sz="2000" b="1">
                 <a:solidFill>
                   <a:srgbClr val="FFFFFF"/>
                 </a:solidFill>
@@ -3604,7 +4020,6 @@
             </a:lvl1pPr>
           </a:lstStyle>
           <a:p>
-            <a:pPr/>
             <a:r>
               <a:t>Introduction</a:t>
             </a:r>
@@ -3630,7 +4045,7 @@
           </a:ln>
           <a:extLst>
             <a:ext uri="{C572A759-6A51-4108-AA02-DFA0A04FC94B}">
-              <ma14:wrappingTextBoxFlag xmlns:ma14="http://schemas.microsoft.com/office/mac/drawingml/2011/main" val="1"/>
+              <ma14:wrappingTextBoxFlag xmlns:ma14="http://schemas.microsoft.com/office/mac/drawingml/2011/main" xmlns="" val="1"/>
             </a:ext>
           </a:extLst>
         </p:spPr>
@@ -3643,7 +4058,7 @@
               <a:lnSpc>
                 <a:spcPct val="115000"/>
               </a:lnSpc>
-              <a:defRPr b="1" sz="2000">
+              <a:defRPr sz="2000" b="1">
                 <a:latin typeface="Open Sans"/>
                 <a:ea typeface="Open Sans"/>
                 <a:cs typeface="Open Sans"/>
@@ -3652,8 +4067,8 @@
             </a:lvl1pPr>
           </a:lstStyle>
           <a:p>
-            <a:pPr/>
-            <a:r>
+            <a:r>
+              <a:rPr dirty="0"/>
               <a:t>Place headline insight or information here. This should be the most important point for this slide.</a:t>
             </a:r>
           </a:p>
@@ -3678,7 +4093,7 @@
           </a:ln>
           <a:extLst>
             <a:ext uri="{C572A759-6A51-4108-AA02-DFA0A04FC94B}">
-              <ma14:wrappingTextBoxFlag xmlns:ma14="http://schemas.microsoft.com/office/mac/drawingml/2011/main" val="1"/>
+              <ma14:wrappingTextBoxFlag xmlns:ma14="http://schemas.microsoft.com/office/mac/drawingml/2011/main" xmlns="" val="1"/>
             </a:ext>
           </a:extLst>
         </p:spPr>
@@ -3700,7 +4115,6 @@
             </a:lvl1pPr>
           </a:lstStyle>
           <a:p>
-            <a:pPr/>
             <a:r>
               <a:t>Place any information about this point here.</a:t>
             </a:r>
@@ -3757,6 +4171,7 @@
                   </a:solidFill>
                 </a:defRPr>
               </a:pPr>
+              <a:endParaRPr/>
             </a:p>
           </p:txBody>
         </p:sp>
@@ -3782,7 +4197,7 @@
             <a:effectLst/>
             <a:extLst>
               <a:ext uri="{C572A759-6A51-4108-AA02-DFA0A04FC94B}">
-                <ma14:wrappingTextBoxFlag xmlns:ma14="http://schemas.microsoft.com/office/mac/drawingml/2011/main" val="1"/>
+                <ma14:wrappingTextBoxFlag xmlns:ma14="http://schemas.microsoft.com/office/mac/drawingml/2011/main" xmlns="" val="1"/>
               </a:ext>
             </a:extLst>
           </p:spPr>
@@ -3800,7 +4215,6 @@
               </a:lvl1pPr>
             </a:lstStyle>
             <a:p>
-              <a:pPr/>
               <a:r>
                 <a:t>Place any supporting images, graphs, data or extra text here.</a:t>
               </a:r>
@@ -3830,7 +4244,7 @@
           </a:ln>
           <a:extLst>
             <a:ext uri="{C572A759-6A51-4108-AA02-DFA0A04FC94B}">
-              <ma14:wrappingTextBoxFlag xmlns:ma14="http://schemas.microsoft.com/office/mac/drawingml/2011/main" val="1"/>
+              <ma14:wrappingTextBoxFlag xmlns:ma14="http://schemas.microsoft.com/office/mac/drawingml/2011/main" xmlns="" val="1"/>
             </a:ext>
           </a:extLst>
         </p:spPr>
@@ -3839,7 +4253,7 @@
           <a:lstStyle/>
           <a:p>
             <a:pPr defTabSz="457200">
-              <a:defRPr b="1" sz="500">
+              <a:defRPr sz="500" b="1">
                 <a:latin typeface="Calibri"/>
                 <a:ea typeface="Calibri"/>
                 <a:cs typeface="Calibri"/>
@@ -3861,12 +4275,12 @@
   <p:clrMapOvr>
     <a:masterClrMapping/>
   </p:clrMapOvr>
-  <p:transition xmlns:p14="http://schemas.microsoft.com/office/powerpoint/2010/main" spd="med" advClick="1"/>
+  <p:transition spd="med"/>
 </p:sld>
 </file>
 
 <file path=ppt/slides/slide4.xml><?xml version="1.0" encoding="utf-8"?>
-<p:sld xmlns:a="http://schemas.openxmlformats.org/drawingml/2006/main" xmlns:r="http://schemas.openxmlformats.org/officeDocument/2006/relationships" xmlns:p="http://schemas.openxmlformats.org/presentationml/2006/main" showMasterSp="1" showMasterPhAnim="1">
+<p:sld xmlns:a="http://schemas.openxmlformats.org/drawingml/2006/main" xmlns:r="http://schemas.openxmlformats.org/officeDocument/2006/relationships" xmlns:p="http://schemas.openxmlformats.org/presentationml/2006/main">
   <p:cSld>
     <p:spTree>
       <p:nvGrpSpPr>
@@ -3915,7 +4329,7 @@
           <a:bodyPr lIns="45719" rIns="45719" anchor="ctr"/>
           <a:lstStyle/>
           <a:p>
-            <a:pPr/>
+            <a:endParaRPr/>
           </a:p>
         </p:txBody>
       </p:sp>
@@ -3938,7 +4352,7 @@
           </a:ln>
           <a:extLst>
             <a:ext uri="{C572A759-6A51-4108-AA02-DFA0A04FC94B}">
-              <ma14:wrappingTextBoxFlag xmlns:ma14="http://schemas.microsoft.com/office/mac/drawingml/2011/main" val="1"/>
+              <ma14:wrappingTextBoxFlag xmlns:ma14="http://schemas.microsoft.com/office/mac/drawingml/2011/main" xmlns="" val="1"/>
             </a:ext>
           </a:extLst>
         </p:spPr>
@@ -3948,7 +4362,7 @@
           </a:bodyPr>
           <a:lstStyle>
             <a:lvl1pPr>
-              <a:defRPr b="1" sz="2000">
+              <a:defRPr sz="2000" b="1">
                 <a:solidFill>
                   <a:srgbClr val="FFFFFF"/>
                 </a:solidFill>
@@ -3956,7 +4370,6 @@
             </a:lvl1pPr>
           </a:lstStyle>
           <a:p>
-            <a:pPr/>
             <a:r>
               <a:t>Data Exploration</a:t>
             </a:r>
@@ -3972,7 +4385,7 @@
         <p:spPr>
           <a:xfrm>
             <a:off x="205025" y="1083299"/>
-            <a:ext cx="8565600" cy="920086"/>
+            <a:ext cx="8565600" cy="516327"/>
           </a:xfrm>
           <a:prstGeom prst="rect">
             <a:avLst/>
@@ -3982,7 +4395,7 @@
           </a:ln>
           <a:extLst>
             <a:ext uri="{C572A759-6A51-4108-AA02-DFA0A04FC94B}">
-              <ma14:wrappingTextBoxFlag xmlns:ma14="http://schemas.microsoft.com/office/mac/drawingml/2011/main" val="1"/>
+              <ma14:wrappingTextBoxFlag xmlns:ma14="http://schemas.microsoft.com/office/mac/drawingml/2011/main" xmlns="" val="1"/>
             </a:ext>
           </a:extLst>
         </p:spPr>
@@ -3995,7 +4408,7 @@
               <a:lnSpc>
                 <a:spcPct val="115000"/>
               </a:lnSpc>
-              <a:defRPr b="1" sz="2000">
+              <a:defRPr sz="2000" b="1">
                 <a:latin typeface="Open Sans"/>
                 <a:ea typeface="Open Sans"/>
                 <a:cs typeface="Open Sans"/>
@@ -4004,10 +4417,11 @@
             </a:lvl1pPr>
           </a:lstStyle>
           <a:p>
-            <a:pPr/>
-            <a:r>
-              <a:t>Place headline insight or information here. This should be the most important point for this slide.</a:t>
-            </a:r>
+            <a:r>
+              <a:rPr lang="en-US" dirty="0"/>
+              <a:t>Data Distribution</a:t>
+            </a:r>
+            <a:endParaRPr dirty="0"/>
           </a:p>
         </p:txBody>
       </p:sp>
@@ -4019,8 +4433,8 @@
         </p:nvSpPr>
         <p:spPr>
           <a:xfrm>
-            <a:off x="205025" y="2164724"/>
-            <a:ext cx="4134600" cy="436851"/>
+            <a:off x="205025" y="1643974"/>
+            <a:ext cx="4134600" cy="1760642"/>
           </a:xfrm>
           <a:prstGeom prst="rect">
             <a:avLst/>
@@ -4030,7 +4444,7 @@
           </a:ln>
           <a:extLst>
             <a:ext uri="{C572A759-6A51-4108-AA02-DFA0A04FC94B}">
-              <ma14:wrappingTextBoxFlag xmlns:ma14="http://schemas.microsoft.com/office/mac/drawingml/2011/main" val="1"/>
+              <ma14:wrappingTextBoxFlag xmlns:ma14="http://schemas.microsoft.com/office/mac/drawingml/2011/main" xmlns="" val="1"/>
             </a:ext>
           </a:extLst>
         </p:spPr>
@@ -4052,10 +4466,21 @@
             </a:lvl1pPr>
           </a:lstStyle>
           <a:p>
-            <a:pPr/>
-            <a:r>
-              <a:t>Place any information about this point here.</a:t>
-            </a:r>
+            <a:r>
+              <a:rPr lang="en-US" dirty="0"/>
+              <a:t>There are outliers in age data.</a:t>
+            </a:r>
+            <a:br>
+              <a:rPr lang="en-US" dirty="0"/>
+            </a:br>
+            <a:endParaRPr lang="en-US" dirty="0"/>
+          </a:p>
+          <a:p>
+            <a:r>
+              <a:rPr lang="en-US" dirty="0"/>
+              <a:t>There are several missing values in the datasets. Most importantly, there are transactions that don’t belong to any of customer in customer dataset.</a:t>
+            </a:r>
+            <a:endParaRPr dirty="0"/>
           </a:p>
         </p:txBody>
       </p:sp>
@@ -4109,6 +4534,7 @@
                   </a:solidFill>
                 </a:defRPr>
               </a:pPr>
+              <a:endParaRPr/>
             </a:p>
           </p:txBody>
         </p:sp>
@@ -4134,7 +4560,7 @@
             <a:effectLst/>
             <a:extLst>
               <a:ext uri="{C572A759-6A51-4108-AA02-DFA0A04FC94B}">
-                <ma14:wrappingTextBoxFlag xmlns:ma14="http://schemas.microsoft.com/office/mac/drawingml/2011/main" val="1"/>
+                <ma14:wrappingTextBoxFlag xmlns:ma14="http://schemas.microsoft.com/office/mac/drawingml/2011/main" xmlns="" val="1"/>
               </a:ext>
             </a:extLst>
           </p:spPr>
@@ -4152,8 +4578,8 @@
               </a:lvl1pPr>
             </a:lstStyle>
             <a:p>
-              <a:pPr/>
               <a:r>
+                <a:rPr dirty="0"/>
                 <a:t>Place any supporting images, graphs, data or extra text here.</a:t>
               </a:r>
             </a:p>
@@ -4182,7 +4608,7 @@
           </a:ln>
           <a:extLst>
             <a:ext uri="{C572A759-6A51-4108-AA02-DFA0A04FC94B}">
-              <ma14:wrappingTextBoxFlag xmlns:ma14="http://schemas.microsoft.com/office/mac/drawingml/2011/main" val="1"/>
+              <ma14:wrappingTextBoxFlag xmlns:ma14="http://schemas.microsoft.com/office/mac/drawingml/2011/main" xmlns="" val="1"/>
             </a:ext>
           </a:extLst>
         </p:spPr>
@@ -4191,7 +4617,7 @@
           <a:lstStyle/>
           <a:p>
             <a:pPr defTabSz="457200">
-              <a:defRPr b="1" sz="500">
+              <a:defRPr sz="500" b="1">
                 <a:latin typeface="Calibri"/>
                 <a:ea typeface="Calibri"/>
                 <a:cs typeface="Calibri"/>
@@ -4205,6 +4631,57 @@
               <a:rPr b="0"/>
               <a:t>The data and information in this document is reflective of a hypothetical situation and client. This document is to be used for KPMG Virtual Internship purposes only. </a:t>
             </a:r>
+          </a:p>
+        </p:txBody>
+      </p:sp>
+      <p:sp>
+        <p:nvSpPr>
+          <p:cNvPr id="10" name="Shape 82">
+            <a:extLst>
+              <a:ext uri="{FF2B5EF4-FFF2-40B4-BE49-F238E27FC236}">
+                <a16:creationId xmlns:a16="http://schemas.microsoft.com/office/drawing/2014/main" id="{DB99DAF5-9271-487C-9E87-B0E69A3E209E}"/>
+              </a:ext>
+            </a:extLst>
+          </p:cNvPr>
+          <p:cNvSpPr/>
+          <p:nvPr/>
+        </p:nvSpPr>
+        <p:spPr>
+          <a:xfrm>
+            <a:off x="205025" y="2760807"/>
+            <a:ext cx="4134600" cy="436851"/>
+          </a:xfrm>
+          <a:prstGeom prst="rect">
+            <a:avLst/>
+          </a:prstGeom>
+          <a:ln w="12700">
+            <a:miter lim="400000"/>
+          </a:ln>
+          <a:extLst>
+            <a:ext uri="{C572A759-6A51-4108-AA02-DFA0A04FC94B}">
+              <ma14:wrappingTextBoxFlag xmlns:ma14="http://schemas.microsoft.com/office/mac/drawingml/2011/main" xmlns="" val="1"/>
+            </a:ext>
+          </a:extLst>
+        </p:spPr>
+        <p:txBody>
+          <a:bodyPr lIns="91424" tIns="91424" rIns="91424" bIns="91424">
+            <a:spAutoFit/>
+          </a:bodyPr>
+          <a:lstStyle>
+            <a:lvl1pPr>
+              <a:lnSpc>
+                <a:spcPct val="115000"/>
+              </a:lnSpc>
+              <a:defRPr sz="1500">
+                <a:latin typeface="Open Sans"/>
+                <a:ea typeface="Open Sans"/>
+                <a:cs typeface="Open Sans"/>
+                <a:sym typeface="Open Sans"/>
+              </a:defRPr>
+            </a:lvl1pPr>
+          </a:lstStyle>
+          <a:p>
+            <a:endParaRPr dirty="0"/>
           </a:p>
         </p:txBody>
       </p:sp>
@@ -4213,12 +4690,378 @@
   <p:clrMapOvr>
     <a:masterClrMapping/>
   </p:clrMapOvr>
-  <p:transition xmlns:p14="http://schemas.microsoft.com/office/powerpoint/2010/main" spd="med" advClick="1"/>
+  <p:transition spd="med"/>
 </p:sld>
 </file>
 
 <file path=ppt/slides/slide5.xml><?xml version="1.0" encoding="utf-8"?>
-<p:sld xmlns:a="http://schemas.openxmlformats.org/drawingml/2006/main" xmlns:r="http://schemas.openxmlformats.org/officeDocument/2006/relationships" xmlns:p="http://schemas.openxmlformats.org/presentationml/2006/main" showMasterSp="1" showMasterPhAnim="1">
+<p:sld xmlns:a="http://schemas.openxmlformats.org/drawingml/2006/main" xmlns:r="http://schemas.openxmlformats.org/officeDocument/2006/relationships" xmlns:p="http://schemas.openxmlformats.org/presentationml/2006/main">
+  <p:cSld>
+    <p:spTree>
+      <p:nvGrpSpPr>
+        <p:cNvPr id="1" name=""/>
+        <p:cNvGrpSpPr/>
+        <p:nvPr/>
+      </p:nvGrpSpPr>
+      <p:grpSpPr>
+        <a:xfrm>
+          <a:off x="0" y="0"/>
+          <a:ext cx="0" cy="0"/>
+          <a:chOff x="0" y="0"/>
+          <a:chExt cx="0" cy="0"/>
+        </a:xfrm>
+      </p:grpSpPr>
+      <p:sp>
+        <p:nvSpPr>
+          <p:cNvPr id="130" name="Shape 79"/>
+          <p:cNvSpPr/>
+          <p:nvPr/>
+        </p:nvSpPr>
+        <p:spPr>
+          <a:xfrm>
+            <a:off x="-15501" y="-19475"/>
+            <a:ext cx="9191402" cy="840000"/>
+          </a:xfrm>
+          <a:prstGeom prst="rect">
+            <a:avLst/>
+          </a:prstGeom>
+          <a:gradFill>
+            <a:gsLst>
+              <a:gs pos="0">
+                <a:srgbClr val="1077D2"/>
+              </a:gs>
+              <a:gs pos="100000">
+                <a:srgbClr val="093153"/>
+              </a:gs>
+            </a:gsLst>
+            <a:lin ang="12000143"/>
+          </a:gradFill>
+          <a:ln w="12700">
+            <a:miter lim="400000"/>
+          </a:ln>
+        </p:spPr>
+        <p:txBody>
+          <a:bodyPr lIns="45719" rIns="45719" anchor="ctr"/>
+          <a:lstStyle/>
+          <a:p>
+            <a:endParaRPr/>
+          </a:p>
+        </p:txBody>
+      </p:sp>
+      <p:sp>
+        <p:nvSpPr>
+          <p:cNvPr id="131" name="Shape 80"/>
+          <p:cNvSpPr/>
+          <p:nvPr/>
+        </p:nvSpPr>
+        <p:spPr>
+          <a:xfrm>
+            <a:off x="205025" y="263974"/>
+            <a:ext cx="8565600" cy="466642"/>
+          </a:xfrm>
+          <a:prstGeom prst="rect">
+            <a:avLst/>
+          </a:prstGeom>
+          <a:ln w="12700">
+            <a:miter lim="400000"/>
+          </a:ln>
+          <a:extLst>
+            <a:ext uri="{C572A759-6A51-4108-AA02-DFA0A04FC94B}">
+              <ma14:wrappingTextBoxFlag xmlns:ma14="http://schemas.microsoft.com/office/mac/drawingml/2011/main" xmlns="" val="1"/>
+            </a:ext>
+          </a:extLst>
+        </p:spPr>
+        <p:txBody>
+          <a:bodyPr lIns="91424" tIns="91424" rIns="91424" bIns="91424">
+            <a:spAutoFit/>
+          </a:bodyPr>
+          <a:lstStyle>
+            <a:lvl1pPr>
+              <a:defRPr sz="2000" b="1">
+                <a:solidFill>
+                  <a:srgbClr val="FFFFFF"/>
+                </a:solidFill>
+              </a:defRPr>
+            </a:lvl1pPr>
+          </a:lstStyle>
+          <a:p>
+            <a:r>
+              <a:t>Data Exploration</a:t>
+            </a:r>
+          </a:p>
+        </p:txBody>
+      </p:sp>
+      <p:sp>
+        <p:nvSpPr>
+          <p:cNvPr id="132" name="Shape 81"/>
+          <p:cNvSpPr/>
+          <p:nvPr/>
+        </p:nvSpPr>
+        <p:spPr>
+          <a:xfrm>
+            <a:off x="205025" y="1083299"/>
+            <a:ext cx="8565600" cy="516327"/>
+          </a:xfrm>
+          <a:prstGeom prst="rect">
+            <a:avLst/>
+          </a:prstGeom>
+          <a:ln w="12700">
+            <a:miter lim="400000"/>
+          </a:ln>
+          <a:extLst>
+            <a:ext uri="{C572A759-6A51-4108-AA02-DFA0A04FC94B}">
+              <ma14:wrappingTextBoxFlag xmlns:ma14="http://schemas.microsoft.com/office/mac/drawingml/2011/main" xmlns="" val="1"/>
+            </a:ext>
+          </a:extLst>
+        </p:spPr>
+        <p:txBody>
+          <a:bodyPr lIns="91424" tIns="91424" rIns="91424" bIns="91424">
+            <a:spAutoFit/>
+          </a:bodyPr>
+          <a:lstStyle>
+            <a:lvl1pPr>
+              <a:lnSpc>
+                <a:spcPct val="115000"/>
+              </a:lnSpc>
+              <a:defRPr sz="2000" b="1">
+                <a:latin typeface="Open Sans"/>
+                <a:ea typeface="Open Sans"/>
+                <a:cs typeface="Open Sans"/>
+                <a:sym typeface="Open Sans"/>
+              </a:defRPr>
+            </a:lvl1pPr>
+          </a:lstStyle>
+          <a:p>
+            <a:r>
+              <a:rPr lang="en-US" dirty="0"/>
+              <a:t>Feature Engineering </a:t>
+            </a:r>
+            <a:endParaRPr dirty="0"/>
+          </a:p>
+        </p:txBody>
+      </p:sp>
+      <p:sp>
+        <p:nvSpPr>
+          <p:cNvPr id="133" name="Shape 82"/>
+          <p:cNvSpPr/>
+          <p:nvPr/>
+        </p:nvSpPr>
+        <p:spPr>
+          <a:xfrm>
+            <a:off x="155018" y="1862400"/>
+            <a:ext cx="4502706" cy="964271"/>
+          </a:xfrm>
+          <a:prstGeom prst="rect">
+            <a:avLst/>
+          </a:prstGeom>
+          <a:ln w="12700">
+            <a:miter lim="400000"/>
+          </a:ln>
+          <a:extLst>
+            <a:ext uri="{C572A759-6A51-4108-AA02-DFA0A04FC94B}">
+              <ma14:wrappingTextBoxFlag xmlns:ma14="http://schemas.microsoft.com/office/mac/drawingml/2011/main" xmlns="" val="1"/>
+            </a:ext>
+          </a:extLst>
+        </p:spPr>
+        <p:txBody>
+          <a:bodyPr wrap="square" lIns="91424" tIns="91424" rIns="91424" bIns="91424">
+            <a:spAutoFit/>
+          </a:bodyPr>
+          <a:lstStyle>
+            <a:lvl1pPr>
+              <a:lnSpc>
+                <a:spcPct val="115000"/>
+              </a:lnSpc>
+              <a:defRPr sz="1500">
+                <a:latin typeface="Open Sans"/>
+                <a:ea typeface="Open Sans"/>
+                <a:cs typeface="Open Sans"/>
+                <a:sym typeface="Open Sans"/>
+              </a:defRPr>
+            </a:lvl1pPr>
+          </a:lstStyle>
+          <a:p>
+            <a:r>
+              <a:rPr lang="en-US" dirty="0"/>
+              <a:t>Total money spent by customer is calculated. </a:t>
+            </a:r>
+            <a:br>
+              <a:rPr lang="en-US" dirty="0"/>
+            </a:br>
+            <a:r>
+              <a:rPr lang="en-US" dirty="0"/>
+              <a:t>Since the data is right-skewed, square root is taken to achieve a relatively normal distribution</a:t>
+            </a:r>
+            <a:endParaRPr dirty="0"/>
+          </a:p>
+        </p:txBody>
+      </p:sp>
+      <p:grpSp>
+        <p:nvGrpSpPr>
+          <p:cNvPr id="136" name="Shape 83"/>
+          <p:cNvGrpSpPr/>
+          <p:nvPr/>
+        </p:nvGrpSpPr>
+        <p:grpSpPr>
+          <a:xfrm>
+            <a:off x="4969974" y="2164724"/>
+            <a:ext cx="3800702" cy="2649302"/>
+            <a:chOff x="0" y="0"/>
+            <a:chExt cx="3800700" cy="2649300"/>
+          </a:xfrm>
+        </p:grpSpPr>
+        <p:sp>
+          <p:nvSpPr>
+            <p:cNvPr id="134" name="Rectangle"/>
+            <p:cNvSpPr/>
+            <p:nvPr/>
+          </p:nvSpPr>
+          <p:spPr>
+            <a:xfrm>
+              <a:off x="-1" y="-1"/>
+              <a:ext cx="3800702" cy="2649302"/>
+            </a:xfrm>
+            <a:prstGeom prst="rect">
+              <a:avLst/>
+            </a:prstGeom>
+            <a:solidFill>
+              <a:srgbClr val="EEEEEE"/>
+            </a:solidFill>
+            <a:ln w="12700" cap="flat">
+              <a:noFill/>
+              <a:miter lim="400000"/>
+            </a:ln>
+            <a:effectLst/>
+          </p:spPr>
+          <p:txBody>
+            <a:bodyPr wrap="square" lIns="45719" tIns="45719" rIns="45719" bIns="45719" numCol="1" anchor="ctr">
+              <a:noAutofit/>
+            </a:bodyPr>
+            <a:lstStyle/>
+            <a:p>
+              <a:pPr algn="ctr">
+                <a:defRPr>
+                  <a:solidFill>
+                    <a:srgbClr val="666666"/>
+                  </a:solidFill>
+                </a:defRPr>
+              </a:pPr>
+              <a:endParaRPr/>
+            </a:p>
+          </p:txBody>
+        </p:sp>
+        <p:sp>
+          <p:nvSpPr>
+            <p:cNvPr id="135" name="Place any supporting images, graphs, data or extra text here."/>
+            <p:cNvSpPr/>
+            <p:nvPr/>
+          </p:nvSpPr>
+          <p:spPr>
+            <a:xfrm>
+              <a:off x="-1" y="1032933"/>
+              <a:ext cx="3800702" cy="583434"/>
+            </a:xfrm>
+            <a:prstGeom prst="rect">
+              <a:avLst/>
+            </a:prstGeom>
+            <a:noFill/>
+            <a:ln w="12700" cap="flat">
+              <a:noFill/>
+              <a:miter lim="400000"/>
+            </a:ln>
+            <a:effectLst/>
+            <a:extLst>
+              <a:ext uri="{C572A759-6A51-4108-AA02-DFA0A04FC94B}">
+                <ma14:wrappingTextBoxFlag xmlns:ma14="http://schemas.microsoft.com/office/mac/drawingml/2011/main" xmlns="" val="1"/>
+              </a:ext>
+            </a:extLst>
+          </p:spPr>
+          <p:txBody>
+            <a:bodyPr wrap="square" lIns="91424" tIns="91424" rIns="91424" bIns="91424" numCol="1" anchor="ctr">
+              <a:spAutoFit/>
+            </a:bodyPr>
+            <a:lstStyle>
+              <a:lvl1pPr algn="ctr">
+                <a:defRPr>
+                  <a:solidFill>
+                    <a:srgbClr val="666666"/>
+                  </a:solidFill>
+                </a:defRPr>
+              </a:lvl1pPr>
+            </a:lstStyle>
+            <a:p>
+              <a:r>
+                <a:rPr dirty="0"/>
+                <a:t>Place any supporting images, graphs, data or extra text here.</a:t>
+              </a:r>
+            </a:p>
+          </p:txBody>
+        </p:sp>
+      </p:grpSp>
+      <p:sp>
+        <p:nvSpPr>
+          <p:cNvPr id="137" name="Note: The data and information in this document is reflective of a hypothetical situation and client. This document is to be used for KPMG Virtual Internship purposes only."/>
+          <p:cNvSpPr/>
+          <p:nvPr/>
+        </p:nvSpPr>
+        <p:spPr>
+          <a:xfrm>
+            <a:off x="-6201" y="-6350"/>
+            <a:ext cx="9175601" cy="238700"/>
+          </a:xfrm>
+          <a:prstGeom prst="rect">
+            <a:avLst/>
+          </a:prstGeom>
+          <a:solidFill>
+            <a:schemeClr val="accent3"/>
+          </a:solidFill>
+          <a:ln w="12700">
+            <a:miter lim="400000"/>
+          </a:ln>
+          <a:extLst>
+            <a:ext uri="{C572A759-6A51-4108-AA02-DFA0A04FC94B}">
+              <ma14:wrappingTextBoxFlag xmlns:ma14="http://schemas.microsoft.com/office/mac/drawingml/2011/main" xmlns="" val="1"/>
+            </a:ext>
+          </a:extLst>
+        </p:spPr>
+        <p:txBody>
+          <a:bodyPr lIns="45719" rIns="45719" anchor="ctr"/>
+          <a:lstStyle/>
+          <a:p>
+            <a:pPr defTabSz="457200">
+              <a:defRPr sz="500" b="1">
+                <a:latin typeface="Calibri"/>
+                <a:ea typeface="Calibri"/>
+                <a:cs typeface="Calibri"/>
+                <a:sym typeface="Calibri"/>
+              </a:defRPr>
+            </a:pPr>
+            <a:r>
+              <a:t>       Note: </a:t>
+            </a:r>
+            <a:r>
+              <a:rPr b="0"/>
+              <a:t>The data and information in this document is reflective of a hypothetical situation and client. This document is to be used for KPMG Virtual Internship purposes only. </a:t>
+            </a:r>
+          </a:p>
+        </p:txBody>
+      </p:sp>
+    </p:spTree>
+    <p:extLst>
+      <p:ext uri="{BB962C8B-B14F-4D97-AF65-F5344CB8AC3E}">
+        <p14:creationId xmlns:p14="http://schemas.microsoft.com/office/powerpoint/2010/main" val="3028974573"/>
+      </p:ext>
+    </p:extLst>
+  </p:cSld>
+  <p:clrMapOvr>
+    <a:masterClrMapping/>
+  </p:clrMapOvr>
+  <p:transition spd="med"/>
+</p:sld>
+</file>
+
+<file path=ppt/slides/slide6.xml><?xml version="1.0" encoding="utf-8"?>
+<p:sld xmlns:a="http://schemas.openxmlformats.org/drawingml/2006/main" xmlns:r="http://schemas.openxmlformats.org/officeDocument/2006/relationships" xmlns:p="http://schemas.openxmlformats.org/presentationml/2006/main">
   <p:cSld>
     <p:spTree>
       <p:nvGrpSpPr>
@@ -4267,7 +5110,7 @@
           <a:bodyPr lIns="45719" rIns="45719" anchor="ctr"/>
           <a:lstStyle/>
           <a:p>
-            <a:pPr/>
+            <a:endParaRPr/>
           </a:p>
         </p:txBody>
       </p:sp>
@@ -4290,7 +5133,7 @@
           </a:ln>
           <a:extLst>
             <a:ext uri="{C572A759-6A51-4108-AA02-DFA0A04FC94B}">
-              <ma14:wrappingTextBoxFlag xmlns:ma14="http://schemas.microsoft.com/office/mac/drawingml/2011/main" val="1"/>
+              <ma14:wrappingTextBoxFlag xmlns:ma14="http://schemas.microsoft.com/office/mac/drawingml/2011/main" xmlns="" val="1"/>
             </a:ext>
           </a:extLst>
         </p:spPr>
@@ -4300,7 +5143,7 @@
           </a:bodyPr>
           <a:lstStyle>
             <a:lvl1pPr>
-              <a:defRPr b="1" sz="2000">
+              <a:defRPr sz="2000" b="1">
                 <a:solidFill>
                   <a:srgbClr val="FFFFFF"/>
                 </a:solidFill>
@@ -4308,7 +5151,6 @@
             </a:lvl1pPr>
           </a:lstStyle>
           <a:p>
-            <a:pPr/>
             <a:r>
               <a:t>Model Development</a:t>
             </a:r>
@@ -4324,7 +5166,7 @@
         <p:spPr>
           <a:xfrm>
             <a:off x="205025" y="1083299"/>
-            <a:ext cx="8565600" cy="920086"/>
+            <a:ext cx="8565600" cy="516327"/>
           </a:xfrm>
           <a:prstGeom prst="rect">
             <a:avLst/>
@@ -4334,7 +5176,7 @@
           </a:ln>
           <a:extLst>
             <a:ext uri="{C572A759-6A51-4108-AA02-DFA0A04FC94B}">
-              <ma14:wrappingTextBoxFlag xmlns:ma14="http://schemas.microsoft.com/office/mac/drawingml/2011/main" val="1"/>
+              <ma14:wrappingTextBoxFlag xmlns:ma14="http://schemas.microsoft.com/office/mac/drawingml/2011/main" xmlns="" val="1"/>
             </a:ext>
           </a:extLst>
         </p:spPr>
@@ -4347,7 +5189,7 @@
               <a:lnSpc>
                 <a:spcPct val="115000"/>
               </a:lnSpc>
-              <a:defRPr b="1" sz="2000">
+              <a:defRPr sz="2000" b="1">
                 <a:latin typeface="Open Sans"/>
                 <a:ea typeface="Open Sans"/>
                 <a:cs typeface="Open Sans"/>
@@ -4356,10 +5198,11 @@
             </a:lvl1pPr>
           </a:lstStyle>
           <a:p>
-            <a:pPr/>
-            <a:r>
-              <a:t>Place headline insight or information here. This should be the most important point for this slide.</a:t>
-            </a:r>
+            <a:r>
+              <a:rPr lang="en-US" dirty="0"/>
+              <a:t>Model development	</a:t>
+            </a:r>
+            <a:endParaRPr dirty="0"/>
           </a:p>
         </p:txBody>
       </p:sp>
@@ -4372,7 +5215,7 @@
         <p:spPr>
           <a:xfrm>
             <a:off x="205025" y="2164724"/>
-            <a:ext cx="4134600" cy="436851"/>
+            <a:ext cx="4134600" cy="2026100"/>
           </a:xfrm>
           <a:prstGeom prst="rect">
             <a:avLst/>
@@ -4382,7 +5225,7 @@
           </a:ln>
           <a:extLst>
             <a:ext uri="{C572A759-6A51-4108-AA02-DFA0A04FC94B}">
-              <ma14:wrappingTextBoxFlag xmlns:ma14="http://schemas.microsoft.com/office/mac/drawingml/2011/main" val="1"/>
+              <ma14:wrappingTextBoxFlag xmlns:ma14="http://schemas.microsoft.com/office/mac/drawingml/2011/main" xmlns="" val="1"/>
             </a:ext>
           </a:extLst>
         </p:spPr>
@@ -4404,9 +5247,30 @@
             </a:lvl1pPr>
           </a:lstStyle>
           <a:p>
-            <a:pPr/>
-            <a:r>
-              <a:t>Place any information about this point here.</a:t>
+            <a:r>
+              <a:rPr lang="en-US" dirty="0"/>
+              <a:t>For this dataset, I used Random Forest approach for a number of reasons:</a:t>
+            </a:r>
+          </a:p>
+          <a:p>
+            <a:endParaRPr lang="en-US" dirty="0"/>
+          </a:p>
+          <a:p>
+            <a:pPr marL="342900" indent="-342900">
+              <a:buAutoNum type="arabicPeriod"/>
+            </a:pPr>
+            <a:r>
+              <a:rPr lang="en-US" dirty="0"/>
+              <a:t>There are various missing values in key variables. RF handles this well.</a:t>
+            </a:r>
+          </a:p>
+          <a:p>
+            <a:pPr marL="342900" indent="-342900">
+              <a:buAutoNum type="arabicPeriod"/>
+            </a:pPr>
+            <a:r>
+              <a:rPr lang="en-US" dirty="0"/>
+              <a:t>The data is not large. Neural Network is not feasible.</a:t>
             </a:r>
           </a:p>
         </p:txBody>
@@ -4461,6 +5325,7 @@
                   </a:solidFill>
                 </a:defRPr>
               </a:pPr>
+              <a:endParaRPr/>
             </a:p>
           </p:txBody>
         </p:sp>
@@ -4486,7 +5351,7 @@
             <a:effectLst/>
             <a:extLst>
               <a:ext uri="{C572A759-6A51-4108-AA02-DFA0A04FC94B}">
-                <ma14:wrappingTextBoxFlag xmlns:ma14="http://schemas.microsoft.com/office/mac/drawingml/2011/main" val="1"/>
+                <ma14:wrappingTextBoxFlag xmlns:ma14="http://schemas.microsoft.com/office/mac/drawingml/2011/main" xmlns="" val="1"/>
               </a:ext>
             </a:extLst>
           </p:spPr>
@@ -4504,7 +5369,6 @@
               </a:lvl1pPr>
             </a:lstStyle>
             <a:p>
-              <a:pPr/>
               <a:r>
                 <a:t>Place any supporting images, graphs, data or extra text here.</a:t>
               </a:r>
@@ -4534,7 +5398,7 @@
           </a:ln>
           <a:extLst>
             <a:ext uri="{C572A759-6A51-4108-AA02-DFA0A04FC94B}">
-              <ma14:wrappingTextBoxFlag xmlns:ma14="http://schemas.microsoft.com/office/mac/drawingml/2011/main" val="1"/>
+              <ma14:wrappingTextBoxFlag xmlns:ma14="http://schemas.microsoft.com/office/mac/drawingml/2011/main" xmlns="" val="1"/>
             </a:ext>
           </a:extLst>
         </p:spPr>
@@ -4543,7 +5407,7 @@
           <a:lstStyle/>
           <a:p>
             <a:pPr defTabSz="457200">
-              <a:defRPr b="1" sz="500">
+              <a:defRPr sz="500" b="1">
                 <a:latin typeface="Calibri"/>
                 <a:ea typeface="Calibri"/>
                 <a:cs typeface="Calibri"/>
@@ -4565,12 +5429,366 @@
   <p:clrMapOvr>
     <a:masterClrMapping/>
   </p:clrMapOvr>
-  <p:transition xmlns:p14="http://schemas.microsoft.com/office/powerpoint/2010/main" spd="med" advClick="1"/>
+  <p:transition spd="med"/>
 </p:sld>
 </file>
 
-<file path=ppt/slides/slide6.xml><?xml version="1.0" encoding="utf-8"?>
-<p:sld xmlns:a="http://schemas.openxmlformats.org/drawingml/2006/main" xmlns:r="http://schemas.openxmlformats.org/officeDocument/2006/relationships" xmlns:p="http://schemas.openxmlformats.org/presentationml/2006/main" showMasterSp="1" showMasterPhAnim="1">
+<file path=ppt/slides/slide7.xml><?xml version="1.0" encoding="utf-8"?>
+<p:sld xmlns:a="http://schemas.openxmlformats.org/drawingml/2006/main" xmlns:r="http://schemas.openxmlformats.org/officeDocument/2006/relationships" xmlns:p="http://schemas.openxmlformats.org/presentationml/2006/main">
+  <p:cSld>
+    <p:spTree>
+      <p:nvGrpSpPr>
+        <p:cNvPr id="1" name=""/>
+        <p:cNvGrpSpPr/>
+        <p:nvPr/>
+      </p:nvGrpSpPr>
+      <p:grpSpPr>
+        <a:xfrm>
+          <a:off x="0" y="0"/>
+          <a:ext cx="0" cy="0"/>
+          <a:chOff x="0" y="0"/>
+          <a:chExt cx="0" cy="0"/>
+        </a:xfrm>
+      </p:grpSpPr>
+      <p:sp>
+        <p:nvSpPr>
+          <p:cNvPr id="139" name="Shape 88"/>
+          <p:cNvSpPr/>
+          <p:nvPr/>
+        </p:nvSpPr>
+        <p:spPr>
+          <a:xfrm>
+            <a:off x="-15501" y="-19475"/>
+            <a:ext cx="9191402" cy="840000"/>
+          </a:xfrm>
+          <a:prstGeom prst="rect">
+            <a:avLst/>
+          </a:prstGeom>
+          <a:gradFill>
+            <a:gsLst>
+              <a:gs pos="0">
+                <a:srgbClr val="1077D2"/>
+              </a:gs>
+              <a:gs pos="100000">
+                <a:srgbClr val="093153"/>
+              </a:gs>
+            </a:gsLst>
+            <a:lin ang="12000143"/>
+          </a:gradFill>
+          <a:ln w="12700">
+            <a:miter lim="400000"/>
+          </a:ln>
+        </p:spPr>
+        <p:txBody>
+          <a:bodyPr lIns="45719" rIns="45719" anchor="ctr"/>
+          <a:lstStyle/>
+          <a:p>
+            <a:endParaRPr/>
+          </a:p>
+        </p:txBody>
+      </p:sp>
+      <p:sp>
+        <p:nvSpPr>
+          <p:cNvPr id="140" name="Shape 89"/>
+          <p:cNvSpPr/>
+          <p:nvPr/>
+        </p:nvSpPr>
+        <p:spPr>
+          <a:xfrm>
+            <a:off x="205025" y="263974"/>
+            <a:ext cx="8565600" cy="466642"/>
+          </a:xfrm>
+          <a:prstGeom prst="rect">
+            <a:avLst/>
+          </a:prstGeom>
+          <a:ln w="12700">
+            <a:miter lim="400000"/>
+          </a:ln>
+          <a:extLst>
+            <a:ext uri="{C572A759-6A51-4108-AA02-DFA0A04FC94B}">
+              <ma14:wrappingTextBoxFlag xmlns:ma14="http://schemas.microsoft.com/office/mac/drawingml/2011/main" xmlns="" val="1"/>
+            </a:ext>
+          </a:extLst>
+        </p:spPr>
+        <p:txBody>
+          <a:bodyPr lIns="91424" tIns="91424" rIns="91424" bIns="91424">
+            <a:spAutoFit/>
+          </a:bodyPr>
+          <a:lstStyle>
+            <a:lvl1pPr>
+              <a:defRPr sz="2000" b="1">
+                <a:solidFill>
+                  <a:srgbClr val="FFFFFF"/>
+                </a:solidFill>
+              </a:defRPr>
+            </a:lvl1pPr>
+          </a:lstStyle>
+          <a:p>
+            <a:r>
+              <a:t>Model Development</a:t>
+            </a:r>
+          </a:p>
+        </p:txBody>
+      </p:sp>
+      <p:sp>
+        <p:nvSpPr>
+          <p:cNvPr id="141" name="Shape 90"/>
+          <p:cNvSpPr/>
+          <p:nvPr/>
+        </p:nvSpPr>
+        <p:spPr>
+          <a:xfrm>
+            <a:off x="205025" y="1083299"/>
+            <a:ext cx="8565600" cy="516327"/>
+          </a:xfrm>
+          <a:prstGeom prst="rect">
+            <a:avLst/>
+          </a:prstGeom>
+          <a:ln w="12700">
+            <a:miter lim="400000"/>
+          </a:ln>
+          <a:extLst>
+            <a:ext uri="{C572A759-6A51-4108-AA02-DFA0A04FC94B}">
+              <ma14:wrappingTextBoxFlag xmlns:ma14="http://schemas.microsoft.com/office/mac/drawingml/2011/main" xmlns="" val="1"/>
+            </a:ext>
+          </a:extLst>
+        </p:spPr>
+        <p:txBody>
+          <a:bodyPr lIns="91424" tIns="91424" rIns="91424" bIns="91424">
+            <a:spAutoFit/>
+          </a:bodyPr>
+          <a:lstStyle>
+            <a:lvl1pPr>
+              <a:lnSpc>
+                <a:spcPct val="115000"/>
+              </a:lnSpc>
+              <a:defRPr sz="2000" b="1">
+                <a:latin typeface="Open Sans"/>
+                <a:ea typeface="Open Sans"/>
+                <a:cs typeface="Open Sans"/>
+                <a:sym typeface="Open Sans"/>
+              </a:defRPr>
+            </a:lvl1pPr>
+          </a:lstStyle>
+          <a:p>
+            <a:r>
+              <a:rPr lang="en-US" dirty="0"/>
+              <a:t>Feature Selection </a:t>
+            </a:r>
+            <a:endParaRPr dirty="0"/>
+          </a:p>
+        </p:txBody>
+      </p:sp>
+      <p:sp>
+        <p:nvSpPr>
+          <p:cNvPr id="142" name="Shape 91"/>
+          <p:cNvSpPr/>
+          <p:nvPr/>
+        </p:nvSpPr>
+        <p:spPr>
+          <a:xfrm>
+            <a:off x="205025" y="2164724"/>
+            <a:ext cx="4134600" cy="433356"/>
+          </a:xfrm>
+          <a:prstGeom prst="rect">
+            <a:avLst/>
+          </a:prstGeom>
+          <a:ln w="12700">
+            <a:miter lim="400000"/>
+          </a:ln>
+          <a:extLst>
+            <a:ext uri="{C572A759-6A51-4108-AA02-DFA0A04FC94B}">
+              <ma14:wrappingTextBoxFlag xmlns:ma14="http://schemas.microsoft.com/office/mac/drawingml/2011/main" xmlns="" val="1"/>
+            </a:ext>
+          </a:extLst>
+        </p:spPr>
+        <p:txBody>
+          <a:bodyPr lIns="91424" tIns="91424" rIns="91424" bIns="91424">
+            <a:spAutoFit/>
+          </a:bodyPr>
+          <a:lstStyle>
+            <a:lvl1pPr>
+              <a:lnSpc>
+                <a:spcPct val="115000"/>
+              </a:lnSpc>
+              <a:defRPr sz="1500">
+                <a:latin typeface="Open Sans"/>
+                <a:ea typeface="Open Sans"/>
+                <a:cs typeface="Open Sans"/>
+                <a:sym typeface="Open Sans"/>
+              </a:defRPr>
+            </a:lvl1pPr>
+          </a:lstStyle>
+          <a:p>
+            <a:endParaRPr lang="en-US" dirty="0"/>
+          </a:p>
+        </p:txBody>
+      </p:sp>
+      <p:grpSp>
+        <p:nvGrpSpPr>
+          <p:cNvPr id="145" name="Shape 92"/>
+          <p:cNvGrpSpPr/>
+          <p:nvPr/>
+        </p:nvGrpSpPr>
+        <p:grpSpPr>
+          <a:xfrm>
+            <a:off x="4969974" y="2164724"/>
+            <a:ext cx="3800702" cy="2649302"/>
+            <a:chOff x="0" y="0"/>
+            <a:chExt cx="3800700" cy="2649300"/>
+          </a:xfrm>
+        </p:grpSpPr>
+        <p:sp>
+          <p:nvSpPr>
+            <p:cNvPr id="143" name="Rectangle"/>
+            <p:cNvSpPr/>
+            <p:nvPr/>
+          </p:nvSpPr>
+          <p:spPr>
+            <a:xfrm>
+              <a:off x="-1" y="-1"/>
+              <a:ext cx="3800702" cy="2649302"/>
+            </a:xfrm>
+            <a:prstGeom prst="rect">
+              <a:avLst/>
+            </a:prstGeom>
+            <a:solidFill>
+              <a:srgbClr val="EEEEEE"/>
+            </a:solidFill>
+            <a:ln w="12700" cap="flat">
+              <a:noFill/>
+              <a:miter lim="400000"/>
+            </a:ln>
+            <a:effectLst/>
+          </p:spPr>
+          <p:txBody>
+            <a:bodyPr wrap="square" lIns="45719" tIns="45719" rIns="45719" bIns="45719" numCol="1" anchor="ctr">
+              <a:noAutofit/>
+            </a:bodyPr>
+            <a:lstStyle/>
+            <a:p>
+              <a:pPr algn="ctr">
+                <a:defRPr>
+                  <a:solidFill>
+                    <a:srgbClr val="666666"/>
+                  </a:solidFill>
+                </a:defRPr>
+              </a:pPr>
+              <a:endParaRPr/>
+            </a:p>
+          </p:txBody>
+        </p:sp>
+        <p:sp>
+          <p:nvSpPr>
+            <p:cNvPr id="144" name="Place any supporting images, graphs, data or extra text here."/>
+            <p:cNvSpPr/>
+            <p:nvPr/>
+          </p:nvSpPr>
+          <p:spPr>
+            <a:xfrm>
+              <a:off x="-1" y="1032933"/>
+              <a:ext cx="3800702" cy="583434"/>
+            </a:xfrm>
+            <a:prstGeom prst="rect">
+              <a:avLst/>
+            </a:prstGeom>
+            <a:noFill/>
+            <a:ln w="12700" cap="flat">
+              <a:noFill/>
+              <a:miter lim="400000"/>
+            </a:ln>
+            <a:effectLst/>
+            <a:extLst>
+              <a:ext uri="{C572A759-6A51-4108-AA02-DFA0A04FC94B}">
+                <ma14:wrappingTextBoxFlag xmlns:ma14="http://schemas.microsoft.com/office/mac/drawingml/2011/main" xmlns="" val="1"/>
+              </a:ext>
+            </a:extLst>
+          </p:spPr>
+          <p:txBody>
+            <a:bodyPr wrap="square" lIns="91424" tIns="91424" rIns="91424" bIns="91424" numCol="1" anchor="ctr">
+              <a:spAutoFit/>
+            </a:bodyPr>
+            <a:lstStyle>
+              <a:lvl1pPr algn="ctr">
+                <a:defRPr>
+                  <a:solidFill>
+                    <a:srgbClr val="666666"/>
+                  </a:solidFill>
+                </a:defRPr>
+              </a:lvl1pPr>
+            </a:lstStyle>
+            <a:p>
+              <a:r>
+                <a:t>Place any supporting images, graphs, data or extra text here.</a:t>
+              </a:r>
+            </a:p>
+          </p:txBody>
+        </p:sp>
+      </p:grpSp>
+      <p:sp>
+        <p:nvSpPr>
+          <p:cNvPr id="146" name="Note: The data and information in this document is reflective of a hypothetical situation and client. This document is to be used for KPMG Virtual Internship purposes only."/>
+          <p:cNvSpPr/>
+          <p:nvPr/>
+        </p:nvSpPr>
+        <p:spPr>
+          <a:xfrm>
+            <a:off x="-6201" y="-6350"/>
+            <a:ext cx="9175601" cy="238700"/>
+          </a:xfrm>
+          <a:prstGeom prst="rect">
+            <a:avLst/>
+          </a:prstGeom>
+          <a:solidFill>
+            <a:schemeClr val="accent3"/>
+          </a:solidFill>
+          <a:ln w="12700">
+            <a:miter lim="400000"/>
+          </a:ln>
+          <a:extLst>
+            <a:ext uri="{C572A759-6A51-4108-AA02-DFA0A04FC94B}">
+              <ma14:wrappingTextBoxFlag xmlns:ma14="http://schemas.microsoft.com/office/mac/drawingml/2011/main" xmlns="" val="1"/>
+            </a:ext>
+          </a:extLst>
+        </p:spPr>
+        <p:txBody>
+          <a:bodyPr lIns="45719" rIns="45719" anchor="ctr"/>
+          <a:lstStyle/>
+          <a:p>
+            <a:pPr defTabSz="457200">
+              <a:defRPr sz="500" b="1">
+                <a:latin typeface="Calibri"/>
+                <a:ea typeface="Calibri"/>
+                <a:cs typeface="Calibri"/>
+                <a:sym typeface="Calibri"/>
+              </a:defRPr>
+            </a:pPr>
+            <a:r>
+              <a:t>       Note: </a:t>
+            </a:r>
+            <a:r>
+              <a:rPr b="0"/>
+              <a:t>The data and information in this document is reflective of a hypothetical situation and client. This document is to be used for KPMG Virtual Internship purposes only. </a:t>
+            </a:r>
+          </a:p>
+        </p:txBody>
+      </p:sp>
+    </p:spTree>
+    <p:extLst>
+      <p:ext uri="{BB962C8B-B14F-4D97-AF65-F5344CB8AC3E}">
+        <p14:creationId xmlns:p14="http://schemas.microsoft.com/office/powerpoint/2010/main" val="2267198730"/>
+      </p:ext>
+    </p:extLst>
+  </p:cSld>
+  <p:clrMapOvr>
+    <a:masterClrMapping/>
+  </p:clrMapOvr>
+  <p:transition spd="med"/>
+</p:sld>
+</file>
+
+<file path=ppt/slides/slide8.xml><?xml version="1.0" encoding="utf-8"?>
+<p:sld xmlns:a="http://schemas.openxmlformats.org/drawingml/2006/main" xmlns:r="http://schemas.openxmlformats.org/officeDocument/2006/relationships" xmlns:p="http://schemas.openxmlformats.org/presentationml/2006/main">
   <p:cSld>
     <p:spTree>
       <p:nvGrpSpPr>
@@ -4619,7 +5837,7 @@
           <a:bodyPr lIns="45719" rIns="45719" anchor="ctr"/>
           <a:lstStyle/>
           <a:p>
-            <a:pPr/>
+            <a:endParaRPr/>
           </a:p>
         </p:txBody>
       </p:sp>
@@ -4642,7 +5860,7 @@
           </a:ln>
           <a:extLst>
             <a:ext uri="{C572A759-6A51-4108-AA02-DFA0A04FC94B}">
-              <ma14:wrappingTextBoxFlag xmlns:ma14="http://schemas.microsoft.com/office/mac/drawingml/2011/main" val="1"/>
+              <ma14:wrappingTextBoxFlag xmlns:ma14="http://schemas.microsoft.com/office/mac/drawingml/2011/main" xmlns="" val="1"/>
             </a:ext>
           </a:extLst>
         </p:spPr>
@@ -4652,7 +5870,7 @@
           </a:bodyPr>
           <a:lstStyle>
             <a:lvl1pPr>
-              <a:defRPr b="1" sz="2000">
+              <a:defRPr sz="2000" b="1">
                 <a:solidFill>
                   <a:srgbClr val="FFFFFF"/>
                 </a:solidFill>
@@ -4660,7 +5878,6 @@
             </a:lvl1pPr>
           </a:lstStyle>
           <a:p>
-            <a:pPr/>
             <a:r>
               <a:t>Interpretation</a:t>
             </a:r>
@@ -4676,7 +5893,7 @@
         <p:spPr>
           <a:xfrm>
             <a:off x="205025" y="1083299"/>
-            <a:ext cx="8565600" cy="920086"/>
+            <a:ext cx="8565600" cy="516327"/>
           </a:xfrm>
           <a:prstGeom prst="rect">
             <a:avLst/>
@@ -4686,7 +5903,7 @@
           </a:ln>
           <a:extLst>
             <a:ext uri="{C572A759-6A51-4108-AA02-DFA0A04FC94B}">
-              <ma14:wrappingTextBoxFlag xmlns:ma14="http://schemas.microsoft.com/office/mac/drawingml/2011/main" val="1"/>
+              <ma14:wrappingTextBoxFlag xmlns:ma14="http://schemas.microsoft.com/office/mac/drawingml/2011/main" xmlns="" val="1"/>
             </a:ext>
           </a:extLst>
         </p:spPr>
@@ -4699,7 +5916,7 @@
               <a:lnSpc>
                 <a:spcPct val="115000"/>
               </a:lnSpc>
-              <a:defRPr b="1" sz="2000">
+              <a:defRPr sz="2000" b="1">
                 <a:latin typeface="Open Sans"/>
                 <a:ea typeface="Open Sans"/>
                 <a:cs typeface="Open Sans"/>
@@ -4708,10 +5925,11 @@
             </a:lvl1pPr>
           </a:lstStyle>
           <a:p>
-            <a:pPr/>
-            <a:r>
-              <a:t>Place headline insight or information here. This should be the most important point for this slide.</a:t>
-            </a:r>
+            <a:r>
+              <a:rPr lang="en-US" dirty="0"/>
+              <a:t>The model predict how much future customer would spend.  </a:t>
+            </a:r>
+            <a:endParaRPr dirty="0"/>
           </a:p>
         </p:txBody>
       </p:sp>
@@ -4724,7 +5942,7 @@
         <p:spPr>
           <a:xfrm>
             <a:off x="205025" y="2164724"/>
-            <a:ext cx="4134600" cy="436851"/>
+            <a:ext cx="4134600" cy="964271"/>
           </a:xfrm>
           <a:prstGeom prst="rect">
             <a:avLst/>
@@ -4734,7 +5952,7 @@
           </a:ln>
           <a:extLst>
             <a:ext uri="{C572A759-6A51-4108-AA02-DFA0A04FC94B}">
-              <ma14:wrappingTextBoxFlag xmlns:ma14="http://schemas.microsoft.com/office/mac/drawingml/2011/main" val="1"/>
+              <ma14:wrappingTextBoxFlag xmlns:ma14="http://schemas.microsoft.com/office/mac/drawingml/2011/main" xmlns="" val="1"/>
             </a:ext>
           </a:extLst>
         </p:spPr>
@@ -4756,10 +5974,11 @@
             </a:lvl1pPr>
           </a:lstStyle>
           <a:p>
-            <a:pPr/>
-            <a:r>
-              <a:t>Place any information about this point here.</a:t>
-            </a:r>
+            <a:r>
+              <a:rPr lang="en-US" dirty="0"/>
+              <a:t>To help with decision making, a ranking column is added. The highest spending customer is ranked the lowest.  </a:t>
+            </a:r>
+            <a:endParaRPr dirty="0"/>
           </a:p>
         </p:txBody>
       </p:sp>
@@ -4813,6 +6032,7 @@
                   </a:solidFill>
                 </a:defRPr>
               </a:pPr>
+              <a:endParaRPr/>
             </a:p>
           </p:txBody>
         </p:sp>
@@ -4838,7 +6058,7 @@
             <a:effectLst/>
             <a:extLst>
               <a:ext uri="{C572A759-6A51-4108-AA02-DFA0A04FC94B}">
-                <ma14:wrappingTextBoxFlag xmlns:ma14="http://schemas.microsoft.com/office/mac/drawingml/2011/main" val="1"/>
+                <ma14:wrappingTextBoxFlag xmlns:ma14="http://schemas.microsoft.com/office/mac/drawingml/2011/main" xmlns="" val="1"/>
               </a:ext>
             </a:extLst>
           </p:spPr>
@@ -4856,7 +6076,6 @@
               </a:lvl1pPr>
             </a:lstStyle>
             <a:p>
-              <a:pPr/>
               <a:r>
                 <a:t>Place any supporting images, graphs, data or extra text here.</a:t>
               </a:r>
@@ -4886,7 +6105,7 @@
           </a:ln>
           <a:extLst>
             <a:ext uri="{C572A759-6A51-4108-AA02-DFA0A04FC94B}">
-              <ma14:wrappingTextBoxFlag xmlns:ma14="http://schemas.microsoft.com/office/mac/drawingml/2011/main" val="1"/>
+              <ma14:wrappingTextBoxFlag xmlns:ma14="http://schemas.microsoft.com/office/mac/drawingml/2011/main" xmlns="" val="1"/>
             </a:ext>
           </a:extLst>
         </p:spPr>
@@ -4895,7 +6114,7 @@
           <a:lstStyle/>
           <a:p>
             <a:pPr defTabSz="457200">
-              <a:defRPr b="1" sz="500">
+              <a:defRPr sz="500" b="1">
                 <a:latin typeface="Calibri"/>
                 <a:ea typeface="Calibri"/>
                 <a:cs typeface="Calibri"/>
@@ -4917,12 +6136,12 @@
   <p:clrMapOvr>
     <a:masterClrMapping/>
   </p:clrMapOvr>
-  <p:transition xmlns:p14="http://schemas.microsoft.com/office/powerpoint/2010/main" spd="med" advClick="1"/>
+  <p:transition spd="med"/>
 </p:sld>
 </file>
 
-<file path=ppt/slides/slide7.xml><?xml version="1.0" encoding="utf-8"?>
-<p:sld xmlns:a="http://schemas.openxmlformats.org/drawingml/2006/main" xmlns:r="http://schemas.openxmlformats.org/officeDocument/2006/relationships" xmlns:p="http://schemas.openxmlformats.org/presentationml/2006/main" showMasterSp="1" showMasterPhAnim="1">
+<file path=ppt/slides/slide9.xml><?xml version="1.0" encoding="utf-8"?>
+<p:sld xmlns:a="http://schemas.openxmlformats.org/drawingml/2006/main" xmlns:r="http://schemas.openxmlformats.org/officeDocument/2006/relationships" xmlns:p="http://schemas.openxmlformats.org/presentationml/2006/main">
   <p:cSld>
     <p:spTree>
       <p:nvGrpSpPr>
@@ -4945,7 +6164,7 @@
           <p:nvPr/>
         </p:nvSpPr>
         <p:spPr>
-          <a:xfrm flipH="1" rot="10800000">
+          <a:xfrm rot="10800000" flipH="1">
             <a:off x="-1" y="0"/>
             <a:ext cx="9163201" cy="5148001"/>
           </a:xfrm>
@@ -4969,7 +6188,7 @@
             </a:cxnLst>
             <a:rect l="0" t="0" r="r" b="b"/>
             <a:pathLst>
-              <a:path w="21600" h="21600" fill="norm" stroke="1" extrusionOk="0">
+              <a:path w="21600" h="21600" extrusionOk="0">
                 <a:moveTo>
                   <a:pt x="0" y="0"/>
                 </a:moveTo>
@@ -5008,7 +6227,7 @@
           <a:bodyPr lIns="45719" rIns="45719" anchor="ctr"/>
           <a:lstStyle/>
           <a:p>
-            <a:pPr/>
+            <a:endParaRPr/>
           </a:p>
         </p:txBody>
       </p:sp>
@@ -5031,7 +6250,7 @@
           </a:ln>
           <a:extLst>
             <a:ext uri="{C572A759-6A51-4108-AA02-DFA0A04FC94B}">
-              <ma14:wrappingTextBoxFlag xmlns:ma14="http://schemas.microsoft.com/office/mac/drawingml/2011/main" val="1"/>
+              <ma14:wrappingTextBoxFlag xmlns:ma14="http://schemas.microsoft.com/office/mac/drawingml/2011/main" xmlns="" val="1"/>
             </a:ext>
           </a:extLst>
         </p:spPr>
@@ -5053,7 +6272,6 @@
             </a:lvl1pPr>
           </a:lstStyle>
           <a:p>
-            <a:pPr/>
             <a:r>
               <a:t>Appendix</a:t>
             </a:r>
@@ -5082,7 +6300,7 @@
           </a:ln>
           <a:extLst>
             <a:ext uri="{C572A759-6A51-4108-AA02-DFA0A04FC94B}">
-              <ma14:wrappingTextBoxFlag xmlns:ma14="http://schemas.microsoft.com/office/mac/drawingml/2011/main" val="1"/>
+              <ma14:wrappingTextBoxFlag xmlns:ma14="http://schemas.microsoft.com/office/mac/drawingml/2011/main" xmlns="" val="1"/>
             </a:ext>
           </a:extLst>
         </p:spPr>
@@ -5091,7 +6309,7 @@
           <a:lstStyle/>
           <a:p>
             <a:pPr defTabSz="457200">
-              <a:defRPr b="1" sz="500">
+              <a:defRPr sz="500" b="1">
                 <a:latin typeface="Calibri"/>
                 <a:ea typeface="Calibri"/>
                 <a:cs typeface="Calibri"/>
@@ -5113,215 +6331,12 @@
   <p:clrMapOvr>
     <a:masterClrMapping/>
   </p:clrMapOvr>
-  <p:transition xmlns:p14="http://schemas.microsoft.com/office/powerpoint/2010/main" spd="med" advClick="1"/>
-</p:sld>
-</file>
-
-<file path=ppt/slides/slide8.xml><?xml version="1.0" encoding="utf-8"?>
-<p:sld xmlns:a="http://schemas.openxmlformats.org/drawingml/2006/main" xmlns:r="http://schemas.openxmlformats.org/officeDocument/2006/relationships" xmlns:p="http://schemas.openxmlformats.org/presentationml/2006/main" showMasterSp="1" showMasterPhAnim="1">
-  <p:cSld>
-    <p:spTree>
-      <p:nvGrpSpPr>
-        <p:cNvPr id="1" name=""/>
-        <p:cNvGrpSpPr/>
-        <p:nvPr/>
-      </p:nvGrpSpPr>
-      <p:grpSpPr>
-        <a:xfrm>
-          <a:off x="0" y="0"/>
-          <a:ext cx="0" cy="0"/>
-          <a:chOff x="0" y="0"/>
-          <a:chExt cx="0" cy="0"/>
-        </a:xfrm>
-      </p:grpSpPr>
-      <p:sp>
-        <p:nvSpPr>
-          <p:cNvPr id="161" name="Shape 113"/>
-          <p:cNvSpPr/>
-          <p:nvPr/>
-        </p:nvSpPr>
-        <p:spPr>
-          <a:xfrm>
-            <a:off x="-15501" y="-19475"/>
-            <a:ext cx="9191402" cy="840000"/>
-          </a:xfrm>
-          <a:prstGeom prst="rect">
-            <a:avLst/>
-          </a:prstGeom>
-          <a:gradFill>
-            <a:gsLst>
-              <a:gs pos="0">
-                <a:srgbClr val="1077D2"/>
-              </a:gs>
-              <a:gs pos="100000">
-                <a:srgbClr val="093153"/>
-              </a:gs>
-            </a:gsLst>
-            <a:lin ang="12000143"/>
-          </a:gradFill>
-          <a:ln w="12700">
-            <a:miter lim="400000"/>
-          </a:ln>
-        </p:spPr>
-        <p:txBody>
-          <a:bodyPr lIns="45719" rIns="45719" anchor="ctr"/>
-          <a:lstStyle/>
-          <a:p>
-            <a:pPr/>
-          </a:p>
-        </p:txBody>
-      </p:sp>
-      <p:sp>
-        <p:nvSpPr>
-          <p:cNvPr id="162" name="Shape 114"/>
-          <p:cNvSpPr/>
-          <p:nvPr/>
-        </p:nvSpPr>
-        <p:spPr>
-          <a:xfrm>
-            <a:off x="205025" y="263974"/>
-            <a:ext cx="8565600" cy="758742"/>
-          </a:xfrm>
-          <a:prstGeom prst="rect">
-            <a:avLst/>
-          </a:prstGeom>
-          <a:ln w="12700">
-            <a:miter lim="400000"/>
-          </a:ln>
-          <a:extLst>
-            <a:ext uri="{C572A759-6A51-4108-AA02-DFA0A04FC94B}">
-              <ma14:wrappingTextBoxFlag xmlns:ma14="http://schemas.microsoft.com/office/mac/drawingml/2011/main" val="1"/>
-            </a:ext>
-          </a:extLst>
-        </p:spPr>
-        <p:txBody>
-          <a:bodyPr lIns="91424" tIns="91424" rIns="91424" bIns="91424">
-            <a:spAutoFit/>
-          </a:bodyPr>
-          <a:lstStyle>
-            <a:lvl1pPr>
-              <a:defRPr b="1" sz="2000">
-                <a:solidFill>
-                  <a:srgbClr val="FFFFFF"/>
-                </a:solidFill>
-              </a:defRPr>
-            </a:lvl1pPr>
-          </a:lstStyle>
-          <a:p>
-            <a:pPr/>
-            <a:r>
-              <a:t>Appendix</a:t>
-            </a:r>
-          </a:p>
-        </p:txBody>
-      </p:sp>
-      <p:sp>
-        <p:nvSpPr>
-          <p:cNvPr id="163" name="Shape 115"/>
-          <p:cNvSpPr/>
-          <p:nvPr/>
-        </p:nvSpPr>
-        <p:spPr>
-          <a:xfrm>
-            <a:off x="205025" y="1083299"/>
-            <a:ext cx="8565600" cy="920086"/>
-          </a:xfrm>
-          <a:prstGeom prst="rect">
-            <a:avLst/>
-          </a:prstGeom>
-          <a:ln w="12700">
-            <a:miter lim="400000"/>
-          </a:ln>
-          <a:extLst>
-            <a:ext uri="{C572A759-6A51-4108-AA02-DFA0A04FC94B}">
-              <ma14:wrappingTextBoxFlag xmlns:ma14="http://schemas.microsoft.com/office/mac/drawingml/2011/main" val="1"/>
-            </a:ext>
-          </a:extLst>
-        </p:spPr>
-        <p:txBody>
-          <a:bodyPr lIns="91424" tIns="91424" rIns="91424" bIns="91424">
-            <a:spAutoFit/>
-          </a:bodyPr>
-          <a:lstStyle>
-            <a:lvl1pPr>
-              <a:lnSpc>
-                <a:spcPct val="115000"/>
-              </a:lnSpc>
-              <a:defRPr b="1" sz="2000">
-                <a:latin typeface="Open Sans"/>
-                <a:ea typeface="Open Sans"/>
-                <a:cs typeface="Open Sans"/>
-                <a:sym typeface="Open Sans"/>
-              </a:defRPr>
-            </a:lvl1pPr>
-          </a:lstStyle>
-          <a:p>
-            <a:pPr/>
-            <a:r>
-              <a:t>This is an optional slide where you may place any supporting items.</a:t>
-            </a:r>
-          </a:p>
-        </p:txBody>
-      </p:sp>
-      <p:sp>
-        <p:nvSpPr>
-          <p:cNvPr id="164" name="Note: The data and information in this document is reflective of a hypothetical situation and client. This document is to be used for KPMG Virtual Internship purposes only."/>
-          <p:cNvSpPr/>
-          <p:nvPr/>
-        </p:nvSpPr>
-        <p:spPr>
-          <a:xfrm>
-            <a:off x="-6201" y="-6350"/>
-            <a:ext cx="9175601" cy="238700"/>
-          </a:xfrm>
-          <a:prstGeom prst="rect">
-            <a:avLst/>
-          </a:prstGeom>
-          <a:solidFill>
-            <a:schemeClr val="accent3"/>
-          </a:solidFill>
-          <a:ln w="12700">
-            <a:miter lim="400000"/>
-          </a:ln>
-          <a:extLst>
-            <a:ext uri="{C572A759-6A51-4108-AA02-DFA0A04FC94B}">
-              <ma14:wrappingTextBoxFlag xmlns:ma14="http://schemas.microsoft.com/office/mac/drawingml/2011/main" val="1"/>
-            </a:ext>
-          </a:extLst>
-        </p:spPr>
-        <p:txBody>
-          <a:bodyPr lIns="45719" rIns="45719" anchor="ctr"/>
-          <a:lstStyle/>
-          <a:p>
-            <a:pPr defTabSz="457200">
-              <a:defRPr b="1" sz="500">
-                <a:latin typeface="Calibri"/>
-                <a:ea typeface="Calibri"/>
-                <a:cs typeface="Calibri"/>
-                <a:sym typeface="Calibri"/>
-              </a:defRPr>
-            </a:pPr>
-            <a:r>
-              <a:t>       Note: </a:t>
-            </a:r>
-            <a:r>
-              <a:rPr b="0"/>
-              <a:t>The data and information in this document is reflective of a hypothetical situation and client. This document is to be used for KPMG Virtual Internship purposes only. </a:t>
-            </a:r>
-          </a:p>
-        </p:txBody>
-      </p:sp>
-    </p:spTree>
-  </p:cSld>
-  <p:clrMapOvr>
-    <a:masterClrMapping/>
-  </p:clrMapOvr>
-  <p:transition xmlns:p14="http://schemas.microsoft.com/office/powerpoint/2010/main" spd="med" advClick="1"/>
+  <p:transition spd="med"/>
 </p:sld>
 </file>
 
 <file path=ppt/theme/theme1.xml><?xml version="1.0" encoding="utf-8"?>
-<a:theme xmlns:a="http://schemas.openxmlformats.org/drawingml/2006/main" xmlns:r="http://schemas.openxmlformats.org/officeDocument/2006/relationships" name="Simple Light">
+<a:theme xmlns:a="http://schemas.openxmlformats.org/drawingml/2006/main" name="Simple Light">
   <a:themeElements>
     <a:clrScheme name="Simple Light">
       <a:dk1>
@@ -5447,7 +6462,7 @@
       <a:effectStyleLst>
         <a:effectStyle>
           <a:effectLst>
-            <a:outerShdw sx="100000" sy="100000" kx="0" ky="0" algn="b" rotWithShape="0" blurRad="38100" dist="23000" dir="5400000">
+            <a:outerShdw blurRad="38100" dist="23000" dir="5400000" rotWithShape="0">
               <a:srgbClr val="000000">
                 <a:alpha val="35000"/>
               </a:srgbClr>
@@ -5456,7 +6471,7 @@
         </a:effectStyle>
         <a:effectStyle>
           <a:effectLst>
-            <a:outerShdw sx="100000" sy="100000" kx="0" ky="0" algn="b" rotWithShape="0" blurRad="38100" dist="23000" dir="5400000">
+            <a:outerShdw blurRad="38100" dist="23000" dir="5400000" rotWithShape="0">
               <a:srgbClr val="000000">
                 <a:alpha val="35000"/>
               </a:srgbClr>
@@ -5465,7 +6480,7 @@
         </a:effectStyle>
         <a:effectStyle>
           <a:effectLst>
-            <a:outerShdw sx="100000" sy="100000" kx="0" ky="0" algn="b" rotWithShape="0" blurRad="38100" dist="20000" dir="5400000">
+            <a:outerShdw blurRad="38100" dist="20000" dir="5400000" rotWithShape="0">
               <a:srgbClr val="000000">
                 <a:alpha val="38000"/>
               </a:srgbClr>
@@ -5539,7 +6554,7 @@
           <a:round/>
         </a:ln>
         <a:effectLst>
-          <a:outerShdw sx="100000" sy="100000" kx="0" ky="0" algn="b" rotWithShape="0" blurRad="38100" dist="23000" dir="5400000">
+          <a:outerShdw blurRad="38100" dist="23000" dir="5400000" rotWithShape="0">
             <a:srgbClr val="000000">
               <a:alpha val="35000"/>
             </a:srgbClr>
@@ -5547,7 +6562,7 @@
         </a:effectLst>
         <a:sp3d/>
       </a:spPr>
-      <a:bodyPr rot="0" spcFirstLastPara="1" vertOverflow="overflow" horzOverflow="overflow" vert="horz" wrap="square" lIns="45719" tIns="45719" rIns="45719" bIns="45719" numCol="1" spcCol="38100" rtlCol="0" anchor="ctr" upright="0">
+      <a:bodyPr rot="0" spcFirstLastPara="1" vertOverflow="overflow" horzOverflow="overflow" vert="horz" wrap="square" lIns="45719" tIns="45719" rIns="45719" bIns="45719" numCol="1" spcCol="38100" rtlCol="0" anchor="ctr">
         <a:spAutoFit/>
       </a:bodyPr>
       <a:lstStyle>
@@ -5566,7 +6581,7 @@
           <a:buFontTx/>
           <a:buNone/>
           <a:tabLst/>
-          <a:defRPr b="0" baseline="0" cap="none" i="0" spc="0" strike="noStrike" sz="1400" u="none" kumimoji="0" normalizeH="0">
+          <a:defRPr kumimoji="0" sz="1400" b="0" i="0" u="none" strike="noStrike" cap="none" spc="0" normalizeH="0" baseline="0">
             <a:ln>
               <a:noFill/>
             </a:ln>
@@ -5596,7 +6611,7 @@
           <a:buFontTx/>
           <a:buNone/>
           <a:tabLst/>
-          <a:defRPr b="0" baseline="0" cap="none" i="0" spc="0" strike="noStrike" sz="1800" u="none" kumimoji="0" normalizeH="0">
+          <a:defRPr kumimoji="0" sz="1800" b="0" i="0" u="none" strike="noStrike" cap="none" spc="0" normalizeH="0" baseline="0">
             <a:ln>
               <a:noFill/>
             </a:ln>
@@ -5622,7 +6637,7 @@
           <a:buFontTx/>
           <a:buNone/>
           <a:tabLst/>
-          <a:defRPr b="0" baseline="0" cap="none" i="0" spc="0" strike="noStrike" sz="1800" u="none" kumimoji="0" normalizeH="0">
+          <a:defRPr kumimoji="0" sz="1800" b="0" i="0" u="none" strike="noStrike" cap="none" spc="0" normalizeH="0" baseline="0">
             <a:ln>
               <a:noFill/>
             </a:ln>
@@ -5648,7 +6663,7 @@
           <a:buFontTx/>
           <a:buNone/>
           <a:tabLst/>
-          <a:defRPr b="0" baseline="0" cap="none" i="0" spc="0" strike="noStrike" sz="1800" u="none" kumimoji="0" normalizeH="0">
+          <a:defRPr kumimoji="0" sz="1800" b="0" i="0" u="none" strike="noStrike" cap="none" spc="0" normalizeH="0" baseline="0">
             <a:ln>
               <a:noFill/>
             </a:ln>
@@ -5674,7 +6689,7 @@
           <a:buFontTx/>
           <a:buNone/>
           <a:tabLst/>
-          <a:defRPr b="0" baseline="0" cap="none" i="0" spc="0" strike="noStrike" sz="1800" u="none" kumimoji="0" normalizeH="0">
+          <a:defRPr kumimoji="0" sz="1800" b="0" i="0" u="none" strike="noStrike" cap="none" spc="0" normalizeH="0" baseline="0">
             <a:ln>
               <a:noFill/>
             </a:ln>
@@ -5700,7 +6715,7 @@
           <a:buFontTx/>
           <a:buNone/>
           <a:tabLst/>
-          <a:defRPr b="0" baseline="0" cap="none" i="0" spc="0" strike="noStrike" sz="1800" u="none" kumimoji="0" normalizeH="0">
+          <a:defRPr kumimoji="0" sz="1800" b="0" i="0" u="none" strike="noStrike" cap="none" spc="0" normalizeH="0" baseline="0">
             <a:ln>
               <a:noFill/>
             </a:ln>
@@ -5726,7 +6741,7 @@
           <a:buFontTx/>
           <a:buNone/>
           <a:tabLst/>
-          <a:defRPr b="0" baseline="0" cap="none" i="0" spc="0" strike="noStrike" sz="1800" u="none" kumimoji="0" normalizeH="0">
+          <a:defRPr kumimoji="0" sz="1800" b="0" i="0" u="none" strike="noStrike" cap="none" spc="0" normalizeH="0" baseline="0">
             <a:ln>
               <a:noFill/>
             </a:ln>
@@ -5752,7 +6767,7 @@
           <a:buFontTx/>
           <a:buNone/>
           <a:tabLst/>
-          <a:defRPr b="0" baseline="0" cap="none" i="0" spc="0" strike="noStrike" sz="1800" u="none" kumimoji="0" normalizeH="0">
+          <a:defRPr kumimoji="0" sz="1800" b="0" i="0" u="none" strike="noStrike" cap="none" spc="0" normalizeH="0" baseline="0">
             <a:ln>
               <a:noFill/>
             </a:ln>
@@ -5778,7 +6793,7 @@
           <a:buFontTx/>
           <a:buNone/>
           <a:tabLst/>
-          <a:defRPr b="0" baseline="0" cap="none" i="0" spc="0" strike="noStrike" sz="1800" u="none" kumimoji="0" normalizeH="0">
+          <a:defRPr kumimoji="0" sz="1800" b="0" i="0" u="none" strike="noStrike" cap="none" spc="0" normalizeH="0" baseline="0">
             <a:ln>
               <a:noFill/>
             </a:ln>
@@ -5804,7 +6819,7 @@
           <a:buFontTx/>
           <a:buNone/>
           <a:tabLst/>
-          <a:defRPr b="0" baseline="0" cap="none" i="0" spc="0" strike="noStrike" sz="1800" u="none" kumimoji="0" normalizeH="0">
+          <a:defRPr kumimoji="0" sz="1800" b="0" i="0" u="none" strike="noStrike" cap="none" spc="0" normalizeH="0" baseline="0">
             <a:ln>
               <a:noFill/>
             </a:ln>
@@ -5817,9 +6832,15 @@
         </a:lvl9pPr>
       </a:lstStyle>
       <a:style>
-        <a:lnRef idx="0"/>
-        <a:fillRef idx="0"/>
-        <a:effectRef idx="0"/>
+        <a:lnRef idx="0">
+          <a:scrgbClr r="0" g="0" b="0"/>
+        </a:lnRef>
+        <a:fillRef idx="0">
+          <a:scrgbClr r="0" g="0" b="0"/>
+        </a:fillRef>
+        <a:effectRef idx="0">
+          <a:scrgbClr r="0" g="0" b="0"/>
+        </a:effectRef>
         <a:fontRef idx="none"/>
       </a:style>
     </a:spDef>
@@ -5834,7 +6855,7 @@
           <a:round/>
         </a:ln>
         <a:effectLst>
-          <a:outerShdw sx="100000" sy="100000" kx="0" ky="0" algn="b" rotWithShape="0" blurRad="38100" dist="20000" dir="5400000">
+          <a:outerShdw blurRad="38100" dist="20000" dir="5400000" rotWithShape="0">
             <a:srgbClr val="000000">
               <a:alpha val="38000"/>
             </a:srgbClr>
@@ -5842,7 +6863,7 @@
         </a:effectLst>
         <a:sp3d/>
       </a:spPr>
-      <a:bodyPr rot="0" spcFirstLastPara="1" vertOverflow="overflow" horzOverflow="overflow" vert="horz" wrap="square" lIns="91439" tIns="45719" rIns="91439" bIns="45719" numCol="1" spcCol="38100" rtlCol="0" anchor="t" upright="0">
+      <a:bodyPr rot="0" spcFirstLastPara="1" vertOverflow="overflow" horzOverflow="overflow" vert="horz" wrap="square" lIns="91439" tIns="45719" rIns="91439" bIns="45719" numCol="1" spcCol="38100" rtlCol="0" anchor="t">
         <a:noAutofit/>
       </a:bodyPr>
       <a:lstStyle>
@@ -5861,7 +6882,7 @@
           <a:buFontTx/>
           <a:buNone/>
           <a:tabLst/>
-          <a:defRPr b="0" baseline="0" cap="none" i="0" spc="0" strike="noStrike" sz="1800" u="none" kumimoji="0" normalizeH="0">
+          <a:defRPr kumimoji="0" sz="1800" b="0" i="0" u="none" strike="noStrike" cap="none" spc="0" normalizeH="0" baseline="0">
             <a:ln>
               <a:noFill/>
             </a:ln>
@@ -5887,7 +6908,7 @@
           <a:buFontTx/>
           <a:buNone/>
           <a:tabLst/>
-          <a:defRPr b="0" baseline="0" cap="none" i="0" spc="0" strike="noStrike" sz="1800" u="none" kumimoji="0" normalizeH="0">
+          <a:defRPr kumimoji="0" sz="1800" b="0" i="0" u="none" strike="noStrike" cap="none" spc="0" normalizeH="0" baseline="0">
             <a:ln>
               <a:noFill/>
             </a:ln>
@@ -5913,7 +6934,7 @@
           <a:buFontTx/>
           <a:buNone/>
           <a:tabLst/>
-          <a:defRPr b="0" baseline="0" cap="none" i="0" spc="0" strike="noStrike" sz="1800" u="none" kumimoji="0" normalizeH="0">
+          <a:defRPr kumimoji="0" sz="1800" b="0" i="0" u="none" strike="noStrike" cap="none" spc="0" normalizeH="0" baseline="0">
             <a:ln>
               <a:noFill/>
             </a:ln>
@@ -5939,7 +6960,7 @@
           <a:buFontTx/>
           <a:buNone/>
           <a:tabLst/>
-          <a:defRPr b="0" baseline="0" cap="none" i="0" spc="0" strike="noStrike" sz="1800" u="none" kumimoji="0" normalizeH="0">
+          <a:defRPr kumimoji="0" sz="1800" b="0" i="0" u="none" strike="noStrike" cap="none" spc="0" normalizeH="0" baseline="0">
             <a:ln>
               <a:noFill/>
             </a:ln>
@@ -5965,7 +6986,7 @@
           <a:buFontTx/>
           <a:buNone/>
           <a:tabLst/>
-          <a:defRPr b="0" baseline="0" cap="none" i="0" spc="0" strike="noStrike" sz="1800" u="none" kumimoji="0" normalizeH="0">
+          <a:defRPr kumimoji="0" sz="1800" b="0" i="0" u="none" strike="noStrike" cap="none" spc="0" normalizeH="0" baseline="0">
             <a:ln>
               <a:noFill/>
             </a:ln>
@@ -5991,7 +7012,7 @@
           <a:buFontTx/>
           <a:buNone/>
           <a:tabLst/>
-          <a:defRPr b="0" baseline="0" cap="none" i="0" spc="0" strike="noStrike" sz="1800" u="none" kumimoji="0" normalizeH="0">
+          <a:defRPr kumimoji="0" sz="1800" b="0" i="0" u="none" strike="noStrike" cap="none" spc="0" normalizeH="0" baseline="0">
             <a:ln>
               <a:noFill/>
             </a:ln>
@@ -6017,7 +7038,7 @@
           <a:buFontTx/>
           <a:buNone/>
           <a:tabLst/>
-          <a:defRPr b="0" baseline="0" cap="none" i="0" spc="0" strike="noStrike" sz="1800" u="none" kumimoji="0" normalizeH="0">
+          <a:defRPr kumimoji="0" sz="1800" b="0" i="0" u="none" strike="noStrike" cap="none" spc="0" normalizeH="0" baseline="0">
             <a:ln>
               <a:noFill/>
             </a:ln>
@@ -6043,7 +7064,7 @@
           <a:buFontTx/>
           <a:buNone/>
           <a:tabLst/>
-          <a:defRPr b="0" baseline="0" cap="none" i="0" spc="0" strike="noStrike" sz="1800" u="none" kumimoji="0" normalizeH="0">
+          <a:defRPr kumimoji="0" sz="1800" b="0" i="0" u="none" strike="noStrike" cap="none" spc="0" normalizeH="0" baseline="0">
             <a:ln>
               <a:noFill/>
             </a:ln>
@@ -6069,7 +7090,7 @@
           <a:buFontTx/>
           <a:buNone/>
           <a:tabLst/>
-          <a:defRPr b="0" baseline="0" cap="none" i="0" spc="0" strike="noStrike" sz="1800" u="none" kumimoji="0" normalizeH="0">
+          <a:defRPr kumimoji="0" sz="1800" b="0" i="0" u="none" strike="noStrike" cap="none" spc="0" normalizeH="0" baseline="0">
             <a:ln>
               <a:noFill/>
             </a:ln>
@@ -6095,7 +7116,7 @@
           <a:buFontTx/>
           <a:buNone/>
           <a:tabLst/>
-          <a:defRPr b="0" baseline="0" cap="none" i="0" spc="0" strike="noStrike" sz="1800" u="none" kumimoji="0" normalizeH="0">
+          <a:defRPr kumimoji="0" sz="1800" b="0" i="0" u="none" strike="noStrike" cap="none" spc="0" normalizeH="0" baseline="0">
             <a:ln>
               <a:noFill/>
             </a:ln>
@@ -6108,9 +7129,15 @@
         </a:lvl9pPr>
       </a:lstStyle>
       <a:style>
-        <a:lnRef idx="0"/>
-        <a:fillRef idx="0"/>
-        <a:effectRef idx="0"/>
+        <a:lnRef idx="0">
+          <a:scrgbClr r="0" g="0" b="0"/>
+        </a:lnRef>
+        <a:fillRef idx="0">
+          <a:scrgbClr r="0" g="0" b="0"/>
+        </a:fillRef>
+        <a:effectRef idx="0">
+          <a:scrgbClr r="0" g="0" b="0"/>
+        </a:effectRef>
         <a:fontRef idx="none"/>
       </a:style>
     </a:lnDef>
@@ -6124,7 +7151,7 @@
         <a:effectLst/>
         <a:sp3d/>
       </a:spPr>
-      <a:bodyPr rot="0" spcFirstLastPara="1" vertOverflow="overflow" horzOverflow="overflow" vert="horz" wrap="square" lIns="45719" tIns="45719" rIns="45719" bIns="45719" numCol="1" spcCol="38100" rtlCol="0" anchor="t" upright="0">
+      <a:bodyPr rot="0" spcFirstLastPara="1" vertOverflow="overflow" horzOverflow="overflow" vert="horz" wrap="square" lIns="45719" tIns="45719" rIns="45719" bIns="45719" numCol="1" spcCol="38100" rtlCol="0" anchor="t">
         <a:spAutoFit/>
       </a:bodyPr>
       <a:lstStyle>
@@ -6143,7 +7170,7 @@
           <a:buFontTx/>
           <a:buNone/>
           <a:tabLst/>
-          <a:defRPr b="0" baseline="0" cap="none" i="0" spc="0" strike="noStrike" sz="1400" u="none" kumimoji="0" normalizeH="0">
+          <a:defRPr kumimoji="0" sz="1400" b="0" i="0" u="none" strike="noStrike" cap="none" spc="0" normalizeH="0" baseline="0">
             <a:ln>
               <a:noFill/>
             </a:ln>
@@ -6173,7 +7200,7 @@
           <a:buFontTx/>
           <a:buNone/>
           <a:tabLst/>
-          <a:defRPr b="0" baseline="0" cap="none" i="0" spc="0" strike="noStrike" sz="1800" u="none" kumimoji="0" normalizeH="0">
+          <a:defRPr kumimoji="0" sz="1800" b="0" i="0" u="none" strike="noStrike" cap="none" spc="0" normalizeH="0" baseline="0">
             <a:ln>
               <a:noFill/>
             </a:ln>
@@ -6199,7 +7226,7 @@
           <a:buFontTx/>
           <a:buNone/>
           <a:tabLst/>
-          <a:defRPr b="0" baseline="0" cap="none" i="0" spc="0" strike="noStrike" sz="1800" u="none" kumimoji="0" normalizeH="0">
+          <a:defRPr kumimoji="0" sz="1800" b="0" i="0" u="none" strike="noStrike" cap="none" spc="0" normalizeH="0" baseline="0">
             <a:ln>
               <a:noFill/>
             </a:ln>
@@ -6225,7 +7252,7 @@
           <a:buFontTx/>
           <a:buNone/>
           <a:tabLst/>
-          <a:defRPr b="0" baseline="0" cap="none" i="0" spc="0" strike="noStrike" sz="1800" u="none" kumimoji="0" normalizeH="0">
+          <a:defRPr kumimoji="0" sz="1800" b="0" i="0" u="none" strike="noStrike" cap="none" spc="0" normalizeH="0" baseline="0">
             <a:ln>
               <a:noFill/>
             </a:ln>
@@ -6251,7 +7278,7 @@
           <a:buFontTx/>
           <a:buNone/>
           <a:tabLst/>
-          <a:defRPr b="0" baseline="0" cap="none" i="0" spc="0" strike="noStrike" sz="1800" u="none" kumimoji="0" normalizeH="0">
+          <a:defRPr kumimoji="0" sz="1800" b="0" i="0" u="none" strike="noStrike" cap="none" spc="0" normalizeH="0" baseline="0">
             <a:ln>
               <a:noFill/>
             </a:ln>
@@ -6277,7 +7304,7 @@
           <a:buFontTx/>
           <a:buNone/>
           <a:tabLst/>
-          <a:defRPr b="0" baseline="0" cap="none" i="0" spc="0" strike="noStrike" sz="1800" u="none" kumimoji="0" normalizeH="0">
+          <a:defRPr kumimoji="0" sz="1800" b="0" i="0" u="none" strike="noStrike" cap="none" spc="0" normalizeH="0" baseline="0">
             <a:ln>
               <a:noFill/>
             </a:ln>
@@ -6303,7 +7330,7 @@
           <a:buFontTx/>
           <a:buNone/>
           <a:tabLst/>
-          <a:defRPr b="0" baseline="0" cap="none" i="0" spc="0" strike="noStrike" sz="1800" u="none" kumimoji="0" normalizeH="0">
+          <a:defRPr kumimoji="0" sz="1800" b="0" i="0" u="none" strike="noStrike" cap="none" spc="0" normalizeH="0" baseline="0">
             <a:ln>
               <a:noFill/>
             </a:ln>
@@ -6329,7 +7356,7 @@
           <a:buFontTx/>
           <a:buNone/>
           <a:tabLst/>
-          <a:defRPr b="0" baseline="0" cap="none" i="0" spc="0" strike="noStrike" sz="1800" u="none" kumimoji="0" normalizeH="0">
+          <a:defRPr kumimoji="0" sz="1800" b="0" i="0" u="none" strike="noStrike" cap="none" spc="0" normalizeH="0" baseline="0">
             <a:ln>
               <a:noFill/>
             </a:ln>
@@ -6355,7 +7382,7 @@
           <a:buFontTx/>
           <a:buNone/>
           <a:tabLst/>
-          <a:defRPr b="0" baseline="0" cap="none" i="0" spc="0" strike="noStrike" sz="1800" u="none" kumimoji="0" normalizeH="0">
+          <a:defRPr kumimoji="0" sz="1800" b="0" i="0" u="none" strike="noStrike" cap="none" spc="0" normalizeH="0" baseline="0">
             <a:ln>
               <a:noFill/>
             </a:ln>
@@ -6381,7 +7408,7 @@
           <a:buFontTx/>
           <a:buNone/>
           <a:tabLst/>
-          <a:defRPr b="0" baseline="0" cap="none" i="0" spc="0" strike="noStrike" sz="1800" u="none" kumimoji="0" normalizeH="0">
+          <a:defRPr kumimoji="0" sz="1800" b="0" i="0" u="none" strike="noStrike" cap="none" spc="0" normalizeH="0" baseline="0">
             <a:ln>
               <a:noFill/>
             </a:ln>
@@ -6394,18 +7421,25 @@
         </a:lvl9pPr>
       </a:lstStyle>
       <a:style>
-        <a:lnRef idx="0"/>
-        <a:fillRef idx="0"/>
-        <a:effectRef idx="0"/>
+        <a:lnRef idx="0">
+          <a:scrgbClr r="0" g="0" b="0"/>
+        </a:lnRef>
+        <a:fillRef idx="0">
+          <a:scrgbClr r="0" g="0" b="0"/>
+        </a:fillRef>
+        <a:effectRef idx="0">
+          <a:scrgbClr r="0" g="0" b="0"/>
+        </a:effectRef>
         <a:fontRef idx="none"/>
       </a:style>
     </a:txDef>
   </a:objectDefaults>
+  <a:extraClrSchemeLst/>
 </a:theme>
 </file>
 
 <file path=ppt/theme/theme2.xml><?xml version="1.0" encoding="utf-8"?>
-<a:theme xmlns:a="http://schemas.openxmlformats.org/drawingml/2006/main" xmlns:r="http://schemas.openxmlformats.org/officeDocument/2006/relationships" name="Simple Light">
+<a:theme xmlns:a="http://schemas.openxmlformats.org/drawingml/2006/main" name="Simple Light">
   <a:themeElements>
     <a:clrScheme name="Simple Light">
       <a:dk1>
@@ -6531,7 +7565,7 @@
       <a:effectStyleLst>
         <a:effectStyle>
           <a:effectLst>
-            <a:outerShdw sx="100000" sy="100000" kx="0" ky="0" algn="b" rotWithShape="0" blurRad="38100" dist="23000" dir="5400000">
+            <a:outerShdw blurRad="38100" dist="23000" dir="5400000" rotWithShape="0">
               <a:srgbClr val="000000">
                 <a:alpha val="35000"/>
               </a:srgbClr>
@@ -6540,7 +7574,7 @@
         </a:effectStyle>
         <a:effectStyle>
           <a:effectLst>
-            <a:outerShdw sx="100000" sy="100000" kx="0" ky="0" algn="b" rotWithShape="0" blurRad="38100" dist="23000" dir="5400000">
+            <a:outerShdw blurRad="38100" dist="23000" dir="5400000" rotWithShape="0">
               <a:srgbClr val="000000">
                 <a:alpha val="35000"/>
               </a:srgbClr>
@@ -6549,7 +7583,7 @@
         </a:effectStyle>
         <a:effectStyle>
           <a:effectLst>
-            <a:outerShdw sx="100000" sy="100000" kx="0" ky="0" algn="b" rotWithShape="0" blurRad="38100" dist="20000" dir="5400000">
+            <a:outerShdw blurRad="38100" dist="20000" dir="5400000" rotWithShape="0">
               <a:srgbClr val="000000">
                 <a:alpha val="38000"/>
               </a:srgbClr>
@@ -6623,7 +7657,7 @@
           <a:round/>
         </a:ln>
         <a:effectLst>
-          <a:outerShdw sx="100000" sy="100000" kx="0" ky="0" algn="b" rotWithShape="0" blurRad="38100" dist="23000" dir="5400000">
+          <a:outerShdw blurRad="38100" dist="23000" dir="5400000" rotWithShape="0">
             <a:srgbClr val="000000">
               <a:alpha val="35000"/>
             </a:srgbClr>
@@ -6631,7 +7665,7 @@
         </a:effectLst>
         <a:sp3d/>
       </a:spPr>
-      <a:bodyPr rot="0" spcFirstLastPara="1" vertOverflow="overflow" horzOverflow="overflow" vert="horz" wrap="square" lIns="45719" tIns="45719" rIns="45719" bIns="45719" numCol="1" spcCol="38100" rtlCol="0" anchor="ctr" upright="0">
+      <a:bodyPr rot="0" spcFirstLastPara="1" vertOverflow="overflow" horzOverflow="overflow" vert="horz" wrap="square" lIns="45719" tIns="45719" rIns="45719" bIns="45719" numCol="1" spcCol="38100" rtlCol="0" anchor="ctr">
         <a:spAutoFit/>
       </a:bodyPr>
       <a:lstStyle>
@@ -6650,7 +7684,7 @@
           <a:buFontTx/>
           <a:buNone/>
           <a:tabLst/>
-          <a:defRPr b="0" baseline="0" cap="none" i="0" spc="0" strike="noStrike" sz="1400" u="none" kumimoji="0" normalizeH="0">
+          <a:defRPr kumimoji="0" sz="1400" b="0" i="0" u="none" strike="noStrike" cap="none" spc="0" normalizeH="0" baseline="0">
             <a:ln>
               <a:noFill/>
             </a:ln>
@@ -6680,7 +7714,7 @@
           <a:buFontTx/>
           <a:buNone/>
           <a:tabLst/>
-          <a:defRPr b="0" baseline="0" cap="none" i="0" spc="0" strike="noStrike" sz="1800" u="none" kumimoji="0" normalizeH="0">
+          <a:defRPr kumimoji="0" sz="1800" b="0" i="0" u="none" strike="noStrike" cap="none" spc="0" normalizeH="0" baseline="0">
             <a:ln>
               <a:noFill/>
             </a:ln>
@@ -6706,7 +7740,7 @@
           <a:buFontTx/>
           <a:buNone/>
           <a:tabLst/>
-          <a:defRPr b="0" baseline="0" cap="none" i="0" spc="0" strike="noStrike" sz="1800" u="none" kumimoji="0" normalizeH="0">
+          <a:defRPr kumimoji="0" sz="1800" b="0" i="0" u="none" strike="noStrike" cap="none" spc="0" normalizeH="0" baseline="0">
             <a:ln>
               <a:noFill/>
             </a:ln>
@@ -6732,7 +7766,7 @@
           <a:buFontTx/>
           <a:buNone/>
           <a:tabLst/>
-          <a:defRPr b="0" baseline="0" cap="none" i="0" spc="0" strike="noStrike" sz="1800" u="none" kumimoji="0" normalizeH="0">
+          <a:defRPr kumimoji="0" sz="1800" b="0" i="0" u="none" strike="noStrike" cap="none" spc="0" normalizeH="0" baseline="0">
             <a:ln>
               <a:noFill/>
             </a:ln>
@@ -6758,7 +7792,7 @@
           <a:buFontTx/>
           <a:buNone/>
           <a:tabLst/>
-          <a:defRPr b="0" baseline="0" cap="none" i="0" spc="0" strike="noStrike" sz="1800" u="none" kumimoji="0" normalizeH="0">
+          <a:defRPr kumimoji="0" sz="1800" b="0" i="0" u="none" strike="noStrike" cap="none" spc="0" normalizeH="0" baseline="0">
             <a:ln>
               <a:noFill/>
             </a:ln>
@@ -6784,7 +7818,7 @@
           <a:buFontTx/>
           <a:buNone/>
           <a:tabLst/>
-          <a:defRPr b="0" baseline="0" cap="none" i="0" spc="0" strike="noStrike" sz="1800" u="none" kumimoji="0" normalizeH="0">
+          <a:defRPr kumimoji="0" sz="1800" b="0" i="0" u="none" strike="noStrike" cap="none" spc="0" normalizeH="0" baseline="0">
             <a:ln>
               <a:noFill/>
             </a:ln>
@@ -6810,7 +7844,7 @@
           <a:buFontTx/>
           <a:buNone/>
           <a:tabLst/>
-          <a:defRPr b="0" baseline="0" cap="none" i="0" spc="0" strike="noStrike" sz="1800" u="none" kumimoji="0" normalizeH="0">
+          <a:defRPr kumimoji="0" sz="1800" b="0" i="0" u="none" strike="noStrike" cap="none" spc="0" normalizeH="0" baseline="0">
             <a:ln>
               <a:noFill/>
             </a:ln>
@@ -6836,7 +7870,7 @@
           <a:buFontTx/>
           <a:buNone/>
           <a:tabLst/>
-          <a:defRPr b="0" baseline="0" cap="none" i="0" spc="0" strike="noStrike" sz="1800" u="none" kumimoji="0" normalizeH="0">
+          <a:defRPr kumimoji="0" sz="1800" b="0" i="0" u="none" strike="noStrike" cap="none" spc="0" normalizeH="0" baseline="0">
             <a:ln>
               <a:noFill/>
             </a:ln>
@@ -6862,7 +7896,7 @@
           <a:buFontTx/>
           <a:buNone/>
           <a:tabLst/>
-          <a:defRPr b="0" baseline="0" cap="none" i="0" spc="0" strike="noStrike" sz="1800" u="none" kumimoji="0" normalizeH="0">
+          <a:defRPr kumimoji="0" sz="1800" b="0" i="0" u="none" strike="noStrike" cap="none" spc="0" normalizeH="0" baseline="0">
             <a:ln>
               <a:noFill/>
             </a:ln>
@@ -6888,7 +7922,7 @@
           <a:buFontTx/>
           <a:buNone/>
           <a:tabLst/>
-          <a:defRPr b="0" baseline="0" cap="none" i="0" spc="0" strike="noStrike" sz="1800" u="none" kumimoji="0" normalizeH="0">
+          <a:defRPr kumimoji="0" sz="1800" b="0" i="0" u="none" strike="noStrike" cap="none" spc="0" normalizeH="0" baseline="0">
             <a:ln>
               <a:noFill/>
             </a:ln>
@@ -6901,9 +7935,15 @@
         </a:lvl9pPr>
       </a:lstStyle>
       <a:style>
-        <a:lnRef idx="0"/>
-        <a:fillRef idx="0"/>
-        <a:effectRef idx="0"/>
+        <a:lnRef idx="0">
+          <a:scrgbClr r="0" g="0" b="0"/>
+        </a:lnRef>
+        <a:fillRef idx="0">
+          <a:scrgbClr r="0" g="0" b="0"/>
+        </a:fillRef>
+        <a:effectRef idx="0">
+          <a:scrgbClr r="0" g="0" b="0"/>
+        </a:effectRef>
         <a:fontRef idx="none"/>
       </a:style>
     </a:spDef>
@@ -6918,7 +7958,7 @@
           <a:round/>
         </a:ln>
         <a:effectLst>
-          <a:outerShdw sx="100000" sy="100000" kx="0" ky="0" algn="b" rotWithShape="0" blurRad="38100" dist="20000" dir="5400000">
+          <a:outerShdw blurRad="38100" dist="20000" dir="5400000" rotWithShape="0">
             <a:srgbClr val="000000">
               <a:alpha val="38000"/>
             </a:srgbClr>
@@ -6926,7 +7966,7 @@
         </a:effectLst>
         <a:sp3d/>
       </a:spPr>
-      <a:bodyPr rot="0" spcFirstLastPara="1" vertOverflow="overflow" horzOverflow="overflow" vert="horz" wrap="square" lIns="91439" tIns="45719" rIns="91439" bIns="45719" numCol="1" spcCol="38100" rtlCol="0" anchor="t" upright="0">
+      <a:bodyPr rot="0" spcFirstLastPara="1" vertOverflow="overflow" horzOverflow="overflow" vert="horz" wrap="square" lIns="91439" tIns="45719" rIns="91439" bIns="45719" numCol="1" spcCol="38100" rtlCol="0" anchor="t">
         <a:noAutofit/>
       </a:bodyPr>
       <a:lstStyle>
@@ -6945,7 +7985,7 @@
           <a:buFontTx/>
           <a:buNone/>
           <a:tabLst/>
-          <a:defRPr b="0" baseline="0" cap="none" i="0" spc="0" strike="noStrike" sz="1800" u="none" kumimoji="0" normalizeH="0">
+          <a:defRPr kumimoji="0" sz="1800" b="0" i="0" u="none" strike="noStrike" cap="none" spc="0" normalizeH="0" baseline="0">
             <a:ln>
               <a:noFill/>
             </a:ln>
@@ -6971,7 +8011,7 @@
           <a:buFontTx/>
           <a:buNone/>
           <a:tabLst/>
-          <a:defRPr b="0" baseline="0" cap="none" i="0" spc="0" strike="noStrike" sz="1800" u="none" kumimoji="0" normalizeH="0">
+          <a:defRPr kumimoji="0" sz="1800" b="0" i="0" u="none" strike="noStrike" cap="none" spc="0" normalizeH="0" baseline="0">
             <a:ln>
               <a:noFill/>
             </a:ln>
@@ -6997,7 +8037,7 @@
           <a:buFontTx/>
           <a:buNone/>
           <a:tabLst/>
-          <a:defRPr b="0" baseline="0" cap="none" i="0" spc="0" strike="noStrike" sz="1800" u="none" kumimoji="0" normalizeH="0">
+          <a:defRPr kumimoji="0" sz="1800" b="0" i="0" u="none" strike="noStrike" cap="none" spc="0" normalizeH="0" baseline="0">
             <a:ln>
               <a:noFill/>
             </a:ln>
@@ -7023,7 +8063,7 @@
           <a:buFontTx/>
           <a:buNone/>
           <a:tabLst/>
-          <a:defRPr b="0" baseline="0" cap="none" i="0" spc="0" strike="noStrike" sz="1800" u="none" kumimoji="0" normalizeH="0">
+          <a:defRPr kumimoji="0" sz="1800" b="0" i="0" u="none" strike="noStrike" cap="none" spc="0" normalizeH="0" baseline="0">
             <a:ln>
               <a:noFill/>
             </a:ln>
@@ -7049,7 +8089,7 @@
           <a:buFontTx/>
           <a:buNone/>
           <a:tabLst/>
-          <a:defRPr b="0" baseline="0" cap="none" i="0" spc="0" strike="noStrike" sz="1800" u="none" kumimoji="0" normalizeH="0">
+          <a:defRPr kumimoji="0" sz="1800" b="0" i="0" u="none" strike="noStrike" cap="none" spc="0" normalizeH="0" baseline="0">
             <a:ln>
               <a:noFill/>
             </a:ln>
@@ -7075,7 +8115,7 @@
           <a:buFontTx/>
           <a:buNone/>
           <a:tabLst/>
-          <a:defRPr b="0" baseline="0" cap="none" i="0" spc="0" strike="noStrike" sz="1800" u="none" kumimoji="0" normalizeH="0">
+          <a:defRPr kumimoji="0" sz="1800" b="0" i="0" u="none" strike="noStrike" cap="none" spc="0" normalizeH="0" baseline="0">
             <a:ln>
               <a:noFill/>
             </a:ln>
@@ -7101,7 +8141,7 @@
           <a:buFontTx/>
           <a:buNone/>
           <a:tabLst/>
-          <a:defRPr b="0" baseline="0" cap="none" i="0" spc="0" strike="noStrike" sz="1800" u="none" kumimoji="0" normalizeH="0">
+          <a:defRPr kumimoji="0" sz="1800" b="0" i="0" u="none" strike="noStrike" cap="none" spc="0" normalizeH="0" baseline="0">
             <a:ln>
               <a:noFill/>
             </a:ln>
@@ -7127,7 +8167,7 @@
           <a:buFontTx/>
           <a:buNone/>
           <a:tabLst/>
-          <a:defRPr b="0" baseline="0" cap="none" i="0" spc="0" strike="noStrike" sz="1800" u="none" kumimoji="0" normalizeH="0">
+          <a:defRPr kumimoji="0" sz="1800" b="0" i="0" u="none" strike="noStrike" cap="none" spc="0" normalizeH="0" baseline="0">
             <a:ln>
               <a:noFill/>
             </a:ln>
@@ -7153,7 +8193,7 @@
           <a:buFontTx/>
           <a:buNone/>
           <a:tabLst/>
-          <a:defRPr b="0" baseline="0" cap="none" i="0" spc="0" strike="noStrike" sz="1800" u="none" kumimoji="0" normalizeH="0">
+          <a:defRPr kumimoji="0" sz="1800" b="0" i="0" u="none" strike="noStrike" cap="none" spc="0" normalizeH="0" baseline="0">
             <a:ln>
               <a:noFill/>
             </a:ln>
@@ -7179,7 +8219,7 @@
           <a:buFontTx/>
           <a:buNone/>
           <a:tabLst/>
-          <a:defRPr b="0" baseline="0" cap="none" i="0" spc="0" strike="noStrike" sz="1800" u="none" kumimoji="0" normalizeH="0">
+          <a:defRPr kumimoji="0" sz="1800" b="0" i="0" u="none" strike="noStrike" cap="none" spc="0" normalizeH="0" baseline="0">
             <a:ln>
               <a:noFill/>
             </a:ln>
@@ -7192,9 +8232,15 @@
         </a:lvl9pPr>
       </a:lstStyle>
       <a:style>
-        <a:lnRef idx="0"/>
-        <a:fillRef idx="0"/>
-        <a:effectRef idx="0"/>
+        <a:lnRef idx="0">
+          <a:scrgbClr r="0" g="0" b="0"/>
+        </a:lnRef>
+        <a:fillRef idx="0">
+          <a:scrgbClr r="0" g="0" b="0"/>
+        </a:fillRef>
+        <a:effectRef idx="0">
+          <a:scrgbClr r="0" g="0" b="0"/>
+        </a:effectRef>
         <a:fontRef idx="none"/>
       </a:style>
     </a:lnDef>
@@ -7208,7 +8254,7 @@
         <a:effectLst/>
         <a:sp3d/>
       </a:spPr>
-      <a:bodyPr rot="0" spcFirstLastPara="1" vertOverflow="overflow" horzOverflow="overflow" vert="horz" wrap="square" lIns="45719" tIns="45719" rIns="45719" bIns="45719" numCol="1" spcCol="38100" rtlCol="0" anchor="t" upright="0">
+      <a:bodyPr rot="0" spcFirstLastPara="1" vertOverflow="overflow" horzOverflow="overflow" vert="horz" wrap="square" lIns="45719" tIns="45719" rIns="45719" bIns="45719" numCol="1" spcCol="38100" rtlCol="0" anchor="t">
         <a:spAutoFit/>
       </a:bodyPr>
       <a:lstStyle>
@@ -7227,7 +8273,7 @@
           <a:buFontTx/>
           <a:buNone/>
           <a:tabLst/>
-          <a:defRPr b="0" baseline="0" cap="none" i="0" spc="0" strike="noStrike" sz="1400" u="none" kumimoji="0" normalizeH="0">
+          <a:defRPr kumimoji="0" sz="1400" b="0" i="0" u="none" strike="noStrike" cap="none" spc="0" normalizeH="0" baseline="0">
             <a:ln>
               <a:noFill/>
             </a:ln>
@@ -7257,7 +8303,7 @@
           <a:buFontTx/>
           <a:buNone/>
           <a:tabLst/>
-          <a:defRPr b="0" baseline="0" cap="none" i="0" spc="0" strike="noStrike" sz="1800" u="none" kumimoji="0" normalizeH="0">
+          <a:defRPr kumimoji="0" sz="1800" b="0" i="0" u="none" strike="noStrike" cap="none" spc="0" normalizeH="0" baseline="0">
             <a:ln>
               <a:noFill/>
             </a:ln>
@@ -7283,7 +8329,7 @@
           <a:buFontTx/>
           <a:buNone/>
           <a:tabLst/>
-          <a:defRPr b="0" baseline="0" cap="none" i="0" spc="0" strike="noStrike" sz="1800" u="none" kumimoji="0" normalizeH="0">
+          <a:defRPr kumimoji="0" sz="1800" b="0" i="0" u="none" strike="noStrike" cap="none" spc="0" normalizeH="0" baseline="0">
             <a:ln>
               <a:noFill/>
             </a:ln>
@@ -7309,7 +8355,7 @@
           <a:buFontTx/>
           <a:buNone/>
           <a:tabLst/>
-          <a:defRPr b="0" baseline="0" cap="none" i="0" spc="0" strike="noStrike" sz="1800" u="none" kumimoji="0" normalizeH="0">
+          <a:defRPr kumimoji="0" sz="1800" b="0" i="0" u="none" strike="noStrike" cap="none" spc="0" normalizeH="0" baseline="0">
             <a:ln>
               <a:noFill/>
             </a:ln>
@@ -7335,7 +8381,7 @@
           <a:buFontTx/>
           <a:buNone/>
           <a:tabLst/>
-          <a:defRPr b="0" baseline="0" cap="none" i="0" spc="0" strike="noStrike" sz="1800" u="none" kumimoji="0" normalizeH="0">
+          <a:defRPr kumimoji="0" sz="1800" b="0" i="0" u="none" strike="noStrike" cap="none" spc="0" normalizeH="0" baseline="0">
             <a:ln>
               <a:noFill/>
             </a:ln>
@@ -7361,7 +8407,7 @@
           <a:buFontTx/>
           <a:buNone/>
           <a:tabLst/>
-          <a:defRPr b="0" baseline="0" cap="none" i="0" spc="0" strike="noStrike" sz="1800" u="none" kumimoji="0" normalizeH="0">
+          <a:defRPr kumimoji="0" sz="1800" b="0" i="0" u="none" strike="noStrike" cap="none" spc="0" normalizeH="0" baseline="0">
             <a:ln>
               <a:noFill/>
             </a:ln>
@@ -7387,7 +8433,7 @@
           <a:buFontTx/>
           <a:buNone/>
           <a:tabLst/>
-          <a:defRPr b="0" baseline="0" cap="none" i="0" spc="0" strike="noStrike" sz="1800" u="none" kumimoji="0" normalizeH="0">
+          <a:defRPr kumimoji="0" sz="1800" b="0" i="0" u="none" strike="noStrike" cap="none" spc="0" normalizeH="0" baseline="0">
             <a:ln>
               <a:noFill/>
             </a:ln>
@@ -7413,7 +8459,7 @@
           <a:buFontTx/>
           <a:buNone/>
           <a:tabLst/>
-          <a:defRPr b="0" baseline="0" cap="none" i="0" spc="0" strike="noStrike" sz="1800" u="none" kumimoji="0" normalizeH="0">
+          <a:defRPr kumimoji="0" sz="1800" b="0" i="0" u="none" strike="noStrike" cap="none" spc="0" normalizeH="0" baseline="0">
             <a:ln>
               <a:noFill/>
             </a:ln>
@@ -7439,7 +8485,7 @@
           <a:buFontTx/>
           <a:buNone/>
           <a:tabLst/>
-          <a:defRPr b="0" baseline="0" cap="none" i="0" spc="0" strike="noStrike" sz="1800" u="none" kumimoji="0" normalizeH="0">
+          <a:defRPr kumimoji="0" sz="1800" b="0" i="0" u="none" strike="noStrike" cap="none" spc="0" normalizeH="0" baseline="0">
             <a:ln>
               <a:noFill/>
             </a:ln>
@@ -7465,7 +8511,7 @@
           <a:buFontTx/>
           <a:buNone/>
           <a:tabLst/>
-          <a:defRPr b="0" baseline="0" cap="none" i="0" spc="0" strike="noStrike" sz="1800" u="none" kumimoji="0" normalizeH="0">
+          <a:defRPr kumimoji="0" sz="1800" b="0" i="0" u="none" strike="noStrike" cap="none" spc="0" normalizeH="0" baseline="0">
             <a:ln>
               <a:noFill/>
             </a:ln>
@@ -7478,12 +8524,19 @@
         </a:lvl9pPr>
       </a:lstStyle>
       <a:style>
-        <a:lnRef idx="0"/>
-        <a:fillRef idx="0"/>
-        <a:effectRef idx="0"/>
+        <a:lnRef idx="0">
+          <a:scrgbClr r="0" g="0" b="0"/>
+        </a:lnRef>
+        <a:fillRef idx="0">
+          <a:scrgbClr r="0" g="0" b="0"/>
+        </a:fillRef>
+        <a:effectRef idx="0">
+          <a:scrgbClr r="0" g="0" b="0"/>
+        </a:effectRef>
         <a:fontRef idx="none"/>
       </a:style>
     </a:txDef>
   </a:objectDefaults>
+  <a:extraClrSchemeLst/>
 </a:theme>
 </file>
</xml_diff>